<commit_message>
Nav bar 28 Mar 2025
</commit_message>
<xml_diff>
--- a/Documentation/Prototype Assignment - Group 2.pptx
+++ b/Documentation/Prototype Assignment - Group 2.pptx
@@ -3802,6 +3802,42 @@
           </a:p>
         </p:txBody>
       </p:sp>
+      <p:pic>
+        <p:nvPicPr>
+          <p:cNvPr id="2" name="Picture 1" descr="A close-up of a tag&#10;&#10;AI-generated content may be incorrect.">
+            <a:extLst>
+              <a:ext uri="{FF2B5EF4-FFF2-40B4-BE49-F238E27FC236}">
+                <a16:creationId xmlns:a16="http://schemas.microsoft.com/office/drawing/2014/main" id="{3CE82C45-0F6F-C3FB-CB95-6D1D5DBBF2E5}"/>
+              </a:ext>
+            </a:extLst>
+          </p:cNvPr>
+          <p:cNvPicPr>
+            <a:picLocks noChangeAspect="1"/>
+          </p:cNvPicPr>
+          <p:nvPr/>
+        </p:nvPicPr>
+        <p:blipFill>
+          <a:blip r:embed="rId3">
+            <a:extLst>
+              <a:ext uri="{28A0092B-C50C-407E-A947-70E740481C1C}">
+                <a14:useLocalDpi xmlns:a14="http://schemas.microsoft.com/office/drawing/2010/main" val="0"/>
+              </a:ext>
+            </a:extLst>
+          </a:blip>
+          <a:stretch>
+            <a:fillRect/>
+          </a:stretch>
+        </p:blipFill>
+        <p:spPr>
+          <a:xfrm>
+            <a:off x="2427236" y="0"/>
+            <a:ext cx="7337527" cy="1088288"/>
+          </a:xfrm>
+          <a:prstGeom prst="rect">
+            <a:avLst/>
+          </a:prstGeom>
+        </p:spPr>
+      </p:pic>
     </p:spTree>
     <p:extLst>
       <p:ext uri="{BB962C8B-B14F-4D97-AF65-F5344CB8AC3E}">
@@ -3897,6 +3933,42 @@
           </a:p>
         </p:txBody>
       </p:sp>
+      <p:pic>
+        <p:nvPicPr>
+          <p:cNvPr id="2" name="Picture 1" descr="A close-up of a tag&#10;&#10;AI-generated content may be incorrect.">
+            <a:extLst>
+              <a:ext uri="{FF2B5EF4-FFF2-40B4-BE49-F238E27FC236}">
+                <a16:creationId xmlns:a16="http://schemas.microsoft.com/office/drawing/2014/main" id="{4BFC3412-7F3C-1B48-ED3A-DB656EA20E24}"/>
+              </a:ext>
+            </a:extLst>
+          </p:cNvPr>
+          <p:cNvPicPr>
+            <a:picLocks noChangeAspect="1"/>
+          </p:cNvPicPr>
+          <p:nvPr/>
+        </p:nvPicPr>
+        <p:blipFill>
+          <a:blip r:embed="rId3">
+            <a:extLst>
+              <a:ext uri="{28A0092B-C50C-407E-A947-70E740481C1C}">
+                <a14:useLocalDpi xmlns:a14="http://schemas.microsoft.com/office/drawing/2010/main" val="0"/>
+              </a:ext>
+            </a:extLst>
+          </a:blip>
+          <a:stretch>
+            <a:fillRect/>
+          </a:stretch>
+        </p:blipFill>
+        <p:spPr>
+          <a:xfrm>
+            <a:off x="2427236" y="0"/>
+            <a:ext cx="7337527" cy="1088288"/>
+          </a:xfrm>
+          <a:prstGeom prst="rect">
+            <a:avLst/>
+          </a:prstGeom>
+        </p:spPr>
+      </p:pic>
     </p:spTree>
     <p:extLst>
       <p:ext uri="{BB962C8B-B14F-4D97-AF65-F5344CB8AC3E}">
@@ -3992,6 +4064,42 @@
           </a:p>
         </p:txBody>
       </p:sp>
+      <p:pic>
+        <p:nvPicPr>
+          <p:cNvPr id="2" name="Picture 1" descr="A close-up of a tag&#10;&#10;AI-generated content may be incorrect.">
+            <a:extLst>
+              <a:ext uri="{FF2B5EF4-FFF2-40B4-BE49-F238E27FC236}">
+                <a16:creationId xmlns:a16="http://schemas.microsoft.com/office/drawing/2014/main" id="{91664387-FBBA-88DD-B5C3-3412C0D203DD}"/>
+              </a:ext>
+            </a:extLst>
+          </p:cNvPr>
+          <p:cNvPicPr>
+            <a:picLocks noChangeAspect="1"/>
+          </p:cNvPicPr>
+          <p:nvPr/>
+        </p:nvPicPr>
+        <p:blipFill>
+          <a:blip r:embed="rId3">
+            <a:extLst>
+              <a:ext uri="{28A0092B-C50C-407E-A947-70E740481C1C}">
+                <a14:useLocalDpi xmlns:a14="http://schemas.microsoft.com/office/drawing/2010/main" val="0"/>
+              </a:ext>
+            </a:extLst>
+          </a:blip>
+          <a:stretch>
+            <a:fillRect/>
+          </a:stretch>
+        </p:blipFill>
+        <p:spPr>
+          <a:xfrm>
+            <a:off x="2427236" y="0"/>
+            <a:ext cx="7337527" cy="1088288"/>
+          </a:xfrm>
+          <a:prstGeom prst="rect">
+            <a:avLst/>
+          </a:prstGeom>
+        </p:spPr>
+      </p:pic>
     </p:spTree>
     <p:extLst>
       <p:ext uri="{BB962C8B-B14F-4D97-AF65-F5344CB8AC3E}">
@@ -4501,6 +4609,42 @@
           </a:p>
         </p:txBody>
       </p:sp>
+      <p:pic>
+        <p:nvPicPr>
+          <p:cNvPr id="3" name="Picture 2" descr="A close-up of a tag&#10;&#10;AI-generated content may be incorrect.">
+            <a:extLst>
+              <a:ext uri="{FF2B5EF4-FFF2-40B4-BE49-F238E27FC236}">
+                <a16:creationId xmlns:a16="http://schemas.microsoft.com/office/drawing/2014/main" id="{E212927B-B76B-FD81-C12D-70B77AF47BF4}"/>
+              </a:ext>
+            </a:extLst>
+          </p:cNvPr>
+          <p:cNvPicPr>
+            <a:picLocks noChangeAspect="1"/>
+          </p:cNvPicPr>
+          <p:nvPr/>
+        </p:nvPicPr>
+        <p:blipFill>
+          <a:blip r:embed="rId3">
+            <a:extLst>
+              <a:ext uri="{28A0092B-C50C-407E-A947-70E740481C1C}">
+                <a14:useLocalDpi xmlns:a14="http://schemas.microsoft.com/office/drawing/2010/main" val="0"/>
+              </a:ext>
+            </a:extLst>
+          </a:blip>
+          <a:stretch>
+            <a:fillRect/>
+          </a:stretch>
+        </p:blipFill>
+        <p:spPr>
+          <a:xfrm>
+            <a:off x="2427236" y="0"/>
+            <a:ext cx="7337527" cy="1088288"/>
+          </a:xfrm>
+          <a:prstGeom prst="rect">
+            <a:avLst/>
+          </a:prstGeom>
+        </p:spPr>
+      </p:pic>
     </p:spTree>
     <p:extLst>
       <p:ext uri="{BB962C8B-B14F-4D97-AF65-F5344CB8AC3E}">
@@ -4596,6 +4740,42 @@
           </a:p>
         </p:txBody>
       </p:sp>
+      <p:pic>
+        <p:nvPicPr>
+          <p:cNvPr id="4" name="Picture 3" descr="A black and white drawing of a website&#10;&#10;AI-generated content may be incorrect.">
+            <a:extLst>
+              <a:ext uri="{FF2B5EF4-FFF2-40B4-BE49-F238E27FC236}">
+                <a16:creationId xmlns:a16="http://schemas.microsoft.com/office/drawing/2014/main" id="{393AEF5D-F889-7DB9-AA50-EDCD7B1592F4}"/>
+              </a:ext>
+            </a:extLst>
+          </p:cNvPr>
+          <p:cNvPicPr>
+            <a:picLocks noChangeAspect="1"/>
+          </p:cNvPicPr>
+          <p:nvPr/>
+        </p:nvPicPr>
+        <p:blipFill>
+          <a:blip r:embed="rId3">
+            <a:extLst>
+              <a:ext uri="{28A0092B-C50C-407E-A947-70E740481C1C}">
+                <a14:useLocalDpi xmlns:a14="http://schemas.microsoft.com/office/drawing/2010/main" val="0"/>
+              </a:ext>
+            </a:extLst>
+          </a:blip>
+          <a:stretch>
+            <a:fillRect/>
+          </a:stretch>
+        </p:blipFill>
+        <p:spPr>
+          <a:xfrm>
+            <a:off x="2220516" y="0"/>
+            <a:ext cx="7750966" cy="5536404"/>
+          </a:xfrm>
+          <a:prstGeom prst="rect">
+            <a:avLst/>
+          </a:prstGeom>
+        </p:spPr>
+      </p:pic>
     </p:spTree>
     <p:extLst>
       <p:ext uri="{BB962C8B-B14F-4D97-AF65-F5344CB8AC3E}">
@@ -4691,6 +4871,42 @@
           </a:p>
         </p:txBody>
       </p:sp>
+      <p:pic>
+        <p:nvPicPr>
+          <p:cNvPr id="2" name="Picture 1" descr="A close-up of a tag&#10;&#10;AI-generated content may be incorrect.">
+            <a:extLst>
+              <a:ext uri="{FF2B5EF4-FFF2-40B4-BE49-F238E27FC236}">
+                <a16:creationId xmlns:a16="http://schemas.microsoft.com/office/drawing/2014/main" id="{5A58F2CE-25A5-577E-0FE8-2F821BB8FCE2}"/>
+              </a:ext>
+            </a:extLst>
+          </p:cNvPr>
+          <p:cNvPicPr>
+            <a:picLocks noChangeAspect="1"/>
+          </p:cNvPicPr>
+          <p:nvPr/>
+        </p:nvPicPr>
+        <p:blipFill>
+          <a:blip r:embed="rId3">
+            <a:extLst>
+              <a:ext uri="{28A0092B-C50C-407E-A947-70E740481C1C}">
+                <a14:useLocalDpi xmlns:a14="http://schemas.microsoft.com/office/drawing/2010/main" val="0"/>
+              </a:ext>
+            </a:extLst>
+          </a:blip>
+          <a:stretch>
+            <a:fillRect/>
+          </a:stretch>
+        </p:blipFill>
+        <p:spPr>
+          <a:xfrm>
+            <a:off x="2427236" y="0"/>
+            <a:ext cx="7337527" cy="1088288"/>
+          </a:xfrm>
+          <a:prstGeom prst="rect">
+            <a:avLst/>
+          </a:prstGeom>
+        </p:spPr>
+      </p:pic>
     </p:spTree>
     <p:extLst>
       <p:ext uri="{BB962C8B-B14F-4D97-AF65-F5344CB8AC3E}">
@@ -4786,6 +5002,42 @@
           </a:p>
         </p:txBody>
       </p:sp>
+      <p:pic>
+        <p:nvPicPr>
+          <p:cNvPr id="2" name="Picture 1" descr="A close-up of a tag&#10;&#10;AI-generated content may be incorrect.">
+            <a:extLst>
+              <a:ext uri="{FF2B5EF4-FFF2-40B4-BE49-F238E27FC236}">
+                <a16:creationId xmlns:a16="http://schemas.microsoft.com/office/drawing/2014/main" id="{0F631D0C-335D-8168-DAC0-29F6A8114F45}"/>
+              </a:ext>
+            </a:extLst>
+          </p:cNvPr>
+          <p:cNvPicPr>
+            <a:picLocks noChangeAspect="1"/>
+          </p:cNvPicPr>
+          <p:nvPr/>
+        </p:nvPicPr>
+        <p:blipFill>
+          <a:blip r:embed="rId3">
+            <a:extLst>
+              <a:ext uri="{28A0092B-C50C-407E-A947-70E740481C1C}">
+                <a14:useLocalDpi xmlns:a14="http://schemas.microsoft.com/office/drawing/2010/main" val="0"/>
+              </a:ext>
+            </a:extLst>
+          </a:blip>
+          <a:stretch>
+            <a:fillRect/>
+          </a:stretch>
+        </p:blipFill>
+        <p:spPr>
+          <a:xfrm>
+            <a:off x="2427236" y="0"/>
+            <a:ext cx="7337527" cy="1088288"/>
+          </a:xfrm>
+          <a:prstGeom prst="rect">
+            <a:avLst/>
+          </a:prstGeom>
+        </p:spPr>
+      </p:pic>
     </p:spTree>
     <p:extLst>
       <p:ext uri="{BB962C8B-B14F-4D97-AF65-F5344CB8AC3E}">
@@ -4881,6 +5133,42 @@
           </a:p>
         </p:txBody>
       </p:sp>
+      <p:pic>
+        <p:nvPicPr>
+          <p:cNvPr id="2" name="Picture 1" descr="A close-up of a tag&#10;&#10;AI-generated content may be incorrect.">
+            <a:extLst>
+              <a:ext uri="{FF2B5EF4-FFF2-40B4-BE49-F238E27FC236}">
+                <a16:creationId xmlns:a16="http://schemas.microsoft.com/office/drawing/2014/main" id="{61D96EC5-2CB2-CA51-24DD-CD30FA696108}"/>
+              </a:ext>
+            </a:extLst>
+          </p:cNvPr>
+          <p:cNvPicPr>
+            <a:picLocks noChangeAspect="1"/>
+          </p:cNvPicPr>
+          <p:nvPr/>
+        </p:nvPicPr>
+        <p:blipFill>
+          <a:blip r:embed="rId3">
+            <a:extLst>
+              <a:ext uri="{28A0092B-C50C-407E-A947-70E740481C1C}">
+                <a14:useLocalDpi xmlns:a14="http://schemas.microsoft.com/office/drawing/2010/main" val="0"/>
+              </a:ext>
+            </a:extLst>
+          </a:blip>
+          <a:stretch>
+            <a:fillRect/>
+          </a:stretch>
+        </p:blipFill>
+        <p:spPr>
+          <a:xfrm>
+            <a:off x="2427236" y="0"/>
+            <a:ext cx="7337527" cy="1088288"/>
+          </a:xfrm>
+          <a:prstGeom prst="rect">
+            <a:avLst/>
+          </a:prstGeom>
+        </p:spPr>
+      </p:pic>
     </p:spTree>
     <p:extLst>
       <p:ext uri="{BB962C8B-B14F-4D97-AF65-F5344CB8AC3E}">
@@ -5005,6 +5293,42 @@
           </a:p>
         </p:txBody>
       </p:sp>
+      <p:pic>
+        <p:nvPicPr>
+          <p:cNvPr id="2" name="Picture 1" descr="A close-up of a tag&#10;&#10;AI-generated content may be incorrect.">
+            <a:extLst>
+              <a:ext uri="{FF2B5EF4-FFF2-40B4-BE49-F238E27FC236}">
+                <a16:creationId xmlns:a16="http://schemas.microsoft.com/office/drawing/2014/main" id="{ED603D93-E139-F040-2177-53A1B9007233}"/>
+              </a:ext>
+            </a:extLst>
+          </p:cNvPr>
+          <p:cNvPicPr>
+            <a:picLocks noChangeAspect="1"/>
+          </p:cNvPicPr>
+          <p:nvPr/>
+        </p:nvPicPr>
+        <p:blipFill>
+          <a:blip r:embed="rId4">
+            <a:extLst>
+              <a:ext uri="{28A0092B-C50C-407E-A947-70E740481C1C}">
+                <a14:useLocalDpi xmlns:a14="http://schemas.microsoft.com/office/drawing/2010/main" val="0"/>
+              </a:ext>
+            </a:extLst>
+          </a:blip>
+          <a:stretch>
+            <a:fillRect/>
+          </a:stretch>
+        </p:blipFill>
+        <p:spPr>
+          <a:xfrm>
+            <a:off x="2427236" y="0"/>
+            <a:ext cx="7337527" cy="1088288"/>
+          </a:xfrm>
+          <a:prstGeom prst="rect">
+            <a:avLst/>
+          </a:prstGeom>
+        </p:spPr>
+      </p:pic>
     </p:spTree>
     <p:extLst>
       <p:ext uri="{BB962C8B-B14F-4D97-AF65-F5344CB8AC3E}">

</xml_diff>

<commit_message>
goals and purpose update
</commit_message>
<xml_diff>
--- a/Documentation/Prototype Assignment - Group 2.pptx
+++ b/Documentation/Prototype Assignment - Group 2.pptx
@@ -2,7 +2,7 @@
 <file path=ppt/presentation.xml><?xml version="1.0" encoding="utf-8"?>
 <p:presentation xmlns:a="http://schemas.openxmlformats.org/drawingml/2006/main" xmlns:r="http://schemas.openxmlformats.org/officeDocument/2006/relationships" xmlns:p="http://schemas.openxmlformats.org/presentationml/2006/main" saveSubsetFonts="1">
   <p:sldMasterIdLst>
-    <p:sldMasterId id="2147483648" r:id="rId1"/>
+    <p:sldMasterId id="2147483684" r:id="rId1"/>
   </p:sldMasterIdLst>
   <p:sldIdLst>
     <p:sldId id="256" r:id="rId2"/>
@@ -393,6 +393,3078 @@
 </pc:chgInfo>
 </file>
 
+<file path=ppt/diagrams/colors1.xml><?xml version="1.0" encoding="utf-8"?>
+<dgm:colorsDef xmlns:dgm="http://schemas.openxmlformats.org/drawingml/2006/diagram" xmlns:a="http://schemas.openxmlformats.org/drawingml/2006/main" uniqueId="urn:microsoft.com/office/officeart/2005/8/colors/accent1_2">
+  <dgm:title val=""/>
+  <dgm:desc val=""/>
+  <dgm:catLst>
+    <dgm:cat type="accent1" pri="11200"/>
+  </dgm:catLst>
+  <dgm:styleLbl name="node0">
+    <dgm:fillClrLst meth="repeat">
+      <a:schemeClr val="accent1"/>
+    </dgm:fillClrLst>
+    <dgm:linClrLst meth="repeat">
+      <a:schemeClr val="lt1"/>
+    </dgm:linClrLst>
+    <dgm:effectClrLst/>
+    <dgm:txLinClrLst/>
+    <dgm:txFillClrLst/>
+    <dgm:txEffectClrLst/>
+  </dgm:styleLbl>
+  <dgm:styleLbl name="alignNode1">
+    <dgm:fillClrLst meth="repeat">
+      <a:schemeClr val="accent1"/>
+    </dgm:fillClrLst>
+    <dgm:linClrLst meth="repeat">
+      <a:schemeClr val="accent1"/>
+    </dgm:linClrLst>
+    <dgm:effectClrLst/>
+    <dgm:txLinClrLst/>
+    <dgm:txFillClrLst/>
+    <dgm:txEffectClrLst/>
+  </dgm:styleLbl>
+  <dgm:styleLbl name="node1">
+    <dgm:fillClrLst meth="repeat">
+      <a:schemeClr val="accent1"/>
+    </dgm:fillClrLst>
+    <dgm:linClrLst meth="repeat">
+      <a:schemeClr val="lt1"/>
+    </dgm:linClrLst>
+    <dgm:effectClrLst/>
+    <dgm:txLinClrLst/>
+    <dgm:txFillClrLst/>
+    <dgm:txEffectClrLst/>
+  </dgm:styleLbl>
+  <dgm:styleLbl name="lnNode1">
+    <dgm:fillClrLst meth="repeat">
+      <a:schemeClr val="accent1"/>
+    </dgm:fillClrLst>
+    <dgm:linClrLst meth="repeat">
+      <a:schemeClr val="lt1"/>
+    </dgm:linClrLst>
+    <dgm:effectClrLst/>
+    <dgm:txLinClrLst/>
+    <dgm:txFillClrLst/>
+    <dgm:txEffectClrLst/>
+  </dgm:styleLbl>
+  <dgm:styleLbl name="vennNode1">
+    <dgm:fillClrLst meth="repeat">
+      <a:schemeClr val="accent1">
+        <a:alpha val="50000"/>
+      </a:schemeClr>
+    </dgm:fillClrLst>
+    <dgm:linClrLst meth="repeat">
+      <a:schemeClr val="lt1"/>
+    </dgm:linClrLst>
+    <dgm:effectClrLst/>
+    <dgm:txLinClrLst/>
+    <dgm:txFillClrLst/>
+    <dgm:txEffectClrLst/>
+  </dgm:styleLbl>
+  <dgm:styleLbl name="node2">
+    <dgm:fillClrLst meth="repeat">
+      <a:schemeClr val="accent1"/>
+    </dgm:fillClrLst>
+    <dgm:linClrLst meth="repeat">
+      <a:schemeClr val="lt1"/>
+    </dgm:linClrLst>
+    <dgm:effectClrLst/>
+    <dgm:txLinClrLst/>
+    <dgm:txFillClrLst/>
+    <dgm:txEffectClrLst/>
+  </dgm:styleLbl>
+  <dgm:styleLbl name="node3">
+    <dgm:fillClrLst meth="repeat">
+      <a:schemeClr val="accent1"/>
+    </dgm:fillClrLst>
+    <dgm:linClrLst meth="repeat">
+      <a:schemeClr val="lt1"/>
+    </dgm:linClrLst>
+    <dgm:effectClrLst/>
+    <dgm:txLinClrLst/>
+    <dgm:txFillClrLst/>
+    <dgm:txEffectClrLst/>
+  </dgm:styleLbl>
+  <dgm:styleLbl name="node4">
+    <dgm:fillClrLst meth="repeat">
+      <a:schemeClr val="accent1"/>
+    </dgm:fillClrLst>
+    <dgm:linClrLst meth="repeat">
+      <a:schemeClr val="lt1"/>
+    </dgm:linClrLst>
+    <dgm:effectClrLst/>
+    <dgm:txLinClrLst/>
+    <dgm:txFillClrLst/>
+    <dgm:txEffectClrLst/>
+  </dgm:styleLbl>
+  <dgm:styleLbl name="fgImgPlace1">
+    <dgm:fillClrLst meth="repeat">
+      <a:schemeClr val="accent1">
+        <a:tint val="50000"/>
+      </a:schemeClr>
+    </dgm:fillClrLst>
+    <dgm:linClrLst meth="repeat">
+      <a:schemeClr val="lt1"/>
+    </dgm:linClrLst>
+    <dgm:effectClrLst/>
+    <dgm:txLinClrLst/>
+    <dgm:txFillClrLst meth="repeat">
+      <a:schemeClr val="lt1"/>
+    </dgm:txFillClrLst>
+    <dgm:txEffectClrLst/>
+  </dgm:styleLbl>
+  <dgm:styleLbl name="alignImgPlace1">
+    <dgm:fillClrLst meth="repeat">
+      <a:schemeClr val="accent1">
+        <a:tint val="50000"/>
+      </a:schemeClr>
+    </dgm:fillClrLst>
+    <dgm:linClrLst meth="repeat">
+      <a:schemeClr val="lt1"/>
+    </dgm:linClrLst>
+    <dgm:effectClrLst/>
+    <dgm:txLinClrLst/>
+    <dgm:txFillClrLst meth="repeat">
+      <a:schemeClr val="lt1"/>
+    </dgm:txFillClrLst>
+    <dgm:txEffectClrLst/>
+  </dgm:styleLbl>
+  <dgm:styleLbl name="bgImgPlace1">
+    <dgm:fillClrLst meth="repeat">
+      <a:schemeClr val="accent1">
+        <a:tint val="50000"/>
+      </a:schemeClr>
+    </dgm:fillClrLst>
+    <dgm:linClrLst meth="repeat">
+      <a:schemeClr val="lt1"/>
+    </dgm:linClrLst>
+    <dgm:effectClrLst/>
+    <dgm:txLinClrLst/>
+    <dgm:txFillClrLst meth="repeat">
+      <a:schemeClr val="lt1"/>
+    </dgm:txFillClrLst>
+    <dgm:txEffectClrLst/>
+  </dgm:styleLbl>
+  <dgm:styleLbl name="sibTrans2D1">
+    <dgm:fillClrLst meth="repeat">
+      <a:schemeClr val="accent1">
+        <a:tint val="60000"/>
+      </a:schemeClr>
+    </dgm:fillClrLst>
+    <dgm:linClrLst meth="repeat">
+      <a:schemeClr val="accent1">
+        <a:tint val="60000"/>
+      </a:schemeClr>
+    </dgm:linClrLst>
+    <dgm:effectClrLst/>
+    <dgm:txLinClrLst/>
+    <dgm:txFillClrLst/>
+    <dgm:txEffectClrLst/>
+  </dgm:styleLbl>
+  <dgm:styleLbl name="fgSibTrans2D1">
+    <dgm:fillClrLst meth="repeat">
+      <a:schemeClr val="accent1">
+        <a:tint val="60000"/>
+      </a:schemeClr>
+    </dgm:fillClrLst>
+    <dgm:linClrLst meth="repeat">
+      <a:schemeClr val="accent1">
+        <a:tint val="60000"/>
+      </a:schemeClr>
+    </dgm:linClrLst>
+    <dgm:effectClrLst/>
+    <dgm:txLinClrLst/>
+    <dgm:txFillClrLst/>
+    <dgm:txEffectClrLst/>
+  </dgm:styleLbl>
+  <dgm:styleLbl name="bgSibTrans2D1">
+    <dgm:fillClrLst meth="repeat">
+      <a:schemeClr val="accent1">
+        <a:tint val="60000"/>
+      </a:schemeClr>
+    </dgm:fillClrLst>
+    <dgm:linClrLst meth="repeat">
+      <a:schemeClr val="accent1">
+        <a:tint val="60000"/>
+      </a:schemeClr>
+    </dgm:linClrLst>
+    <dgm:effectClrLst/>
+    <dgm:txLinClrLst/>
+    <dgm:txFillClrLst/>
+    <dgm:txEffectClrLst/>
+  </dgm:styleLbl>
+  <dgm:styleLbl name="sibTrans1D1">
+    <dgm:fillClrLst meth="repeat">
+      <a:schemeClr val="accent1"/>
+    </dgm:fillClrLst>
+    <dgm:linClrLst meth="repeat">
+      <a:schemeClr val="accent1"/>
+    </dgm:linClrLst>
+    <dgm:effectClrLst/>
+    <dgm:txLinClrLst/>
+    <dgm:txFillClrLst meth="repeat">
+      <a:schemeClr val="tx1"/>
+    </dgm:txFillClrLst>
+    <dgm:txEffectClrLst/>
+  </dgm:styleLbl>
+  <dgm:styleLbl name="callout">
+    <dgm:fillClrLst meth="repeat">
+      <a:schemeClr val="accent1"/>
+    </dgm:fillClrLst>
+    <dgm:linClrLst meth="repeat">
+      <a:schemeClr val="accent1">
+        <a:tint val="50000"/>
+      </a:schemeClr>
+    </dgm:linClrLst>
+    <dgm:effectClrLst/>
+    <dgm:txLinClrLst/>
+    <dgm:txFillClrLst meth="repeat">
+      <a:schemeClr val="tx1"/>
+    </dgm:txFillClrLst>
+    <dgm:txEffectClrLst/>
+  </dgm:styleLbl>
+  <dgm:styleLbl name="asst0">
+    <dgm:fillClrLst meth="repeat">
+      <a:schemeClr val="accent1"/>
+    </dgm:fillClrLst>
+    <dgm:linClrLst meth="repeat">
+      <a:schemeClr val="lt1"/>
+    </dgm:linClrLst>
+    <dgm:effectClrLst/>
+    <dgm:txLinClrLst/>
+    <dgm:txFillClrLst/>
+    <dgm:txEffectClrLst/>
+  </dgm:styleLbl>
+  <dgm:styleLbl name="asst1">
+    <dgm:fillClrLst meth="repeat">
+      <a:schemeClr val="accent1"/>
+    </dgm:fillClrLst>
+    <dgm:linClrLst meth="repeat">
+      <a:schemeClr val="lt1"/>
+    </dgm:linClrLst>
+    <dgm:effectClrLst/>
+    <dgm:txLinClrLst/>
+    <dgm:txFillClrLst/>
+    <dgm:txEffectClrLst/>
+  </dgm:styleLbl>
+  <dgm:styleLbl name="asst2">
+    <dgm:fillClrLst meth="repeat">
+      <a:schemeClr val="accent1"/>
+    </dgm:fillClrLst>
+    <dgm:linClrLst meth="repeat">
+      <a:schemeClr val="lt1"/>
+    </dgm:linClrLst>
+    <dgm:effectClrLst/>
+    <dgm:txLinClrLst/>
+    <dgm:txFillClrLst/>
+    <dgm:txEffectClrLst/>
+  </dgm:styleLbl>
+  <dgm:styleLbl name="asst3">
+    <dgm:fillClrLst meth="repeat">
+      <a:schemeClr val="accent1"/>
+    </dgm:fillClrLst>
+    <dgm:linClrLst meth="repeat">
+      <a:schemeClr val="lt1"/>
+    </dgm:linClrLst>
+    <dgm:effectClrLst/>
+    <dgm:txLinClrLst/>
+    <dgm:txFillClrLst/>
+    <dgm:txEffectClrLst/>
+  </dgm:styleLbl>
+  <dgm:styleLbl name="asst4">
+    <dgm:fillClrLst meth="repeat">
+      <a:schemeClr val="accent1"/>
+    </dgm:fillClrLst>
+    <dgm:linClrLst meth="repeat">
+      <a:schemeClr val="lt1"/>
+    </dgm:linClrLst>
+    <dgm:effectClrLst/>
+    <dgm:txLinClrLst/>
+    <dgm:txFillClrLst/>
+    <dgm:txEffectClrLst/>
+  </dgm:styleLbl>
+  <dgm:styleLbl name="parChTrans2D1">
+    <dgm:fillClrLst meth="repeat">
+      <a:schemeClr val="accent1">
+        <a:tint val="60000"/>
+      </a:schemeClr>
+    </dgm:fillClrLst>
+    <dgm:linClrLst meth="repeat">
+      <a:schemeClr val="accent1">
+        <a:tint val="60000"/>
+      </a:schemeClr>
+    </dgm:linClrLst>
+    <dgm:effectClrLst/>
+    <dgm:txLinClrLst/>
+    <dgm:txFillClrLst meth="repeat">
+      <a:schemeClr val="lt1"/>
+    </dgm:txFillClrLst>
+    <dgm:txEffectClrLst/>
+  </dgm:styleLbl>
+  <dgm:styleLbl name="parChTrans2D2">
+    <dgm:fillClrLst meth="repeat">
+      <a:schemeClr val="accent1"/>
+    </dgm:fillClrLst>
+    <dgm:linClrLst meth="repeat">
+      <a:schemeClr val="accent1"/>
+    </dgm:linClrLst>
+    <dgm:effectClrLst/>
+    <dgm:txLinClrLst/>
+    <dgm:txFillClrLst meth="repeat">
+      <a:schemeClr val="lt1"/>
+    </dgm:txFillClrLst>
+    <dgm:txEffectClrLst/>
+  </dgm:styleLbl>
+  <dgm:styleLbl name="parChTrans2D3">
+    <dgm:fillClrLst meth="repeat">
+      <a:schemeClr val="accent1"/>
+    </dgm:fillClrLst>
+    <dgm:linClrLst meth="repeat">
+      <a:schemeClr val="accent1"/>
+    </dgm:linClrLst>
+    <dgm:effectClrLst/>
+    <dgm:txLinClrLst/>
+    <dgm:txFillClrLst meth="repeat">
+      <a:schemeClr val="lt1"/>
+    </dgm:txFillClrLst>
+    <dgm:txEffectClrLst/>
+  </dgm:styleLbl>
+  <dgm:styleLbl name="parChTrans2D4">
+    <dgm:fillClrLst meth="repeat">
+      <a:schemeClr val="accent1"/>
+    </dgm:fillClrLst>
+    <dgm:linClrLst meth="repeat">
+      <a:schemeClr val="accent1"/>
+    </dgm:linClrLst>
+    <dgm:effectClrLst/>
+    <dgm:txLinClrLst/>
+    <dgm:txFillClrLst meth="repeat">
+      <a:schemeClr val="lt1"/>
+    </dgm:txFillClrLst>
+    <dgm:txEffectClrLst/>
+  </dgm:styleLbl>
+  <dgm:styleLbl name="parChTrans1D1">
+    <dgm:fillClrLst meth="repeat">
+      <a:schemeClr val="accent1"/>
+    </dgm:fillClrLst>
+    <dgm:linClrLst meth="repeat">
+      <a:schemeClr val="accent1">
+        <a:shade val="60000"/>
+      </a:schemeClr>
+    </dgm:linClrLst>
+    <dgm:effectClrLst/>
+    <dgm:txLinClrLst/>
+    <dgm:txFillClrLst meth="repeat">
+      <a:schemeClr val="tx1"/>
+    </dgm:txFillClrLst>
+    <dgm:txEffectClrLst/>
+  </dgm:styleLbl>
+  <dgm:styleLbl name="parChTrans1D2">
+    <dgm:fillClrLst meth="repeat">
+      <a:schemeClr val="accent1"/>
+    </dgm:fillClrLst>
+    <dgm:linClrLst meth="repeat">
+      <a:schemeClr val="accent1">
+        <a:shade val="60000"/>
+      </a:schemeClr>
+    </dgm:linClrLst>
+    <dgm:effectClrLst/>
+    <dgm:txLinClrLst/>
+    <dgm:txFillClrLst meth="repeat">
+      <a:schemeClr val="tx1"/>
+    </dgm:txFillClrLst>
+    <dgm:txEffectClrLst/>
+  </dgm:styleLbl>
+  <dgm:styleLbl name="parChTrans1D3">
+    <dgm:fillClrLst meth="repeat">
+      <a:schemeClr val="accent1"/>
+    </dgm:fillClrLst>
+    <dgm:linClrLst meth="repeat">
+      <a:schemeClr val="accent1">
+        <a:shade val="80000"/>
+      </a:schemeClr>
+    </dgm:linClrLst>
+    <dgm:effectClrLst/>
+    <dgm:txLinClrLst/>
+    <dgm:txFillClrLst meth="repeat">
+      <a:schemeClr val="tx1"/>
+    </dgm:txFillClrLst>
+    <dgm:txEffectClrLst/>
+  </dgm:styleLbl>
+  <dgm:styleLbl name="parChTrans1D4">
+    <dgm:fillClrLst meth="repeat">
+      <a:schemeClr val="accent1"/>
+    </dgm:fillClrLst>
+    <dgm:linClrLst meth="repeat">
+      <a:schemeClr val="accent1">
+        <a:shade val="80000"/>
+      </a:schemeClr>
+    </dgm:linClrLst>
+    <dgm:effectClrLst/>
+    <dgm:txLinClrLst/>
+    <dgm:txFillClrLst meth="repeat">
+      <a:schemeClr val="tx1"/>
+    </dgm:txFillClrLst>
+    <dgm:txEffectClrLst/>
+  </dgm:styleLbl>
+  <dgm:styleLbl name="fgAcc1">
+    <dgm:fillClrLst meth="repeat">
+      <a:schemeClr val="lt1">
+        <a:alpha val="90000"/>
+      </a:schemeClr>
+    </dgm:fillClrLst>
+    <dgm:linClrLst meth="repeat">
+      <a:schemeClr val="accent1"/>
+    </dgm:linClrLst>
+    <dgm:effectClrLst/>
+    <dgm:txLinClrLst/>
+    <dgm:txFillClrLst meth="repeat">
+      <a:schemeClr val="dk1"/>
+    </dgm:txFillClrLst>
+    <dgm:txEffectClrLst/>
+  </dgm:styleLbl>
+  <dgm:styleLbl name="conFgAcc1">
+    <dgm:fillClrLst meth="repeat">
+      <a:schemeClr val="lt1">
+        <a:alpha val="90000"/>
+      </a:schemeClr>
+    </dgm:fillClrLst>
+    <dgm:linClrLst meth="repeat">
+      <a:schemeClr val="accent1"/>
+    </dgm:linClrLst>
+    <dgm:effectClrLst/>
+    <dgm:txLinClrLst/>
+    <dgm:txFillClrLst meth="repeat">
+      <a:schemeClr val="dk1"/>
+    </dgm:txFillClrLst>
+    <dgm:txEffectClrLst/>
+  </dgm:styleLbl>
+  <dgm:styleLbl name="alignAcc1">
+    <dgm:fillClrLst meth="repeat">
+      <a:schemeClr val="lt1">
+        <a:alpha val="90000"/>
+      </a:schemeClr>
+    </dgm:fillClrLst>
+    <dgm:linClrLst meth="repeat">
+      <a:schemeClr val="accent1"/>
+    </dgm:linClrLst>
+    <dgm:effectClrLst/>
+    <dgm:txLinClrLst/>
+    <dgm:txFillClrLst meth="repeat">
+      <a:schemeClr val="dk1"/>
+    </dgm:txFillClrLst>
+    <dgm:txEffectClrLst/>
+  </dgm:styleLbl>
+  <dgm:styleLbl name="trAlignAcc1">
+    <dgm:fillClrLst meth="repeat">
+      <a:schemeClr val="lt1">
+        <a:alpha val="40000"/>
+      </a:schemeClr>
+    </dgm:fillClrLst>
+    <dgm:linClrLst meth="repeat">
+      <a:schemeClr val="accent1"/>
+    </dgm:linClrLst>
+    <dgm:effectClrLst/>
+    <dgm:txLinClrLst/>
+    <dgm:txFillClrLst meth="repeat">
+      <a:schemeClr val="dk1"/>
+    </dgm:txFillClrLst>
+    <dgm:txEffectClrLst/>
+  </dgm:styleLbl>
+  <dgm:styleLbl name="bgAcc1">
+    <dgm:fillClrLst meth="repeat">
+      <a:schemeClr val="lt1">
+        <a:alpha val="90000"/>
+      </a:schemeClr>
+    </dgm:fillClrLst>
+    <dgm:linClrLst meth="repeat">
+      <a:schemeClr val="accent1"/>
+    </dgm:linClrLst>
+    <dgm:effectClrLst/>
+    <dgm:txLinClrLst/>
+    <dgm:txFillClrLst meth="repeat">
+      <a:schemeClr val="dk1"/>
+    </dgm:txFillClrLst>
+    <dgm:txEffectClrLst/>
+  </dgm:styleLbl>
+  <dgm:styleLbl name="solidFgAcc1">
+    <dgm:fillClrLst meth="repeat">
+      <a:schemeClr val="lt1"/>
+    </dgm:fillClrLst>
+    <dgm:linClrLst meth="repeat">
+      <a:schemeClr val="accent1"/>
+    </dgm:linClrLst>
+    <dgm:effectClrLst/>
+    <dgm:txLinClrLst/>
+    <dgm:txFillClrLst meth="repeat">
+      <a:schemeClr val="dk1"/>
+    </dgm:txFillClrLst>
+    <dgm:txEffectClrLst/>
+  </dgm:styleLbl>
+  <dgm:styleLbl name="solidAlignAcc1">
+    <dgm:fillClrLst meth="repeat">
+      <a:schemeClr val="lt1"/>
+    </dgm:fillClrLst>
+    <dgm:linClrLst meth="repeat">
+      <a:schemeClr val="accent1"/>
+    </dgm:linClrLst>
+    <dgm:effectClrLst/>
+    <dgm:txLinClrLst/>
+    <dgm:txFillClrLst meth="repeat">
+      <a:schemeClr val="dk1"/>
+    </dgm:txFillClrLst>
+    <dgm:txEffectClrLst/>
+  </dgm:styleLbl>
+  <dgm:styleLbl name="solidBgAcc1">
+    <dgm:fillClrLst meth="repeat">
+      <a:schemeClr val="lt1"/>
+    </dgm:fillClrLst>
+    <dgm:linClrLst meth="repeat">
+      <a:schemeClr val="accent1"/>
+    </dgm:linClrLst>
+    <dgm:effectClrLst/>
+    <dgm:txLinClrLst/>
+    <dgm:txFillClrLst meth="repeat">
+      <a:schemeClr val="dk1"/>
+    </dgm:txFillClrLst>
+    <dgm:txEffectClrLst/>
+  </dgm:styleLbl>
+  <dgm:styleLbl name="fgAccFollowNode1">
+    <dgm:fillClrLst meth="repeat">
+      <a:schemeClr val="accent1">
+        <a:alpha val="90000"/>
+        <a:tint val="40000"/>
+      </a:schemeClr>
+    </dgm:fillClrLst>
+    <dgm:linClrLst meth="repeat">
+      <a:schemeClr val="accent1">
+        <a:alpha val="90000"/>
+        <a:tint val="40000"/>
+      </a:schemeClr>
+    </dgm:linClrLst>
+    <dgm:effectClrLst/>
+    <dgm:txLinClrLst/>
+    <dgm:txFillClrLst meth="repeat">
+      <a:schemeClr val="dk1"/>
+    </dgm:txFillClrLst>
+    <dgm:txEffectClrLst/>
+  </dgm:styleLbl>
+  <dgm:styleLbl name="alignAccFollowNode1">
+    <dgm:fillClrLst meth="repeat">
+      <a:schemeClr val="accent1">
+        <a:alpha val="90000"/>
+        <a:tint val="40000"/>
+      </a:schemeClr>
+    </dgm:fillClrLst>
+    <dgm:linClrLst meth="repeat">
+      <a:schemeClr val="accent1">
+        <a:alpha val="90000"/>
+        <a:tint val="40000"/>
+      </a:schemeClr>
+    </dgm:linClrLst>
+    <dgm:effectClrLst/>
+    <dgm:txLinClrLst/>
+    <dgm:txFillClrLst meth="repeat">
+      <a:schemeClr val="dk1"/>
+    </dgm:txFillClrLst>
+    <dgm:txEffectClrLst/>
+  </dgm:styleLbl>
+  <dgm:styleLbl name="bgAccFollowNode1">
+    <dgm:fillClrLst meth="repeat">
+      <a:schemeClr val="accent1">
+        <a:alpha val="90000"/>
+        <a:tint val="40000"/>
+      </a:schemeClr>
+    </dgm:fillClrLst>
+    <dgm:linClrLst meth="repeat">
+      <a:schemeClr val="accent1">
+        <a:alpha val="90000"/>
+        <a:tint val="40000"/>
+      </a:schemeClr>
+    </dgm:linClrLst>
+    <dgm:effectClrLst/>
+    <dgm:txLinClrLst/>
+    <dgm:txFillClrLst meth="repeat">
+      <a:schemeClr val="dk1"/>
+    </dgm:txFillClrLst>
+    <dgm:txEffectClrLst/>
+  </dgm:styleLbl>
+  <dgm:styleLbl name="fgAcc0">
+    <dgm:fillClrLst meth="repeat">
+      <a:schemeClr val="lt1">
+        <a:alpha val="90000"/>
+      </a:schemeClr>
+    </dgm:fillClrLst>
+    <dgm:linClrLst meth="repeat">
+      <a:schemeClr val="accent1"/>
+    </dgm:linClrLst>
+    <dgm:effectClrLst/>
+    <dgm:txLinClrLst/>
+    <dgm:txFillClrLst meth="repeat">
+      <a:schemeClr val="dk1"/>
+    </dgm:txFillClrLst>
+    <dgm:txEffectClrLst/>
+  </dgm:styleLbl>
+  <dgm:styleLbl name="fgAcc2">
+    <dgm:fillClrLst meth="repeat">
+      <a:schemeClr val="lt1">
+        <a:alpha val="90000"/>
+      </a:schemeClr>
+    </dgm:fillClrLst>
+    <dgm:linClrLst meth="repeat">
+      <a:schemeClr val="accent1"/>
+    </dgm:linClrLst>
+    <dgm:effectClrLst/>
+    <dgm:txLinClrLst/>
+    <dgm:txFillClrLst meth="repeat">
+      <a:schemeClr val="dk1"/>
+    </dgm:txFillClrLst>
+    <dgm:txEffectClrLst/>
+  </dgm:styleLbl>
+  <dgm:styleLbl name="fgAcc3">
+    <dgm:fillClrLst meth="repeat">
+      <a:schemeClr val="lt1">
+        <a:alpha val="90000"/>
+      </a:schemeClr>
+    </dgm:fillClrLst>
+    <dgm:linClrLst meth="repeat">
+      <a:schemeClr val="accent1"/>
+    </dgm:linClrLst>
+    <dgm:effectClrLst/>
+    <dgm:txLinClrLst/>
+    <dgm:txFillClrLst meth="repeat">
+      <a:schemeClr val="dk1"/>
+    </dgm:txFillClrLst>
+    <dgm:txEffectClrLst/>
+  </dgm:styleLbl>
+  <dgm:styleLbl name="fgAcc4">
+    <dgm:fillClrLst meth="repeat">
+      <a:schemeClr val="lt1">
+        <a:alpha val="90000"/>
+      </a:schemeClr>
+    </dgm:fillClrLst>
+    <dgm:linClrLst meth="repeat">
+      <a:schemeClr val="accent1"/>
+    </dgm:linClrLst>
+    <dgm:effectClrLst/>
+    <dgm:txLinClrLst/>
+    <dgm:txFillClrLst meth="repeat">
+      <a:schemeClr val="dk1"/>
+    </dgm:txFillClrLst>
+    <dgm:txEffectClrLst/>
+  </dgm:styleLbl>
+  <dgm:styleLbl name="bgShp">
+    <dgm:fillClrLst meth="repeat">
+      <a:schemeClr val="accent1">
+        <a:tint val="40000"/>
+      </a:schemeClr>
+    </dgm:fillClrLst>
+    <dgm:linClrLst meth="repeat">
+      <a:schemeClr val="accent1"/>
+    </dgm:linClrLst>
+    <dgm:effectClrLst/>
+    <dgm:txLinClrLst/>
+    <dgm:txFillClrLst meth="repeat">
+      <a:schemeClr val="dk1"/>
+    </dgm:txFillClrLst>
+    <dgm:txEffectClrLst/>
+  </dgm:styleLbl>
+  <dgm:styleLbl name="dkBgShp">
+    <dgm:fillClrLst meth="repeat">
+      <a:schemeClr val="accent1">
+        <a:shade val="80000"/>
+      </a:schemeClr>
+    </dgm:fillClrLst>
+    <dgm:linClrLst meth="repeat">
+      <a:schemeClr val="accent1"/>
+    </dgm:linClrLst>
+    <dgm:effectClrLst/>
+    <dgm:txLinClrLst/>
+    <dgm:txFillClrLst meth="repeat">
+      <a:schemeClr val="lt1"/>
+    </dgm:txFillClrLst>
+    <dgm:txEffectClrLst/>
+  </dgm:styleLbl>
+  <dgm:styleLbl name="trBgShp">
+    <dgm:fillClrLst meth="repeat">
+      <a:schemeClr val="accent1">
+        <a:tint val="50000"/>
+        <a:alpha val="40000"/>
+      </a:schemeClr>
+    </dgm:fillClrLst>
+    <dgm:linClrLst meth="repeat">
+      <a:schemeClr val="accent1"/>
+    </dgm:linClrLst>
+    <dgm:effectClrLst/>
+    <dgm:txLinClrLst/>
+    <dgm:txFillClrLst meth="repeat">
+      <a:schemeClr val="lt1"/>
+    </dgm:txFillClrLst>
+    <dgm:txEffectClrLst/>
+  </dgm:styleLbl>
+  <dgm:styleLbl name="fgShp">
+    <dgm:fillClrLst meth="repeat">
+      <a:schemeClr val="accent1">
+        <a:tint val="60000"/>
+      </a:schemeClr>
+    </dgm:fillClrLst>
+    <dgm:linClrLst meth="repeat">
+      <a:schemeClr val="lt1"/>
+    </dgm:linClrLst>
+    <dgm:effectClrLst/>
+    <dgm:txLinClrLst/>
+    <dgm:txFillClrLst meth="repeat">
+      <a:schemeClr val="dk1"/>
+    </dgm:txFillClrLst>
+    <dgm:txEffectClrLst/>
+  </dgm:styleLbl>
+  <dgm:styleLbl name="revTx">
+    <dgm:fillClrLst meth="repeat">
+      <a:schemeClr val="lt1">
+        <a:alpha val="0"/>
+      </a:schemeClr>
+    </dgm:fillClrLst>
+    <dgm:linClrLst meth="repeat">
+      <a:schemeClr val="dk1">
+        <a:alpha val="0"/>
+      </a:schemeClr>
+    </dgm:linClrLst>
+    <dgm:effectClrLst/>
+    <dgm:txLinClrLst/>
+    <dgm:txFillClrLst meth="repeat">
+      <a:schemeClr val="tx1"/>
+    </dgm:txFillClrLst>
+    <dgm:txEffectClrLst/>
+  </dgm:styleLbl>
+</dgm:colorsDef>
+</file>
+
+<file path=ppt/diagrams/data1.xml><?xml version="1.0" encoding="utf-8"?>
+<dgm:dataModel xmlns:dgm="http://schemas.openxmlformats.org/drawingml/2006/diagram" xmlns:a="http://schemas.openxmlformats.org/drawingml/2006/main">
+  <dgm:ptLst>
+    <dgm:pt modelId="{4F15EE28-7E97-4988-8994-4280BBC1EF08}" type="doc">
+      <dgm:prSet loTypeId="urn:microsoft.com/office/officeart/2018/5/layout/IconCircleLabelList" loCatId="icon" qsTypeId="urn:microsoft.com/office/officeart/2005/8/quickstyle/simple1" qsCatId="simple" csTypeId="urn:microsoft.com/office/officeart/2005/8/colors/accent1_2" csCatId="accent1" phldr="1"/>
+      <dgm:spPr/>
+      <dgm:t>
+        <a:bodyPr/>
+        <a:lstStyle/>
+        <a:p>
+          <a:endParaRPr lang="en-US"/>
+        </a:p>
+      </dgm:t>
+    </dgm:pt>
+    <dgm:pt modelId="{CEF22688-9D10-45C6-9B74-ECA18DF6C06C}">
+      <dgm:prSet/>
+      <dgm:spPr/>
+      <dgm:t>
+        <a:bodyPr/>
+        <a:lstStyle/>
+        <a:p>
+          <a:pPr>
+            <a:lnSpc>
+              <a:spcPct val="100000"/>
+            </a:lnSpc>
+            <a:defRPr cap="all"/>
+          </a:pPr>
+          <a:r>
+            <a:rPr lang="en-US"/>
+            <a:t>The purpose of this document is to outline the technical design and development plan for the Moffat Bay Island Marina website.  </a:t>
+          </a:r>
+        </a:p>
+      </dgm:t>
+    </dgm:pt>
+    <dgm:pt modelId="{420C4F7F-B592-4922-A2B5-82C86671D682}" type="parTrans" cxnId="{A5DD6554-2D2C-4C5F-8CEE-6CD5A87380B2}">
+      <dgm:prSet/>
+      <dgm:spPr/>
+      <dgm:t>
+        <a:bodyPr/>
+        <a:lstStyle/>
+        <a:p>
+          <a:endParaRPr lang="en-US"/>
+        </a:p>
+      </dgm:t>
+    </dgm:pt>
+    <dgm:pt modelId="{F74A02E7-1F87-4676-B1A7-77106F05E66B}" type="sibTrans" cxnId="{A5DD6554-2D2C-4C5F-8CEE-6CD5A87380B2}">
+      <dgm:prSet/>
+      <dgm:spPr/>
+      <dgm:t>
+        <a:bodyPr/>
+        <a:lstStyle/>
+        <a:p>
+          <a:endParaRPr lang="en-US"/>
+        </a:p>
+      </dgm:t>
+    </dgm:pt>
+    <dgm:pt modelId="{B26B8C25-9ACE-4B86-B84B-8E23283B9851}">
+      <dgm:prSet/>
+      <dgm:spPr/>
+      <dgm:t>
+        <a:bodyPr/>
+        <a:lstStyle/>
+        <a:p>
+          <a:pPr>
+            <a:lnSpc>
+              <a:spcPct val="100000"/>
+            </a:lnSpc>
+            <a:defRPr cap="all"/>
+          </a:pPr>
+          <a:r>
+            <a:rPr lang="en-US"/>
+            <a:t>The website will allow customers to view marina information, register, log in, reserve long-term slips based on boat size, and manage their reservations.  It will also include functionality for waitlists when slips are unavailable. </a:t>
+          </a:r>
+        </a:p>
+      </dgm:t>
+    </dgm:pt>
+    <dgm:pt modelId="{307CB622-1F2E-4572-81D0-5FA2C14C498A}" type="parTrans" cxnId="{A9D5E52E-B0E0-468C-A4DD-C33E7F7A4BEA}">
+      <dgm:prSet/>
+      <dgm:spPr/>
+      <dgm:t>
+        <a:bodyPr/>
+        <a:lstStyle/>
+        <a:p>
+          <a:endParaRPr lang="en-US"/>
+        </a:p>
+      </dgm:t>
+    </dgm:pt>
+    <dgm:pt modelId="{BC41478C-2498-41AF-9EF8-A60BA4526C6A}" type="sibTrans" cxnId="{A9D5E52E-B0E0-468C-A4DD-C33E7F7A4BEA}">
+      <dgm:prSet/>
+      <dgm:spPr/>
+      <dgm:t>
+        <a:bodyPr/>
+        <a:lstStyle/>
+        <a:p>
+          <a:endParaRPr lang="en-US"/>
+        </a:p>
+      </dgm:t>
+    </dgm:pt>
+    <dgm:pt modelId="{1DABA7D2-8711-4EDA-8E4B-96B2D5854B3D}">
+      <dgm:prSet/>
+      <dgm:spPr/>
+      <dgm:t>
+        <a:bodyPr/>
+        <a:lstStyle/>
+        <a:p>
+          <a:pPr>
+            <a:lnSpc>
+              <a:spcPct val="100000"/>
+            </a:lnSpc>
+            <a:defRPr cap="all"/>
+          </a:pPr>
+          <a:r>
+            <a:rPr lang="en-US"/>
+            <a:t>This document will serve as a blueprint for the development, testing, and deployment of the website.</a:t>
+          </a:r>
+        </a:p>
+      </dgm:t>
+    </dgm:pt>
+    <dgm:pt modelId="{5629C543-1CBE-4616-B240-3CB4080A868B}" type="parTrans" cxnId="{A7940E44-9A7F-4053-AA12-36855CBD6A37}">
+      <dgm:prSet/>
+      <dgm:spPr/>
+      <dgm:t>
+        <a:bodyPr/>
+        <a:lstStyle/>
+        <a:p>
+          <a:endParaRPr lang="en-US"/>
+        </a:p>
+      </dgm:t>
+    </dgm:pt>
+    <dgm:pt modelId="{EBF01389-313D-4399-BB71-F057AB4C7922}" type="sibTrans" cxnId="{A7940E44-9A7F-4053-AA12-36855CBD6A37}">
+      <dgm:prSet/>
+      <dgm:spPr/>
+      <dgm:t>
+        <a:bodyPr/>
+        <a:lstStyle/>
+        <a:p>
+          <a:endParaRPr lang="en-US"/>
+        </a:p>
+      </dgm:t>
+    </dgm:pt>
+    <dgm:pt modelId="{87556439-71EA-4D3E-848C-54FC9811DF6F}">
+      <dgm:prSet/>
+      <dgm:spPr/>
+      <dgm:t>
+        <a:bodyPr/>
+        <a:lstStyle/>
+        <a:p>
+          <a:pPr>
+            <a:lnSpc>
+              <a:spcPct val="100000"/>
+            </a:lnSpc>
+            <a:defRPr cap="all"/>
+          </a:pPr>
+          <a:r>
+            <a:rPr lang="en-US"/>
+            <a:t>The goal is to create an easy to access Marina website that allows any user to book a slip with zero hassle along with creating a backend that will allow for easy management of the reservations.</a:t>
+          </a:r>
+        </a:p>
+      </dgm:t>
+    </dgm:pt>
+    <dgm:pt modelId="{689E2D95-C933-44DB-9948-3D179CD8FC93}" type="parTrans" cxnId="{8E28DCD1-B42B-432C-B53F-7BD7401294C2}">
+      <dgm:prSet/>
+      <dgm:spPr/>
+      <dgm:t>
+        <a:bodyPr/>
+        <a:lstStyle/>
+        <a:p>
+          <a:endParaRPr lang="en-US"/>
+        </a:p>
+      </dgm:t>
+    </dgm:pt>
+    <dgm:pt modelId="{DCE91253-EF74-4C03-BED8-551EB495745B}" type="sibTrans" cxnId="{8E28DCD1-B42B-432C-B53F-7BD7401294C2}">
+      <dgm:prSet/>
+      <dgm:spPr/>
+      <dgm:t>
+        <a:bodyPr/>
+        <a:lstStyle/>
+        <a:p>
+          <a:endParaRPr lang="en-US"/>
+        </a:p>
+      </dgm:t>
+    </dgm:pt>
+    <dgm:pt modelId="{B738B492-AC90-44C2-8E11-B1EFF57437DF}" type="pres">
+      <dgm:prSet presAssocID="{4F15EE28-7E97-4988-8994-4280BBC1EF08}" presName="root" presStyleCnt="0">
+        <dgm:presLayoutVars>
+          <dgm:dir/>
+          <dgm:resizeHandles val="exact"/>
+        </dgm:presLayoutVars>
+      </dgm:prSet>
+      <dgm:spPr/>
+    </dgm:pt>
+    <dgm:pt modelId="{E9A3E517-72FA-4BFB-9E87-84E424215C84}" type="pres">
+      <dgm:prSet presAssocID="{CEF22688-9D10-45C6-9B74-ECA18DF6C06C}" presName="compNode" presStyleCnt="0"/>
+      <dgm:spPr/>
+    </dgm:pt>
+    <dgm:pt modelId="{A3519EC2-BDFF-44FD-9CED-4782046A437D}" type="pres">
+      <dgm:prSet presAssocID="{CEF22688-9D10-45C6-9B74-ECA18DF6C06C}" presName="iconBgRect" presStyleLbl="bgShp" presStyleIdx="0" presStyleCnt="4"/>
+      <dgm:spPr/>
+    </dgm:pt>
+    <dgm:pt modelId="{6EEC2532-5DBB-43A9-8452-C95474912088}" type="pres">
+      <dgm:prSet presAssocID="{CEF22688-9D10-45C6-9B74-ECA18DF6C06C}" presName="iconRect" presStyleLbl="node1" presStyleIdx="0" presStyleCnt="4"/>
+      <dgm:spPr>
+        <a:blipFill>
+          <a:blip xmlns:r="http://schemas.openxmlformats.org/officeDocument/2006/relationships" r:embed="rId1">
+            <a:extLst>
+              <a:ext uri="{28A0092B-C50C-407E-A947-70E740481C1C}">
+                <a14:useLocalDpi xmlns:a14="http://schemas.microsoft.com/office/drawing/2010/main" val="0"/>
+              </a:ext>
+              <a:ext uri="{96DAC541-7B7A-43D3-8B79-37D633B846F1}">
+                <asvg:svgBlip xmlns:asvg="http://schemas.microsoft.com/office/drawing/2016/SVG/main" r:embed="rId2"/>
+              </a:ext>
+            </a:extLst>
+          </a:blip>
+          <a:stretch>
+            <a:fillRect/>
+          </a:stretch>
+        </a:blipFill>
+      </dgm:spPr>
+      <dgm:extLst>
+        <a:ext uri="{E40237B7-FDA0-4F09-8148-C483321AD2D9}">
+          <dgm14:cNvPr xmlns:dgm14="http://schemas.microsoft.com/office/drawing/2010/diagram" id="0" name="" descr="Anchor"/>
+        </a:ext>
+      </dgm:extLst>
+    </dgm:pt>
+    <dgm:pt modelId="{DCD60C61-23F2-4A5D-854E-1B4EBC3F7D4B}" type="pres">
+      <dgm:prSet presAssocID="{CEF22688-9D10-45C6-9B74-ECA18DF6C06C}" presName="spaceRect" presStyleCnt="0"/>
+      <dgm:spPr/>
+    </dgm:pt>
+    <dgm:pt modelId="{C7AE0236-A325-4DC9-8344-89115C6DA3E4}" type="pres">
+      <dgm:prSet presAssocID="{CEF22688-9D10-45C6-9B74-ECA18DF6C06C}" presName="textRect" presStyleLbl="revTx" presStyleIdx="0" presStyleCnt="4">
+        <dgm:presLayoutVars>
+          <dgm:chMax val="1"/>
+          <dgm:chPref val="1"/>
+        </dgm:presLayoutVars>
+      </dgm:prSet>
+      <dgm:spPr/>
+    </dgm:pt>
+    <dgm:pt modelId="{6CA9B14B-8C82-4170-8D8C-2E1B22BA4A42}" type="pres">
+      <dgm:prSet presAssocID="{F74A02E7-1F87-4676-B1A7-77106F05E66B}" presName="sibTrans" presStyleCnt="0"/>
+      <dgm:spPr/>
+    </dgm:pt>
+    <dgm:pt modelId="{94BA794D-6096-4106-91F4-8C9222A2586D}" type="pres">
+      <dgm:prSet presAssocID="{B26B8C25-9ACE-4B86-B84B-8E23283B9851}" presName="compNode" presStyleCnt="0"/>
+      <dgm:spPr/>
+    </dgm:pt>
+    <dgm:pt modelId="{C565323C-9C67-4627-90C8-227FC0A1A398}" type="pres">
+      <dgm:prSet presAssocID="{B26B8C25-9ACE-4B86-B84B-8E23283B9851}" presName="iconBgRect" presStyleLbl="bgShp" presStyleIdx="1" presStyleCnt="4"/>
+      <dgm:spPr/>
+    </dgm:pt>
+    <dgm:pt modelId="{595FBDD6-6124-4425-8529-EB83087C0CE2}" type="pres">
+      <dgm:prSet presAssocID="{B26B8C25-9ACE-4B86-B84B-8E23283B9851}" presName="iconRect" presStyleLbl="node1" presStyleIdx="1" presStyleCnt="4"/>
+      <dgm:spPr>
+        <a:blipFill>
+          <a:blip xmlns:r="http://schemas.openxmlformats.org/officeDocument/2006/relationships" r:embed="rId3">
+            <a:extLst>
+              <a:ext uri="{28A0092B-C50C-407E-A947-70E740481C1C}">
+                <a14:useLocalDpi xmlns:a14="http://schemas.microsoft.com/office/drawing/2010/main" val="0"/>
+              </a:ext>
+              <a:ext uri="{96DAC541-7B7A-43D3-8B79-37D633B846F1}">
+                <asvg:svgBlip xmlns:asvg="http://schemas.microsoft.com/office/drawing/2016/SVG/main" r:embed="rId4"/>
+              </a:ext>
+            </a:extLst>
+          </a:blip>
+          <a:stretch>
+            <a:fillRect/>
+          </a:stretch>
+        </a:blipFill>
+      </dgm:spPr>
+      <dgm:extLst>
+        <a:ext uri="{E40237B7-FDA0-4F09-8148-C483321AD2D9}">
+          <dgm14:cNvPr xmlns:dgm14="http://schemas.microsoft.com/office/drawing/2010/diagram" id="0" name="" descr="Cruise Ship"/>
+        </a:ext>
+      </dgm:extLst>
+    </dgm:pt>
+    <dgm:pt modelId="{A2AEE934-F861-4AD4-B370-FA8DEF682AE8}" type="pres">
+      <dgm:prSet presAssocID="{B26B8C25-9ACE-4B86-B84B-8E23283B9851}" presName="spaceRect" presStyleCnt="0"/>
+      <dgm:spPr/>
+    </dgm:pt>
+    <dgm:pt modelId="{25F1322B-7FBE-4F58-B156-7D353A4DD150}" type="pres">
+      <dgm:prSet presAssocID="{B26B8C25-9ACE-4B86-B84B-8E23283B9851}" presName="textRect" presStyleLbl="revTx" presStyleIdx="1" presStyleCnt="4">
+        <dgm:presLayoutVars>
+          <dgm:chMax val="1"/>
+          <dgm:chPref val="1"/>
+        </dgm:presLayoutVars>
+      </dgm:prSet>
+      <dgm:spPr/>
+    </dgm:pt>
+    <dgm:pt modelId="{ED438F02-339A-4ADC-B0C3-DFBB1774293F}" type="pres">
+      <dgm:prSet presAssocID="{BC41478C-2498-41AF-9EF8-A60BA4526C6A}" presName="sibTrans" presStyleCnt="0"/>
+      <dgm:spPr/>
+    </dgm:pt>
+    <dgm:pt modelId="{37C84567-581E-4301-B4A2-50BA13447A28}" type="pres">
+      <dgm:prSet presAssocID="{1DABA7D2-8711-4EDA-8E4B-96B2D5854B3D}" presName="compNode" presStyleCnt="0"/>
+      <dgm:spPr/>
+    </dgm:pt>
+    <dgm:pt modelId="{4D01DAB4-5655-4C5C-9898-2CFDC95F13D9}" type="pres">
+      <dgm:prSet presAssocID="{1DABA7D2-8711-4EDA-8E4B-96B2D5854B3D}" presName="iconBgRect" presStyleLbl="bgShp" presStyleIdx="2" presStyleCnt="4"/>
+      <dgm:spPr/>
+    </dgm:pt>
+    <dgm:pt modelId="{638BAF30-E50A-4170-8642-24E88EA0ADF6}" type="pres">
+      <dgm:prSet presAssocID="{1DABA7D2-8711-4EDA-8E4B-96B2D5854B3D}" presName="iconRect" presStyleLbl="node1" presStyleIdx="2" presStyleCnt="4"/>
+      <dgm:spPr>
+        <a:blipFill>
+          <a:blip xmlns:r="http://schemas.openxmlformats.org/officeDocument/2006/relationships" r:embed="rId5">
+            <a:extLst>
+              <a:ext uri="{28A0092B-C50C-407E-A947-70E740481C1C}">
+                <a14:useLocalDpi xmlns:a14="http://schemas.microsoft.com/office/drawing/2010/main" val="0"/>
+              </a:ext>
+              <a:ext uri="{96DAC541-7B7A-43D3-8B79-37D633B846F1}">
+                <asvg:svgBlip xmlns:asvg="http://schemas.microsoft.com/office/drawing/2016/SVG/main" r:embed="rId6"/>
+              </a:ext>
+            </a:extLst>
+          </a:blip>
+          <a:stretch>
+            <a:fillRect/>
+          </a:stretch>
+        </a:blipFill>
+      </dgm:spPr>
+      <dgm:extLst>
+        <a:ext uri="{E40237B7-FDA0-4F09-8148-C483321AD2D9}">
+          <dgm14:cNvPr xmlns:dgm14="http://schemas.microsoft.com/office/drawing/2010/diagram" id="0" name="" descr="Document"/>
+        </a:ext>
+      </dgm:extLst>
+    </dgm:pt>
+    <dgm:pt modelId="{4D7D74A8-CC11-4376-B14A-2FFB8282AAAF}" type="pres">
+      <dgm:prSet presAssocID="{1DABA7D2-8711-4EDA-8E4B-96B2D5854B3D}" presName="spaceRect" presStyleCnt="0"/>
+      <dgm:spPr/>
+    </dgm:pt>
+    <dgm:pt modelId="{D25257D4-4EF3-4E3B-B0CD-1483C0BA061F}" type="pres">
+      <dgm:prSet presAssocID="{1DABA7D2-8711-4EDA-8E4B-96B2D5854B3D}" presName="textRect" presStyleLbl="revTx" presStyleIdx="2" presStyleCnt="4">
+        <dgm:presLayoutVars>
+          <dgm:chMax val="1"/>
+          <dgm:chPref val="1"/>
+        </dgm:presLayoutVars>
+      </dgm:prSet>
+      <dgm:spPr/>
+    </dgm:pt>
+    <dgm:pt modelId="{15C496E9-220B-496C-8C14-997ADFDF77EB}" type="pres">
+      <dgm:prSet presAssocID="{EBF01389-313D-4399-BB71-F057AB4C7922}" presName="sibTrans" presStyleCnt="0"/>
+      <dgm:spPr/>
+    </dgm:pt>
+    <dgm:pt modelId="{7ACA4E36-74D7-4063-BF2D-D9F27F57A315}" type="pres">
+      <dgm:prSet presAssocID="{87556439-71EA-4D3E-848C-54FC9811DF6F}" presName="compNode" presStyleCnt="0"/>
+      <dgm:spPr/>
+    </dgm:pt>
+    <dgm:pt modelId="{612D9E4F-B20E-46E7-93C4-A71B9AA6F351}" type="pres">
+      <dgm:prSet presAssocID="{87556439-71EA-4D3E-848C-54FC9811DF6F}" presName="iconBgRect" presStyleLbl="bgShp" presStyleIdx="3" presStyleCnt="4"/>
+      <dgm:spPr/>
+    </dgm:pt>
+    <dgm:pt modelId="{A822FBC4-5451-437C-8F7C-66651E8E77CD}" type="pres">
+      <dgm:prSet presAssocID="{87556439-71EA-4D3E-848C-54FC9811DF6F}" presName="iconRect" presStyleLbl="node1" presStyleIdx="3" presStyleCnt="4"/>
+      <dgm:spPr>
+        <a:blipFill>
+          <a:blip xmlns:r="http://schemas.openxmlformats.org/officeDocument/2006/relationships" r:embed="rId7">
+            <a:extLst>
+              <a:ext uri="{28A0092B-C50C-407E-A947-70E740481C1C}">
+                <a14:useLocalDpi xmlns:a14="http://schemas.microsoft.com/office/drawing/2010/main" val="0"/>
+              </a:ext>
+              <a:ext uri="{96DAC541-7B7A-43D3-8B79-37D633B846F1}">
+                <asvg:svgBlip xmlns:asvg="http://schemas.microsoft.com/office/drawing/2016/SVG/main" r:embed="rId8"/>
+              </a:ext>
+            </a:extLst>
+          </a:blip>
+          <a:stretch>
+            <a:fillRect/>
+          </a:stretch>
+        </a:blipFill>
+      </dgm:spPr>
+      <dgm:extLst>
+        <a:ext uri="{E40237B7-FDA0-4F09-8148-C483321AD2D9}">
+          <dgm14:cNvPr xmlns:dgm14="http://schemas.microsoft.com/office/drawing/2010/diagram" id="0" name="" descr="Marker"/>
+        </a:ext>
+      </dgm:extLst>
+    </dgm:pt>
+    <dgm:pt modelId="{EB519769-4FE0-4C52-A798-63DEB095FF48}" type="pres">
+      <dgm:prSet presAssocID="{87556439-71EA-4D3E-848C-54FC9811DF6F}" presName="spaceRect" presStyleCnt="0"/>
+      <dgm:spPr/>
+    </dgm:pt>
+    <dgm:pt modelId="{7E2FE57B-C87E-4ED0-89A0-A3169AA5E15D}" type="pres">
+      <dgm:prSet presAssocID="{87556439-71EA-4D3E-848C-54FC9811DF6F}" presName="textRect" presStyleLbl="revTx" presStyleIdx="3" presStyleCnt="4">
+        <dgm:presLayoutVars>
+          <dgm:chMax val="1"/>
+          <dgm:chPref val="1"/>
+        </dgm:presLayoutVars>
+      </dgm:prSet>
+      <dgm:spPr/>
+    </dgm:pt>
+  </dgm:ptLst>
+  <dgm:cxnLst>
+    <dgm:cxn modelId="{A9D5E52E-B0E0-468C-A4DD-C33E7F7A4BEA}" srcId="{4F15EE28-7E97-4988-8994-4280BBC1EF08}" destId="{B26B8C25-9ACE-4B86-B84B-8E23283B9851}" srcOrd="1" destOrd="0" parTransId="{307CB622-1F2E-4572-81D0-5FA2C14C498A}" sibTransId="{BC41478C-2498-41AF-9EF8-A60BA4526C6A}"/>
+    <dgm:cxn modelId="{A7940E44-9A7F-4053-AA12-36855CBD6A37}" srcId="{4F15EE28-7E97-4988-8994-4280BBC1EF08}" destId="{1DABA7D2-8711-4EDA-8E4B-96B2D5854B3D}" srcOrd="2" destOrd="0" parTransId="{5629C543-1CBE-4616-B240-3CB4080A868B}" sibTransId="{EBF01389-313D-4399-BB71-F057AB4C7922}"/>
+    <dgm:cxn modelId="{A5DD6554-2D2C-4C5F-8CEE-6CD5A87380B2}" srcId="{4F15EE28-7E97-4988-8994-4280BBC1EF08}" destId="{CEF22688-9D10-45C6-9B74-ECA18DF6C06C}" srcOrd="0" destOrd="0" parTransId="{420C4F7F-B592-4922-A2B5-82C86671D682}" sibTransId="{F74A02E7-1F87-4676-B1A7-77106F05E66B}"/>
+    <dgm:cxn modelId="{7FC37E6B-20BE-4B32-A33E-D6E616F1A0FE}" type="presOf" srcId="{4F15EE28-7E97-4988-8994-4280BBC1EF08}" destId="{B738B492-AC90-44C2-8E11-B1EFF57437DF}" srcOrd="0" destOrd="0" presId="urn:microsoft.com/office/officeart/2018/5/layout/IconCircleLabelList"/>
+    <dgm:cxn modelId="{101E3186-0DF6-43BC-9F2D-59B1F5B4AB5F}" type="presOf" srcId="{87556439-71EA-4D3E-848C-54FC9811DF6F}" destId="{7E2FE57B-C87E-4ED0-89A0-A3169AA5E15D}" srcOrd="0" destOrd="0" presId="urn:microsoft.com/office/officeart/2018/5/layout/IconCircleLabelList"/>
+    <dgm:cxn modelId="{4515AE8D-C3BC-4E76-8839-744852C78F07}" type="presOf" srcId="{B26B8C25-9ACE-4B86-B84B-8E23283B9851}" destId="{25F1322B-7FBE-4F58-B156-7D353A4DD150}" srcOrd="0" destOrd="0" presId="urn:microsoft.com/office/officeart/2018/5/layout/IconCircleLabelList"/>
+    <dgm:cxn modelId="{1189C890-F055-4BA4-988B-1F5A9C21804A}" type="presOf" srcId="{CEF22688-9D10-45C6-9B74-ECA18DF6C06C}" destId="{C7AE0236-A325-4DC9-8344-89115C6DA3E4}" srcOrd="0" destOrd="0" presId="urn:microsoft.com/office/officeart/2018/5/layout/IconCircleLabelList"/>
+    <dgm:cxn modelId="{AE7D70A7-F500-47E9-9F0B-117A4263088B}" type="presOf" srcId="{1DABA7D2-8711-4EDA-8E4B-96B2D5854B3D}" destId="{D25257D4-4EF3-4E3B-B0CD-1483C0BA061F}" srcOrd="0" destOrd="0" presId="urn:microsoft.com/office/officeart/2018/5/layout/IconCircleLabelList"/>
+    <dgm:cxn modelId="{8E28DCD1-B42B-432C-B53F-7BD7401294C2}" srcId="{4F15EE28-7E97-4988-8994-4280BBC1EF08}" destId="{87556439-71EA-4D3E-848C-54FC9811DF6F}" srcOrd="3" destOrd="0" parTransId="{689E2D95-C933-44DB-9948-3D179CD8FC93}" sibTransId="{DCE91253-EF74-4C03-BED8-551EB495745B}"/>
+    <dgm:cxn modelId="{2D440677-41E2-4A94-BE73-D3E03DBAF6F1}" type="presParOf" srcId="{B738B492-AC90-44C2-8E11-B1EFF57437DF}" destId="{E9A3E517-72FA-4BFB-9E87-84E424215C84}" srcOrd="0" destOrd="0" presId="urn:microsoft.com/office/officeart/2018/5/layout/IconCircleLabelList"/>
+    <dgm:cxn modelId="{02DC7827-B761-4D03-B95D-4596C7050F73}" type="presParOf" srcId="{E9A3E517-72FA-4BFB-9E87-84E424215C84}" destId="{A3519EC2-BDFF-44FD-9CED-4782046A437D}" srcOrd="0" destOrd="0" presId="urn:microsoft.com/office/officeart/2018/5/layout/IconCircleLabelList"/>
+    <dgm:cxn modelId="{550C5E3B-F7A5-48B6-A8C7-0F88304D0E26}" type="presParOf" srcId="{E9A3E517-72FA-4BFB-9E87-84E424215C84}" destId="{6EEC2532-5DBB-43A9-8452-C95474912088}" srcOrd="1" destOrd="0" presId="urn:microsoft.com/office/officeart/2018/5/layout/IconCircleLabelList"/>
+    <dgm:cxn modelId="{097B53B8-597F-4F5E-B97D-E06B668B9C6D}" type="presParOf" srcId="{E9A3E517-72FA-4BFB-9E87-84E424215C84}" destId="{DCD60C61-23F2-4A5D-854E-1B4EBC3F7D4B}" srcOrd="2" destOrd="0" presId="urn:microsoft.com/office/officeart/2018/5/layout/IconCircleLabelList"/>
+    <dgm:cxn modelId="{15198FF4-E4AD-482E-81DB-EC3E16661EA8}" type="presParOf" srcId="{E9A3E517-72FA-4BFB-9E87-84E424215C84}" destId="{C7AE0236-A325-4DC9-8344-89115C6DA3E4}" srcOrd="3" destOrd="0" presId="urn:microsoft.com/office/officeart/2018/5/layout/IconCircleLabelList"/>
+    <dgm:cxn modelId="{7EFF736D-CC2B-446F-9DA2-218153B0BBA5}" type="presParOf" srcId="{B738B492-AC90-44C2-8E11-B1EFF57437DF}" destId="{6CA9B14B-8C82-4170-8D8C-2E1B22BA4A42}" srcOrd="1" destOrd="0" presId="urn:microsoft.com/office/officeart/2018/5/layout/IconCircleLabelList"/>
+    <dgm:cxn modelId="{B6714FED-2884-4C45-9F56-F0FD7173178A}" type="presParOf" srcId="{B738B492-AC90-44C2-8E11-B1EFF57437DF}" destId="{94BA794D-6096-4106-91F4-8C9222A2586D}" srcOrd="2" destOrd="0" presId="urn:microsoft.com/office/officeart/2018/5/layout/IconCircleLabelList"/>
+    <dgm:cxn modelId="{765DD771-7403-4DF2-BE32-81310E830161}" type="presParOf" srcId="{94BA794D-6096-4106-91F4-8C9222A2586D}" destId="{C565323C-9C67-4627-90C8-227FC0A1A398}" srcOrd="0" destOrd="0" presId="urn:microsoft.com/office/officeart/2018/5/layout/IconCircleLabelList"/>
+    <dgm:cxn modelId="{8F83A6A5-4FC1-4E26-8D19-151A43267B83}" type="presParOf" srcId="{94BA794D-6096-4106-91F4-8C9222A2586D}" destId="{595FBDD6-6124-4425-8529-EB83087C0CE2}" srcOrd="1" destOrd="0" presId="urn:microsoft.com/office/officeart/2018/5/layout/IconCircleLabelList"/>
+    <dgm:cxn modelId="{63C3A5D4-E637-4787-ADC5-C3BAD82CA952}" type="presParOf" srcId="{94BA794D-6096-4106-91F4-8C9222A2586D}" destId="{A2AEE934-F861-4AD4-B370-FA8DEF682AE8}" srcOrd="2" destOrd="0" presId="urn:microsoft.com/office/officeart/2018/5/layout/IconCircleLabelList"/>
+    <dgm:cxn modelId="{E4101179-1B7E-430B-B09C-FA72322D9B5D}" type="presParOf" srcId="{94BA794D-6096-4106-91F4-8C9222A2586D}" destId="{25F1322B-7FBE-4F58-B156-7D353A4DD150}" srcOrd="3" destOrd="0" presId="urn:microsoft.com/office/officeart/2018/5/layout/IconCircleLabelList"/>
+    <dgm:cxn modelId="{277671C5-EF9E-491E-8411-675457BEA1E1}" type="presParOf" srcId="{B738B492-AC90-44C2-8E11-B1EFF57437DF}" destId="{ED438F02-339A-4ADC-B0C3-DFBB1774293F}" srcOrd="3" destOrd="0" presId="urn:microsoft.com/office/officeart/2018/5/layout/IconCircleLabelList"/>
+    <dgm:cxn modelId="{15A3A61B-0E59-4595-BF50-82A0FCDF77E1}" type="presParOf" srcId="{B738B492-AC90-44C2-8E11-B1EFF57437DF}" destId="{37C84567-581E-4301-B4A2-50BA13447A28}" srcOrd="4" destOrd="0" presId="urn:microsoft.com/office/officeart/2018/5/layout/IconCircleLabelList"/>
+    <dgm:cxn modelId="{08F1D622-03E4-4C88-91A9-5E96342330FB}" type="presParOf" srcId="{37C84567-581E-4301-B4A2-50BA13447A28}" destId="{4D01DAB4-5655-4C5C-9898-2CFDC95F13D9}" srcOrd="0" destOrd="0" presId="urn:microsoft.com/office/officeart/2018/5/layout/IconCircleLabelList"/>
+    <dgm:cxn modelId="{ED632B27-E0DD-4A80-986A-CE8D0AA396F1}" type="presParOf" srcId="{37C84567-581E-4301-B4A2-50BA13447A28}" destId="{638BAF30-E50A-4170-8642-24E88EA0ADF6}" srcOrd="1" destOrd="0" presId="urn:microsoft.com/office/officeart/2018/5/layout/IconCircleLabelList"/>
+    <dgm:cxn modelId="{FCA05476-A8A3-4CE4-BAA4-DE1EC9DCCA3A}" type="presParOf" srcId="{37C84567-581E-4301-B4A2-50BA13447A28}" destId="{4D7D74A8-CC11-4376-B14A-2FFB8282AAAF}" srcOrd="2" destOrd="0" presId="urn:microsoft.com/office/officeart/2018/5/layout/IconCircleLabelList"/>
+    <dgm:cxn modelId="{35A13204-F1F0-40AE-BE31-817DB23C60B2}" type="presParOf" srcId="{37C84567-581E-4301-B4A2-50BA13447A28}" destId="{D25257D4-4EF3-4E3B-B0CD-1483C0BA061F}" srcOrd="3" destOrd="0" presId="urn:microsoft.com/office/officeart/2018/5/layout/IconCircleLabelList"/>
+    <dgm:cxn modelId="{B5951229-8B1A-4A55-8E08-9069481B6EC9}" type="presParOf" srcId="{B738B492-AC90-44C2-8E11-B1EFF57437DF}" destId="{15C496E9-220B-496C-8C14-997ADFDF77EB}" srcOrd="5" destOrd="0" presId="urn:microsoft.com/office/officeart/2018/5/layout/IconCircleLabelList"/>
+    <dgm:cxn modelId="{296048E7-FC86-42F1-BA65-4DEE731D7E83}" type="presParOf" srcId="{B738B492-AC90-44C2-8E11-B1EFF57437DF}" destId="{7ACA4E36-74D7-4063-BF2D-D9F27F57A315}" srcOrd="6" destOrd="0" presId="urn:microsoft.com/office/officeart/2018/5/layout/IconCircleLabelList"/>
+    <dgm:cxn modelId="{8B3F8AAD-38CB-48FD-9B3D-E6526B4D9DD3}" type="presParOf" srcId="{7ACA4E36-74D7-4063-BF2D-D9F27F57A315}" destId="{612D9E4F-B20E-46E7-93C4-A71B9AA6F351}" srcOrd="0" destOrd="0" presId="urn:microsoft.com/office/officeart/2018/5/layout/IconCircleLabelList"/>
+    <dgm:cxn modelId="{C6706D2D-531B-4F43-B956-964959F0F50F}" type="presParOf" srcId="{7ACA4E36-74D7-4063-BF2D-D9F27F57A315}" destId="{A822FBC4-5451-437C-8F7C-66651E8E77CD}" srcOrd="1" destOrd="0" presId="urn:microsoft.com/office/officeart/2018/5/layout/IconCircleLabelList"/>
+    <dgm:cxn modelId="{3192D518-4C74-44F0-8AE1-A3183C6C6C75}" type="presParOf" srcId="{7ACA4E36-74D7-4063-BF2D-D9F27F57A315}" destId="{EB519769-4FE0-4C52-A798-63DEB095FF48}" srcOrd="2" destOrd="0" presId="urn:microsoft.com/office/officeart/2018/5/layout/IconCircleLabelList"/>
+    <dgm:cxn modelId="{46F0D1FC-CEA7-4C4D-A4B4-C59454A026B8}" type="presParOf" srcId="{7ACA4E36-74D7-4063-BF2D-D9F27F57A315}" destId="{7E2FE57B-C87E-4ED0-89A0-A3169AA5E15D}" srcOrd="3" destOrd="0" presId="urn:microsoft.com/office/officeart/2018/5/layout/IconCircleLabelList"/>
+  </dgm:cxnLst>
+  <dgm:bg/>
+  <dgm:whole/>
+  <dgm:extLst>
+    <a:ext uri="http://schemas.microsoft.com/office/drawing/2008/diagram">
+      <dsp:dataModelExt xmlns:dsp="http://schemas.microsoft.com/office/drawing/2008/diagram" relId="rId6" minVer="http://schemas.openxmlformats.org/drawingml/2006/diagram"/>
+    </a:ext>
+  </dgm:extLst>
+</dgm:dataModel>
+</file>
+
+<file path=ppt/diagrams/drawing1.xml><?xml version="1.0" encoding="utf-8"?>
+<dsp:drawing xmlns:dgm="http://schemas.openxmlformats.org/drawingml/2006/diagram" xmlns:dsp="http://schemas.microsoft.com/office/drawing/2008/diagram" xmlns:a="http://schemas.openxmlformats.org/drawingml/2006/main">
+  <dsp:spTree>
+    <dsp:nvGrpSpPr>
+      <dsp:cNvPr id="0" name=""/>
+      <dsp:cNvGrpSpPr/>
+    </dsp:nvGrpSpPr>
+    <dsp:grpSpPr/>
+    <dsp:sp modelId="{A3519EC2-BDFF-44FD-9CED-4782046A437D}">
+      <dsp:nvSpPr>
+        <dsp:cNvPr id="0" name=""/>
+        <dsp:cNvSpPr/>
+      </dsp:nvSpPr>
+      <dsp:spPr>
+        <a:xfrm>
+          <a:off x="973190" y="680158"/>
+          <a:ext cx="1264141" cy="1264141"/>
+        </a:xfrm>
+        <a:prstGeom prst="ellipse">
+          <a:avLst/>
+        </a:prstGeom>
+        <a:solidFill>
+          <a:schemeClr val="accent1">
+            <a:tint val="40000"/>
+            <a:hueOff val="0"/>
+            <a:satOff val="0"/>
+            <a:lumOff val="0"/>
+            <a:alphaOff val="0"/>
+          </a:schemeClr>
+        </a:solidFill>
+        <a:ln>
+          <a:noFill/>
+        </a:ln>
+        <a:effectLst/>
+      </dsp:spPr>
+      <dsp:style>
+        <a:lnRef idx="0">
+          <a:scrgbClr r="0" g="0" b="0"/>
+        </a:lnRef>
+        <a:fillRef idx="1">
+          <a:scrgbClr r="0" g="0" b="0"/>
+        </a:fillRef>
+        <a:effectRef idx="0">
+          <a:scrgbClr r="0" g="0" b="0"/>
+        </a:effectRef>
+        <a:fontRef idx="minor"/>
+      </dsp:style>
+    </dsp:sp>
+    <dsp:sp modelId="{6EEC2532-5DBB-43A9-8452-C95474912088}">
+      <dsp:nvSpPr>
+        <dsp:cNvPr id="0" name=""/>
+        <dsp:cNvSpPr/>
+      </dsp:nvSpPr>
+      <dsp:spPr>
+        <a:xfrm>
+          <a:off x="1242597" y="949566"/>
+          <a:ext cx="725326" cy="725326"/>
+        </a:xfrm>
+        <a:prstGeom prst="rect">
+          <a:avLst/>
+        </a:prstGeom>
+        <a:blipFill>
+          <a:blip xmlns:r="http://schemas.openxmlformats.org/officeDocument/2006/relationships" r:embed="rId1">
+            <a:extLst>
+              <a:ext uri="{28A0092B-C50C-407E-A947-70E740481C1C}">
+                <a14:useLocalDpi xmlns:a14="http://schemas.microsoft.com/office/drawing/2010/main" val="0"/>
+              </a:ext>
+              <a:ext uri="{96DAC541-7B7A-43D3-8B79-37D633B846F1}">
+                <asvg:svgBlip xmlns:asvg="http://schemas.microsoft.com/office/drawing/2016/SVG/main" r:embed="rId2"/>
+              </a:ext>
+            </a:extLst>
+          </a:blip>
+          <a:stretch>
+            <a:fillRect/>
+          </a:stretch>
+        </a:blipFill>
+        <a:ln w="19050" cap="flat" cmpd="sng" algn="ctr">
+          <a:solidFill>
+            <a:schemeClr val="lt1">
+              <a:hueOff val="0"/>
+              <a:satOff val="0"/>
+              <a:lumOff val="0"/>
+              <a:alphaOff val="0"/>
+            </a:schemeClr>
+          </a:solidFill>
+          <a:prstDash val="solid"/>
+          <a:miter lim="800000"/>
+        </a:ln>
+        <a:effectLst/>
+      </dsp:spPr>
+      <dsp:style>
+        <a:lnRef idx="2">
+          <a:scrgbClr r="0" g="0" b="0"/>
+        </a:lnRef>
+        <a:fillRef idx="1">
+          <a:scrgbClr r="0" g="0" b="0"/>
+        </a:fillRef>
+        <a:effectRef idx="0">
+          <a:scrgbClr r="0" g="0" b="0"/>
+        </a:effectRef>
+        <a:fontRef idx="minor">
+          <a:schemeClr val="lt1"/>
+        </a:fontRef>
+      </dsp:style>
+    </dsp:sp>
+    <dsp:sp modelId="{C7AE0236-A325-4DC9-8344-89115C6DA3E4}">
+      <dsp:nvSpPr>
+        <dsp:cNvPr id="0" name=""/>
+        <dsp:cNvSpPr/>
+      </dsp:nvSpPr>
+      <dsp:spPr>
+        <a:xfrm>
+          <a:off x="569079" y="2338048"/>
+          <a:ext cx="2072362" cy="1536328"/>
+        </a:xfrm>
+        <a:prstGeom prst="rect">
+          <a:avLst/>
+        </a:prstGeom>
+        <a:noFill/>
+        <a:ln>
+          <a:noFill/>
+        </a:ln>
+        <a:effectLst/>
+      </dsp:spPr>
+      <dsp:style>
+        <a:lnRef idx="0">
+          <a:scrgbClr r="0" g="0" b="0"/>
+        </a:lnRef>
+        <a:fillRef idx="0">
+          <a:scrgbClr r="0" g="0" b="0"/>
+        </a:fillRef>
+        <a:effectRef idx="0">
+          <a:scrgbClr r="0" g="0" b="0"/>
+        </a:effectRef>
+        <a:fontRef idx="minor"/>
+      </dsp:style>
+      <dsp:txBody>
+        <a:bodyPr spcFirstLastPara="0" vert="horz" wrap="square" lIns="0" tIns="0" rIns="0" bIns="0" numCol="1" spcCol="1270" anchor="t" anchorCtr="0">
+          <a:noAutofit/>
+        </a:bodyPr>
+        <a:lstStyle/>
+        <a:p>
+          <a:pPr marL="0" lvl="0" indent="0" algn="ctr" defTabSz="488950">
+            <a:lnSpc>
+              <a:spcPct val="100000"/>
+            </a:lnSpc>
+            <a:spcBef>
+              <a:spcPct val="0"/>
+            </a:spcBef>
+            <a:spcAft>
+              <a:spcPct val="35000"/>
+            </a:spcAft>
+            <a:buNone/>
+            <a:defRPr cap="all"/>
+          </a:pPr>
+          <a:r>
+            <a:rPr lang="en-US" sz="1100" kern="1200"/>
+            <a:t>The purpose of this document is to outline the technical design and development plan for the Moffat Bay Island Marina website.  </a:t>
+          </a:r>
+        </a:p>
+      </dsp:txBody>
+      <dsp:txXfrm>
+        <a:off x="569079" y="2338048"/>
+        <a:ext cx="2072362" cy="1536328"/>
+      </dsp:txXfrm>
+    </dsp:sp>
+    <dsp:sp modelId="{C565323C-9C67-4627-90C8-227FC0A1A398}">
+      <dsp:nvSpPr>
+        <dsp:cNvPr id="0" name=""/>
+        <dsp:cNvSpPr/>
+      </dsp:nvSpPr>
+      <dsp:spPr>
+        <a:xfrm>
+          <a:off x="3408216" y="680158"/>
+          <a:ext cx="1264141" cy="1264141"/>
+        </a:xfrm>
+        <a:prstGeom prst="ellipse">
+          <a:avLst/>
+        </a:prstGeom>
+        <a:solidFill>
+          <a:schemeClr val="accent1">
+            <a:tint val="40000"/>
+            <a:hueOff val="0"/>
+            <a:satOff val="0"/>
+            <a:lumOff val="0"/>
+            <a:alphaOff val="0"/>
+          </a:schemeClr>
+        </a:solidFill>
+        <a:ln>
+          <a:noFill/>
+        </a:ln>
+        <a:effectLst/>
+      </dsp:spPr>
+      <dsp:style>
+        <a:lnRef idx="0">
+          <a:scrgbClr r="0" g="0" b="0"/>
+        </a:lnRef>
+        <a:fillRef idx="1">
+          <a:scrgbClr r="0" g="0" b="0"/>
+        </a:fillRef>
+        <a:effectRef idx="0">
+          <a:scrgbClr r="0" g="0" b="0"/>
+        </a:effectRef>
+        <a:fontRef idx="minor"/>
+      </dsp:style>
+    </dsp:sp>
+    <dsp:sp modelId="{595FBDD6-6124-4425-8529-EB83087C0CE2}">
+      <dsp:nvSpPr>
+        <dsp:cNvPr id="0" name=""/>
+        <dsp:cNvSpPr/>
+      </dsp:nvSpPr>
+      <dsp:spPr>
+        <a:xfrm>
+          <a:off x="3677623" y="949566"/>
+          <a:ext cx="725326" cy="725326"/>
+        </a:xfrm>
+        <a:prstGeom prst="rect">
+          <a:avLst/>
+        </a:prstGeom>
+        <a:blipFill>
+          <a:blip xmlns:r="http://schemas.openxmlformats.org/officeDocument/2006/relationships" r:embed="rId3">
+            <a:extLst>
+              <a:ext uri="{28A0092B-C50C-407E-A947-70E740481C1C}">
+                <a14:useLocalDpi xmlns:a14="http://schemas.microsoft.com/office/drawing/2010/main" val="0"/>
+              </a:ext>
+              <a:ext uri="{96DAC541-7B7A-43D3-8B79-37D633B846F1}">
+                <asvg:svgBlip xmlns:asvg="http://schemas.microsoft.com/office/drawing/2016/SVG/main" r:embed="rId4"/>
+              </a:ext>
+            </a:extLst>
+          </a:blip>
+          <a:stretch>
+            <a:fillRect/>
+          </a:stretch>
+        </a:blipFill>
+        <a:ln w="19050" cap="flat" cmpd="sng" algn="ctr">
+          <a:solidFill>
+            <a:schemeClr val="lt1">
+              <a:hueOff val="0"/>
+              <a:satOff val="0"/>
+              <a:lumOff val="0"/>
+              <a:alphaOff val="0"/>
+            </a:schemeClr>
+          </a:solidFill>
+          <a:prstDash val="solid"/>
+          <a:miter lim="800000"/>
+        </a:ln>
+        <a:effectLst/>
+      </dsp:spPr>
+      <dsp:style>
+        <a:lnRef idx="2">
+          <a:scrgbClr r="0" g="0" b="0"/>
+        </a:lnRef>
+        <a:fillRef idx="1">
+          <a:scrgbClr r="0" g="0" b="0"/>
+        </a:fillRef>
+        <a:effectRef idx="0">
+          <a:scrgbClr r="0" g="0" b="0"/>
+        </a:effectRef>
+        <a:fontRef idx="minor">
+          <a:schemeClr val="lt1"/>
+        </a:fontRef>
+      </dsp:style>
+    </dsp:sp>
+    <dsp:sp modelId="{25F1322B-7FBE-4F58-B156-7D353A4DD150}">
+      <dsp:nvSpPr>
+        <dsp:cNvPr id="0" name=""/>
+        <dsp:cNvSpPr/>
+      </dsp:nvSpPr>
+      <dsp:spPr>
+        <a:xfrm>
+          <a:off x="3004105" y="2338048"/>
+          <a:ext cx="2072362" cy="1536328"/>
+        </a:xfrm>
+        <a:prstGeom prst="rect">
+          <a:avLst/>
+        </a:prstGeom>
+        <a:noFill/>
+        <a:ln>
+          <a:noFill/>
+        </a:ln>
+        <a:effectLst/>
+      </dsp:spPr>
+      <dsp:style>
+        <a:lnRef idx="0">
+          <a:scrgbClr r="0" g="0" b="0"/>
+        </a:lnRef>
+        <a:fillRef idx="0">
+          <a:scrgbClr r="0" g="0" b="0"/>
+        </a:fillRef>
+        <a:effectRef idx="0">
+          <a:scrgbClr r="0" g="0" b="0"/>
+        </a:effectRef>
+        <a:fontRef idx="minor"/>
+      </dsp:style>
+      <dsp:txBody>
+        <a:bodyPr spcFirstLastPara="0" vert="horz" wrap="square" lIns="0" tIns="0" rIns="0" bIns="0" numCol="1" spcCol="1270" anchor="t" anchorCtr="0">
+          <a:noAutofit/>
+        </a:bodyPr>
+        <a:lstStyle/>
+        <a:p>
+          <a:pPr marL="0" lvl="0" indent="0" algn="ctr" defTabSz="488950">
+            <a:lnSpc>
+              <a:spcPct val="100000"/>
+            </a:lnSpc>
+            <a:spcBef>
+              <a:spcPct val="0"/>
+            </a:spcBef>
+            <a:spcAft>
+              <a:spcPct val="35000"/>
+            </a:spcAft>
+            <a:buNone/>
+            <a:defRPr cap="all"/>
+          </a:pPr>
+          <a:r>
+            <a:rPr lang="en-US" sz="1100" kern="1200"/>
+            <a:t>The website will allow customers to view marina information, register, log in, reserve long-term slips based on boat size, and manage their reservations.  It will also include functionality for waitlists when slips are unavailable. </a:t>
+          </a:r>
+        </a:p>
+      </dsp:txBody>
+      <dsp:txXfrm>
+        <a:off x="3004105" y="2338048"/>
+        <a:ext cx="2072362" cy="1536328"/>
+      </dsp:txXfrm>
+    </dsp:sp>
+    <dsp:sp modelId="{4D01DAB4-5655-4C5C-9898-2CFDC95F13D9}">
+      <dsp:nvSpPr>
+        <dsp:cNvPr id="0" name=""/>
+        <dsp:cNvSpPr/>
+      </dsp:nvSpPr>
+      <dsp:spPr>
+        <a:xfrm>
+          <a:off x="5843242" y="680158"/>
+          <a:ext cx="1264141" cy="1264141"/>
+        </a:xfrm>
+        <a:prstGeom prst="ellipse">
+          <a:avLst/>
+        </a:prstGeom>
+        <a:solidFill>
+          <a:schemeClr val="accent1">
+            <a:tint val="40000"/>
+            <a:hueOff val="0"/>
+            <a:satOff val="0"/>
+            <a:lumOff val="0"/>
+            <a:alphaOff val="0"/>
+          </a:schemeClr>
+        </a:solidFill>
+        <a:ln>
+          <a:noFill/>
+        </a:ln>
+        <a:effectLst/>
+      </dsp:spPr>
+      <dsp:style>
+        <a:lnRef idx="0">
+          <a:scrgbClr r="0" g="0" b="0"/>
+        </a:lnRef>
+        <a:fillRef idx="1">
+          <a:scrgbClr r="0" g="0" b="0"/>
+        </a:fillRef>
+        <a:effectRef idx="0">
+          <a:scrgbClr r="0" g="0" b="0"/>
+        </a:effectRef>
+        <a:fontRef idx="minor"/>
+      </dsp:style>
+    </dsp:sp>
+    <dsp:sp modelId="{638BAF30-E50A-4170-8642-24E88EA0ADF6}">
+      <dsp:nvSpPr>
+        <dsp:cNvPr id="0" name=""/>
+        <dsp:cNvSpPr/>
+      </dsp:nvSpPr>
+      <dsp:spPr>
+        <a:xfrm>
+          <a:off x="6112649" y="949566"/>
+          <a:ext cx="725326" cy="725326"/>
+        </a:xfrm>
+        <a:prstGeom prst="rect">
+          <a:avLst/>
+        </a:prstGeom>
+        <a:blipFill>
+          <a:blip xmlns:r="http://schemas.openxmlformats.org/officeDocument/2006/relationships" r:embed="rId5">
+            <a:extLst>
+              <a:ext uri="{28A0092B-C50C-407E-A947-70E740481C1C}">
+                <a14:useLocalDpi xmlns:a14="http://schemas.microsoft.com/office/drawing/2010/main" val="0"/>
+              </a:ext>
+              <a:ext uri="{96DAC541-7B7A-43D3-8B79-37D633B846F1}">
+                <asvg:svgBlip xmlns:asvg="http://schemas.microsoft.com/office/drawing/2016/SVG/main" r:embed="rId6"/>
+              </a:ext>
+            </a:extLst>
+          </a:blip>
+          <a:stretch>
+            <a:fillRect/>
+          </a:stretch>
+        </a:blipFill>
+        <a:ln w="19050" cap="flat" cmpd="sng" algn="ctr">
+          <a:solidFill>
+            <a:schemeClr val="lt1">
+              <a:hueOff val="0"/>
+              <a:satOff val="0"/>
+              <a:lumOff val="0"/>
+              <a:alphaOff val="0"/>
+            </a:schemeClr>
+          </a:solidFill>
+          <a:prstDash val="solid"/>
+          <a:miter lim="800000"/>
+        </a:ln>
+        <a:effectLst/>
+      </dsp:spPr>
+      <dsp:style>
+        <a:lnRef idx="2">
+          <a:scrgbClr r="0" g="0" b="0"/>
+        </a:lnRef>
+        <a:fillRef idx="1">
+          <a:scrgbClr r="0" g="0" b="0"/>
+        </a:fillRef>
+        <a:effectRef idx="0">
+          <a:scrgbClr r="0" g="0" b="0"/>
+        </a:effectRef>
+        <a:fontRef idx="minor">
+          <a:schemeClr val="lt1"/>
+        </a:fontRef>
+      </dsp:style>
+    </dsp:sp>
+    <dsp:sp modelId="{D25257D4-4EF3-4E3B-B0CD-1483C0BA061F}">
+      <dsp:nvSpPr>
+        <dsp:cNvPr id="0" name=""/>
+        <dsp:cNvSpPr/>
+      </dsp:nvSpPr>
+      <dsp:spPr>
+        <a:xfrm>
+          <a:off x="5439131" y="2338048"/>
+          <a:ext cx="2072362" cy="1536328"/>
+        </a:xfrm>
+        <a:prstGeom prst="rect">
+          <a:avLst/>
+        </a:prstGeom>
+        <a:noFill/>
+        <a:ln>
+          <a:noFill/>
+        </a:ln>
+        <a:effectLst/>
+      </dsp:spPr>
+      <dsp:style>
+        <a:lnRef idx="0">
+          <a:scrgbClr r="0" g="0" b="0"/>
+        </a:lnRef>
+        <a:fillRef idx="0">
+          <a:scrgbClr r="0" g="0" b="0"/>
+        </a:fillRef>
+        <a:effectRef idx="0">
+          <a:scrgbClr r="0" g="0" b="0"/>
+        </a:effectRef>
+        <a:fontRef idx="minor"/>
+      </dsp:style>
+      <dsp:txBody>
+        <a:bodyPr spcFirstLastPara="0" vert="horz" wrap="square" lIns="0" tIns="0" rIns="0" bIns="0" numCol="1" spcCol="1270" anchor="t" anchorCtr="0">
+          <a:noAutofit/>
+        </a:bodyPr>
+        <a:lstStyle/>
+        <a:p>
+          <a:pPr marL="0" lvl="0" indent="0" algn="ctr" defTabSz="488950">
+            <a:lnSpc>
+              <a:spcPct val="100000"/>
+            </a:lnSpc>
+            <a:spcBef>
+              <a:spcPct val="0"/>
+            </a:spcBef>
+            <a:spcAft>
+              <a:spcPct val="35000"/>
+            </a:spcAft>
+            <a:buNone/>
+            <a:defRPr cap="all"/>
+          </a:pPr>
+          <a:r>
+            <a:rPr lang="en-US" sz="1100" kern="1200"/>
+            <a:t>This document will serve as a blueprint for the development, testing, and deployment of the website.</a:t>
+          </a:r>
+        </a:p>
+      </dsp:txBody>
+      <dsp:txXfrm>
+        <a:off x="5439131" y="2338048"/>
+        <a:ext cx="2072362" cy="1536328"/>
+      </dsp:txXfrm>
+    </dsp:sp>
+    <dsp:sp modelId="{612D9E4F-B20E-46E7-93C4-A71B9AA6F351}">
+      <dsp:nvSpPr>
+        <dsp:cNvPr id="0" name=""/>
+        <dsp:cNvSpPr/>
+      </dsp:nvSpPr>
+      <dsp:spPr>
+        <a:xfrm>
+          <a:off x="8278268" y="680158"/>
+          <a:ext cx="1264141" cy="1264141"/>
+        </a:xfrm>
+        <a:prstGeom prst="ellipse">
+          <a:avLst/>
+        </a:prstGeom>
+        <a:solidFill>
+          <a:schemeClr val="accent1">
+            <a:tint val="40000"/>
+            <a:hueOff val="0"/>
+            <a:satOff val="0"/>
+            <a:lumOff val="0"/>
+            <a:alphaOff val="0"/>
+          </a:schemeClr>
+        </a:solidFill>
+        <a:ln>
+          <a:noFill/>
+        </a:ln>
+        <a:effectLst/>
+      </dsp:spPr>
+      <dsp:style>
+        <a:lnRef idx="0">
+          <a:scrgbClr r="0" g="0" b="0"/>
+        </a:lnRef>
+        <a:fillRef idx="1">
+          <a:scrgbClr r="0" g="0" b="0"/>
+        </a:fillRef>
+        <a:effectRef idx="0">
+          <a:scrgbClr r="0" g="0" b="0"/>
+        </a:effectRef>
+        <a:fontRef idx="minor"/>
+      </dsp:style>
+    </dsp:sp>
+    <dsp:sp modelId="{A822FBC4-5451-437C-8F7C-66651E8E77CD}">
+      <dsp:nvSpPr>
+        <dsp:cNvPr id="0" name=""/>
+        <dsp:cNvSpPr/>
+      </dsp:nvSpPr>
+      <dsp:spPr>
+        <a:xfrm>
+          <a:off x="8547675" y="949566"/>
+          <a:ext cx="725326" cy="725326"/>
+        </a:xfrm>
+        <a:prstGeom prst="rect">
+          <a:avLst/>
+        </a:prstGeom>
+        <a:blipFill>
+          <a:blip xmlns:r="http://schemas.openxmlformats.org/officeDocument/2006/relationships" r:embed="rId7">
+            <a:extLst>
+              <a:ext uri="{28A0092B-C50C-407E-A947-70E740481C1C}">
+                <a14:useLocalDpi xmlns:a14="http://schemas.microsoft.com/office/drawing/2010/main" val="0"/>
+              </a:ext>
+              <a:ext uri="{96DAC541-7B7A-43D3-8B79-37D633B846F1}">
+                <asvg:svgBlip xmlns:asvg="http://schemas.microsoft.com/office/drawing/2016/SVG/main" r:embed="rId8"/>
+              </a:ext>
+            </a:extLst>
+          </a:blip>
+          <a:stretch>
+            <a:fillRect/>
+          </a:stretch>
+        </a:blipFill>
+        <a:ln w="19050" cap="flat" cmpd="sng" algn="ctr">
+          <a:solidFill>
+            <a:schemeClr val="lt1">
+              <a:hueOff val="0"/>
+              <a:satOff val="0"/>
+              <a:lumOff val="0"/>
+              <a:alphaOff val="0"/>
+            </a:schemeClr>
+          </a:solidFill>
+          <a:prstDash val="solid"/>
+          <a:miter lim="800000"/>
+        </a:ln>
+        <a:effectLst/>
+      </dsp:spPr>
+      <dsp:style>
+        <a:lnRef idx="2">
+          <a:scrgbClr r="0" g="0" b="0"/>
+        </a:lnRef>
+        <a:fillRef idx="1">
+          <a:scrgbClr r="0" g="0" b="0"/>
+        </a:fillRef>
+        <a:effectRef idx="0">
+          <a:scrgbClr r="0" g="0" b="0"/>
+        </a:effectRef>
+        <a:fontRef idx="minor">
+          <a:schemeClr val="lt1"/>
+        </a:fontRef>
+      </dsp:style>
+    </dsp:sp>
+    <dsp:sp modelId="{7E2FE57B-C87E-4ED0-89A0-A3169AA5E15D}">
+      <dsp:nvSpPr>
+        <dsp:cNvPr id="0" name=""/>
+        <dsp:cNvSpPr/>
+      </dsp:nvSpPr>
+      <dsp:spPr>
+        <a:xfrm>
+          <a:off x="7874157" y="2338048"/>
+          <a:ext cx="2072362" cy="1536328"/>
+        </a:xfrm>
+        <a:prstGeom prst="rect">
+          <a:avLst/>
+        </a:prstGeom>
+        <a:noFill/>
+        <a:ln>
+          <a:noFill/>
+        </a:ln>
+        <a:effectLst/>
+      </dsp:spPr>
+      <dsp:style>
+        <a:lnRef idx="0">
+          <a:scrgbClr r="0" g="0" b="0"/>
+        </a:lnRef>
+        <a:fillRef idx="0">
+          <a:scrgbClr r="0" g="0" b="0"/>
+        </a:fillRef>
+        <a:effectRef idx="0">
+          <a:scrgbClr r="0" g="0" b="0"/>
+        </a:effectRef>
+        <a:fontRef idx="minor"/>
+      </dsp:style>
+      <dsp:txBody>
+        <a:bodyPr spcFirstLastPara="0" vert="horz" wrap="square" lIns="0" tIns="0" rIns="0" bIns="0" numCol="1" spcCol="1270" anchor="t" anchorCtr="0">
+          <a:noAutofit/>
+        </a:bodyPr>
+        <a:lstStyle/>
+        <a:p>
+          <a:pPr marL="0" lvl="0" indent="0" algn="ctr" defTabSz="488950">
+            <a:lnSpc>
+              <a:spcPct val="100000"/>
+            </a:lnSpc>
+            <a:spcBef>
+              <a:spcPct val="0"/>
+            </a:spcBef>
+            <a:spcAft>
+              <a:spcPct val="35000"/>
+            </a:spcAft>
+            <a:buNone/>
+            <a:defRPr cap="all"/>
+          </a:pPr>
+          <a:r>
+            <a:rPr lang="en-US" sz="1100" kern="1200"/>
+            <a:t>The goal is to create an easy to access Marina website that allows any user to book a slip with zero hassle along with creating a backend that will allow for easy management of the reservations.</a:t>
+          </a:r>
+        </a:p>
+      </dsp:txBody>
+      <dsp:txXfrm>
+        <a:off x="7874157" y="2338048"/>
+        <a:ext cx="2072362" cy="1536328"/>
+      </dsp:txXfrm>
+    </dsp:sp>
+  </dsp:spTree>
+</dsp:drawing>
+</file>
+
+<file path=ppt/diagrams/layout1.xml><?xml version="1.0" encoding="utf-8"?>
+<dgm:layoutDef xmlns:dgm="http://schemas.openxmlformats.org/drawingml/2006/diagram" xmlns:a="http://schemas.openxmlformats.org/drawingml/2006/main" uniqueId="urn:microsoft.com/office/officeart/2018/5/layout/IconCircleLabelList">
+  <dgm:title val="Icon Circle Label List"/>
+  <dgm:desc val="Use to show non-sequential or grouped chunks of information accompanied by a related visuals. Works best with icons or small pictures with short text captions."/>
+  <dgm:catLst>
+    <dgm:cat type="icon" pri="500"/>
+  </dgm:catLst>
+  <dgm:sampData useDef="1">
+    <dgm:dataModel>
+      <dgm:ptLst/>
+      <dgm:bg/>
+      <dgm:whole/>
+    </dgm:dataModel>
+  </dgm:sampData>
+  <dgm:styleData useDef="1">
+    <dgm:dataModel>
+      <dgm:ptLst/>
+      <dgm:bg/>
+      <dgm:whole/>
+    </dgm:dataModel>
+  </dgm:styleData>
+  <dgm:clrData useDef="1">
+    <dgm:dataModel>
+      <dgm:ptLst/>
+      <dgm:bg/>
+      <dgm:whole/>
+    </dgm:dataModel>
+  </dgm:clrData>
+  <dgm:layoutNode name="root">
+    <dgm:varLst>
+      <dgm:dir/>
+      <dgm:resizeHandles val="exact"/>
+    </dgm:varLst>
+    <dgm:choose name="Name0">
+      <dgm:if name="Name1" axis="self" func="var" arg="dir" op="equ" val="norm">
+        <dgm:alg type="snake">
+          <dgm:param type="grDir" val="tL"/>
+          <dgm:param type="flowDir" val="row"/>
+          <dgm:param type="contDir" val="sameDir"/>
+          <dgm:param type="off" val="ctr"/>
+          <dgm:param type="vertAlign" val="mid"/>
+          <dgm:param type="horzAlign" val="ctr"/>
+        </dgm:alg>
+      </dgm:if>
+      <dgm:else name="Name2">
+        <dgm:alg type="snake">
+          <dgm:param type="grDir" val="tR"/>
+          <dgm:param type="flowDir" val="row"/>
+          <dgm:param type="contDir" val="sameDir"/>
+          <dgm:param type="off" val="ctr"/>
+          <dgm:param type="vertAlign" val="mid"/>
+          <dgm:param type="horzAlign" val="ctr"/>
+        </dgm:alg>
+      </dgm:else>
+    </dgm:choose>
+    <dgm:shape xmlns:r="http://schemas.openxmlformats.org/officeDocument/2006/relationships" r:blip="">
+      <dgm:adjLst/>
+    </dgm:shape>
+    <dgm:presOf/>
+    <dgm:choose name="Name3">
+      <dgm:if name="Name4" axis="ch" ptType="node" func="cnt" op="lte" val="2">
+        <dgm:constrLst>
+          <dgm:constr type="h" for="ch" forName="compNode" refType="h" fact="0.4"/>
+          <dgm:constr type="w" for="ch" forName="compNode" val="100"/>
+          <dgm:constr type="w" for="ch" forName="sibTrans" refType="w" refFor="ch" refForName="compNode" fact="0.175"/>
+          <dgm:constr type="sp" refType="w" refFor="ch" refForName="compNode" op="equ" fact="0.25"/>
+          <dgm:constr type="primFontSz" for="des" ptType="node" op="equ" val="44"/>
+          <dgm:constr type="h" for="des" forName="compNode" op="equ"/>
+          <dgm:constr type="h" for="des" forName="textRect" op="equ"/>
+        </dgm:constrLst>
+      </dgm:if>
+      <dgm:if name="Name5" axis="ch" ptType="node" func="cnt" op="lte" val="3">
+        <dgm:constrLst>
+          <dgm:constr type="h" for="ch" forName="compNode" refType="h" fact="0.4"/>
+          <dgm:constr type="w" for="ch" forName="compNode" val="100"/>
+          <dgm:constr type="w" for="ch" forName="sibTrans" refType="w" refFor="ch" refForName="compNode" fact="0.175"/>
+          <dgm:constr type="sp" refType="w" refFor="ch" refForName="compNode" op="equ" fact="0.25"/>
+          <dgm:constr type="primFontSz" for="des" ptType="node" op="equ" val="40"/>
+          <dgm:constr type="h" for="des" forName="compNode" op="equ"/>
+          <dgm:constr type="h" for="des" forName="textRect" op="equ"/>
+        </dgm:constrLst>
+      </dgm:if>
+      <dgm:if name="Name6" axis="ch" ptType="node" func="cnt" op="lte" val="4">
+        <dgm:constrLst>
+          <dgm:constr type="h" for="ch" forName="compNode" refType="h" fact="0.4"/>
+          <dgm:constr type="w" for="ch" forName="compNode" refType="w"/>
+          <dgm:constr type="w" for="ch" forName="sibTrans" refType="w" refFor="ch" refForName="compNode" fact="0.175"/>
+          <dgm:constr type="sp" refType="w" refFor="ch" refForName="compNode" op="equ" fact="0.25"/>
+          <dgm:constr type="primFontSz" for="des" ptType="node" op="equ" val="32"/>
+          <dgm:constr type="h" for="des" forName="compNode" op="equ"/>
+          <dgm:constr type="h" for="des" forName="textRect" op="equ"/>
+        </dgm:constrLst>
+      </dgm:if>
+      <dgm:else name="Name7">
+        <dgm:constrLst>
+          <dgm:constr type="h" for="ch" forName="compNode" refType="h" fact="0.4"/>
+          <dgm:constr type="w" for="ch" forName="compNode" refType="w"/>
+          <dgm:constr type="w" for="ch" forName="sibTrans" refType="w" refFor="ch" refForName="compNode" fact="0.175"/>
+          <dgm:constr type="sp" refType="w" refFor="ch" refForName="compNode" op="equ" fact="0.25"/>
+          <dgm:constr type="primFontSz" for="des" ptType="node" op="equ" val="24"/>
+          <dgm:constr type="h" for="des" forName="compNode" op="equ"/>
+          <dgm:constr type="h" for="des" forName="textRect" op="equ"/>
+        </dgm:constrLst>
+      </dgm:else>
+    </dgm:choose>
+    <dgm:ruleLst>
+      <dgm:rule type="w" for="ch" forName="compNode" val="50" fact="NaN" max="NaN"/>
+    </dgm:ruleLst>
+    <dgm:forEach name="Name8" axis="ch" ptType="node">
+      <dgm:layoutNode name="compNode">
+        <dgm:alg type="composite"/>
+        <dgm:shape xmlns:r="http://schemas.openxmlformats.org/officeDocument/2006/relationships" r:blip="">
+          <dgm:adjLst/>
+        </dgm:shape>
+        <dgm:presOf axis="self"/>
+        <dgm:constrLst>
+          <dgm:constr type="w" for="ch" forName="iconBgRect" refType="w" fact="0.61"/>
+          <dgm:constr type="h" for="ch" forName="iconBgRect" refType="w" refFor="ch" refForName="iconBgRect"/>
+          <dgm:constr type="t" for="ch" forName="iconBgRect"/>
+          <dgm:constr type="ctrX" for="ch" forName="iconBgRect" refType="w" fact="0.5"/>
+          <dgm:constr type="w" for="ch" forName="iconRect" refType="w" fact="0.35"/>
+          <dgm:constr type="h" for="ch" forName="iconRect" refType="w" refFor="ch" refForName="iconRect"/>
+          <dgm:constr type="ctrX" for="ch" forName="iconRect" refType="ctrX" refFor="ch" refForName="iconBgRect"/>
+          <dgm:constr type="ctrY" for="ch" forName="iconRect" refType="ctrY" refFor="ch" refForName="iconBgRect"/>
+          <dgm:constr type="h" for="ch" forName="spaceRect" refType="w" fact="0.19"/>
+          <dgm:constr type="w" for="ch" forName="spaceRect" refType="w"/>
+          <dgm:constr type="l" for="ch" forName="spaceRect"/>
+          <dgm:constr type="t" for="ch" forName="spaceRect" refType="b" refFor="ch" refForName="iconBgRect"/>
+          <dgm:constr type="h" for="ch" forName="textRect" val="20"/>
+          <dgm:constr type="w" for="ch" forName="textRect" refType="w"/>
+          <dgm:constr type="l" for="ch" forName="textRect"/>
+          <dgm:constr type="t" for="ch" forName="textRect" refType="b" refFor="ch" refForName="spaceRect"/>
+        </dgm:constrLst>
+        <dgm:ruleLst>
+          <dgm:rule type="h" val="INF" fact="NaN" max="NaN"/>
+        </dgm:ruleLst>
+        <dgm:layoutNode name="iconBgRect" styleLbl="bgShp">
+          <dgm:alg type="sp"/>
+          <dgm:shape xmlns:r="http://schemas.openxmlformats.org/officeDocument/2006/relationships" type="ellipse" r:blip="">
+            <dgm:adjLst/>
+          </dgm:shape>
+          <dgm:presOf/>
+          <dgm:constrLst/>
+          <dgm:ruleLst/>
+        </dgm:layoutNode>
+        <dgm:layoutNode name="iconRect" styleLbl="node1">
+          <dgm:alg type="sp"/>
+          <dgm:shape xmlns:r="http://schemas.openxmlformats.org/officeDocument/2006/relationships" type="rect" r:blip="" blipPhldr="1">
+            <dgm:adjLst/>
+          </dgm:shape>
+          <dgm:presOf/>
+          <dgm:constrLst/>
+          <dgm:ruleLst/>
+        </dgm:layoutNode>
+        <dgm:layoutNode name="spaceRect">
+          <dgm:alg type="sp"/>
+          <dgm:shape xmlns:r="http://schemas.openxmlformats.org/officeDocument/2006/relationships" r:blip="">
+            <dgm:adjLst/>
+          </dgm:shape>
+          <dgm:presOf/>
+          <dgm:constrLst/>
+          <dgm:ruleLst/>
+        </dgm:layoutNode>
+        <dgm:layoutNode name="textRect" styleLbl="revTx">
+          <dgm:varLst>
+            <dgm:chMax val="1"/>
+            <dgm:chPref val="1"/>
+          </dgm:varLst>
+          <dgm:alg type="tx">
+            <dgm:param type="txAnchorVert" val="t"/>
+          </dgm:alg>
+          <dgm:shape xmlns:r="http://schemas.openxmlformats.org/officeDocument/2006/relationships" type="rect" r:blip="">
+            <dgm:adjLst/>
+          </dgm:shape>
+          <dgm:presOf axis="self" ptType="node"/>
+          <dgm:constrLst>
+            <dgm:constr type="lMarg"/>
+            <dgm:constr type="rMarg"/>
+            <dgm:constr type="tMarg"/>
+            <dgm:constr type="bMarg"/>
+          </dgm:constrLst>
+          <dgm:ruleLst>
+            <dgm:rule type="primFontSz" val="11" fact="NaN" max="NaN"/>
+            <dgm:rule type="h" val="INF" fact="NaN" max="NaN"/>
+          </dgm:ruleLst>
+        </dgm:layoutNode>
+      </dgm:layoutNode>
+      <dgm:forEach name="Name9" axis="followSib" ptType="sibTrans" cnt="1">
+        <dgm:layoutNode name="sibTrans">
+          <dgm:alg type="sp"/>
+          <dgm:shape xmlns:r="http://schemas.openxmlformats.org/officeDocument/2006/relationships" r:blip="">
+            <dgm:adjLst/>
+          </dgm:shape>
+          <dgm:presOf axis="self"/>
+          <dgm:constrLst/>
+          <dgm:ruleLst/>
+        </dgm:layoutNode>
+      </dgm:forEach>
+    </dgm:forEach>
+  </dgm:layoutNode>
+  <dgm:extLst>
+    <a:ext uri="{68A01E43-0DF5-4B5B-8FA6-DAF915123BFB}">
+      <dgm1612:lstStyle xmlns:dgm1612="http://schemas.microsoft.com/office/drawing/2016/12/diagram">
+        <a:lvl1pPr>
+          <a:lnSpc>
+            <a:spcPct val="100000"/>
+          </a:lnSpc>
+          <a:defRPr cap="all"/>
+        </a:lvl1pPr>
+      </dgm1612:lstStyle>
+    </a:ext>
+  </dgm:extLst>
+</dgm:layoutDef>
+</file>
+
+<file path=ppt/diagrams/quickStyle1.xml><?xml version="1.0" encoding="utf-8"?>
+<dgm:styleDef xmlns:dgm="http://schemas.openxmlformats.org/drawingml/2006/diagram" xmlns:a="http://schemas.openxmlformats.org/drawingml/2006/main" uniqueId="urn:microsoft.com/office/officeart/2005/8/quickstyle/simple1">
+  <dgm:title val=""/>
+  <dgm:desc val=""/>
+  <dgm:catLst>
+    <dgm:cat type="simple" pri="10100"/>
+  </dgm:catLst>
+  <dgm:scene3d>
+    <a:camera prst="orthographicFront"/>
+    <a:lightRig rig="threePt" dir="t"/>
+  </dgm:scene3d>
+  <dgm:styleLbl name="node0">
+    <dgm:scene3d>
+      <a:camera prst="orthographicFront"/>
+      <a:lightRig rig="threePt" dir="t"/>
+    </dgm:scene3d>
+    <dgm:sp3d/>
+    <dgm:txPr/>
+    <dgm:style>
+      <a:lnRef idx="2">
+        <a:scrgbClr r="0" g="0" b="0"/>
+      </a:lnRef>
+      <a:fillRef idx="1">
+        <a:scrgbClr r="0" g="0" b="0"/>
+      </a:fillRef>
+      <a:effectRef idx="0">
+        <a:scrgbClr r="0" g="0" b="0"/>
+      </a:effectRef>
+      <a:fontRef idx="minor">
+        <a:schemeClr val="lt1"/>
+      </a:fontRef>
+    </dgm:style>
+  </dgm:styleLbl>
+  <dgm:styleLbl name="lnNode1">
+    <dgm:scene3d>
+      <a:camera prst="orthographicFront"/>
+      <a:lightRig rig="threePt" dir="t"/>
+    </dgm:scene3d>
+    <dgm:sp3d/>
+    <dgm:txPr/>
+    <dgm:style>
+      <a:lnRef idx="2">
+        <a:scrgbClr r="0" g="0" b="0"/>
+      </a:lnRef>
+      <a:fillRef idx="1">
+        <a:scrgbClr r="0" g="0" b="0"/>
+      </a:fillRef>
+      <a:effectRef idx="0">
+        <a:scrgbClr r="0" g="0" b="0"/>
+      </a:effectRef>
+      <a:fontRef idx="minor">
+        <a:schemeClr val="lt1"/>
+      </a:fontRef>
+    </dgm:style>
+  </dgm:styleLbl>
+  <dgm:styleLbl name="vennNode1">
+    <dgm:scene3d>
+      <a:camera prst="orthographicFront"/>
+      <a:lightRig rig="threePt" dir="t"/>
+    </dgm:scene3d>
+    <dgm:sp3d/>
+    <dgm:txPr/>
+    <dgm:style>
+      <a:lnRef idx="2">
+        <a:scrgbClr r="0" g="0" b="0"/>
+      </a:lnRef>
+      <a:fillRef idx="1">
+        <a:scrgbClr r="0" g="0" b="0"/>
+      </a:fillRef>
+      <a:effectRef idx="0">
+        <a:scrgbClr r="0" g="0" b="0"/>
+      </a:effectRef>
+      <a:fontRef idx="minor">
+        <a:schemeClr val="tx1"/>
+      </a:fontRef>
+    </dgm:style>
+  </dgm:styleLbl>
+  <dgm:styleLbl name="alignNode1">
+    <dgm:scene3d>
+      <a:camera prst="orthographicFront"/>
+      <a:lightRig rig="threePt" dir="t"/>
+    </dgm:scene3d>
+    <dgm:sp3d/>
+    <dgm:txPr/>
+    <dgm:style>
+      <a:lnRef idx="2">
+        <a:scrgbClr r="0" g="0" b="0"/>
+      </a:lnRef>
+      <a:fillRef idx="1">
+        <a:scrgbClr r="0" g="0" b="0"/>
+      </a:fillRef>
+      <a:effectRef idx="0">
+        <a:scrgbClr r="0" g="0" b="0"/>
+      </a:effectRef>
+      <a:fontRef idx="minor">
+        <a:schemeClr val="lt1"/>
+      </a:fontRef>
+    </dgm:style>
+  </dgm:styleLbl>
+  <dgm:styleLbl name="node1">
+    <dgm:scene3d>
+      <a:camera prst="orthographicFront"/>
+      <a:lightRig rig="threePt" dir="t"/>
+    </dgm:scene3d>
+    <dgm:sp3d/>
+    <dgm:txPr/>
+    <dgm:style>
+      <a:lnRef idx="2">
+        <a:scrgbClr r="0" g="0" b="0"/>
+      </a:lnRef>
+      <a:fillRef idx="1">
+        <a:scrgbClr r="0" g="0" b="0"/>
+      </a:fillRef>
+      <a:effectRef idx="0">
+        <a:scrgbClr r="0" g="0" b="0"/>
+      </a:effectRef>
+      <a:fontRef idx="minor">
+        <a:schemeClr val="lt1"/>
+      </a:fontRef>
+    </dgm:style>
+  </dgm:styleLbl>
+  <dgm:styleLbl name="node2">
+    <dgm:scene3d>
+      <a:camera prst="orthographicFront"/>
+      <a:lightRig rig="threePt" dir="t"/>
+    </dgm:scene3d>
+    <dgm:sp3d/>
+    <dgm:txPr/>
+    <dgm:style>
+      <a:lnRef idx="2">
+        <a:scrgbClr r="0" g="0" b="0"/>
+      </a:lnRef>
+      <a:fillRef idx="1">
+        <a:scrgbClr r="0" g="0" b="0"/>
+      </a:fillRef>
+      <a:effectRef idx="0">
+        <a:scrgbClr r="0" g="0" b="0"/>
+      </a:effectRef>
+      <a:fontRef idx="minor">
+        <a:schemeClr val="lt1"/>
+      </a:fontRef>
+    </dgm:style>
+  </dgm:styleLbl>
+  <dgm:styleLbl name="node3">
+    <dgm:scene3d>
+      <a:camera prst="orthographicFront"/>
+      <a:lightRig rig="threePt" dir="t"/>
+    </dgm:scene3d>
+    <dgm:sp3d/>
+    <dgm:txPr/>
+    <dgm:style>
+      <a:lnRef idx="2">
+        <a:scrgbClr r="0" g="0" b="0"/>
+      </a:lnRef>
+      <a:fillRef idx="1">
+        <a:scrgbClr r="0" g="0" b="0"/>
+      </a:fillRef>
+      <a:effectRef idx="0">
+        <a:scrgbClr r="0" g="0" b="0"/>
+      </a:effectRef>
+      <a:fontRef idx="minor">
+        <a:schemeClr val="lt1"/>
+      </a:fontRef>
+    </dgm:style>
+  </dgm:styleLbl>
+  <dgm:styleLbl name="node4">
+    <dgm:scene3d>
+      <a:camera prst="orthographicFront"/>
+      <a:lightRig rig="threePt" dir="t"/>
+    </dgm:scene3d>
+    <dgm:sp3d/>
+    <dgm:txPr/>
+    <dgm:style>
+      <a:lnRef idx="2">
+        <a:scrgbClr r="0" g="0" b="0"/>
+      </a:lnRef>
+      <a:fillRef idx="1">
+        <a:scrgbClr r="0" g="0" b="0"/>
+      </a:fillRef>
+      <a:effectRef idx="0">
+        <a:scrgbClr r="0" g="0" b="0"/>
+      </a:effectRef>
+      <a:fontRef idx="minor">
+        <a:schemeClr val="lt1"/>
+      </a:fontRef>
+    </dgm:style>
+  </dgm:styleLbl>
+  <dgm:styleLbl name="fgImgPlace1">
+    <dgm:scene3d>
+      <a:camera prst="orthographicFront"/>
+      <a:lightRig rig="threePt" dir="t"/>
+    </dgm:scene3d>
+    <dgm:sp3d/>
+    <dgm:txPr/>
+    <dgm:style>
+      <a:lnRef idx="2">
+        <a:scrgbClr r="0" g="0" b="0"/>
+      </a:lnRef>
+      <a:fillRef idx="1">
+        <a:scrgbClr r="0" g="0" b="0"/>
+      </a:fillRef>
+      <a:effectRef idx="0">
+        <a:scrgbClr r="0" g="0" b="0"/>
+      </a:effectRef>
+      <a:fontRef idx="minor"/>
+    </dgm:style>
+  </dgm:styleLbl>
+  <dgm:styleLbl name="alignImgPlace1">
+    <dgm:scene3d>
+      <a:camera prst="orthographicFront"/>
+      <a:lightRig rig="threePt" dir="t"/>
+    </dgm:scene3d>
+    <dgm:sp3d/>
+    <dgm:txPr/>
+    <dgm:style>
+      <a:lnRef idx="2">
+        <a:scrgbClr r="0" g="0" b="0"/>
+      </a:lnRef>
+      <a:fillRef idx="1">
+        <a:scrgbClr r="0" g="0" b="0"/>
+      </a:fillRef>
+      <a:effectRef idx="0">
+        <a:scrgbClr r="0" g="0" b="0"/>
+      </a:effectRef>
+      <a:fontRef idx="minor"/>
+    </dgm:style>
+  </dgm:styleLbl>
+  <dgm:styleLbl name="bgImgPlace1">
+    <dgm:scene3d>
+      <a:camera prst="orthographicFront"/>
+      <a:lightRig rig="threePt" dir="t"/>
+    </dgm:scene3d>
+    <dgm:sp3d/>
+    <dgm:txPr/>
+    <dgm:style>
+      <a:lnRef idx="2">
+        <a:scrgbClr r="0" g="0" b="0"/>
+      </a:lnRef>
+      <a:fillRef idx="1">
+        <a:scrgbClr r="0" g="0" b="0"/>
+      </a:fillRef>
+      <a:effectRef idx="0">
+        <a:scrgbClr r="0" g="0" b="0"/>
+      </a:effectRef>
+      <a:fontRef idx="minor"/>
+    </dgm:style>
+  </dgm:styleLbl>
+  <dgm:styleLbl name="sibTrans2D1">
+    <dgm:scene3d>
+      <a:camera prst="orthographicFront"/>
+      <a:lightRig rig="threePt" dir="t"/>
+    </dgm:scene3d>
+    <dgm:sp3d/>
+    <dgm:txPr/>
+    <dgm:style>
+      <a:lnRef idx="0">
+        <a:scrgbClr r="0" g="0" b="0"/>
+      </a:lnRef>
+      <a:fillRef idx="1">
+        <a:scrgbClr r="0" g="0" b="0"/>
+      </a:fillRef>
+      <a:effectRef idx="0">
+        <a:scrgbClr r="0" g="0" b="0"/>
+      </a:effectRef>
+      <a:fontRef idx="minor">
+        <a:schemeClr val="lt1"/>
+      </a:fontRef>
+    </dgm:style>
+  </dgm:styleLbl>
+  <dgm:styleLbl name="fgSibTrans2D1">
+    <dgm:scene3d>
+      <a:camera prst="orthographicFront"/>
+      <a:lightRig rig="threePt" dir="t"/>
+    </dgm:scene3d>
+    <dgm:sp3d/>
+    <dgm:txPr/>
+    <dgm:style>
+      <a:lnRef idx="0">
+        <a:scrgbClr r="0" g="0" b="0"/>
+      </a:lnRef>
+      <a:fillRef idx="1">
+        <a:scrgbClr r="0" g="0" b="0"/>
+      </a:fillRef>
+      <a:effectRef idx="0">
+        <a:scrgbClr r="0" g="0" b="0"/>
+      </a:effectRef>
+      <a:fontRef idx="minor">
+        <a:schemeClr val="lt1"/>
+      </a:fontRef>
+    </dgm:style>
+  </dgm:styleLbl>
+  <dgm:styleLbl name="bgSibTrans2D1">
+    <dgm:scene3d>
+      <a:camera prst="orthographicFront"/>
+      <a:lightRig rig="threePt" dir="t"/>
+    </dgm:scene3d>
+    <dgm:sp3d/>
+    <dgm:txPr/>
+    <dgm:style>
+      <a:lnRef idx="0">
+        <a:scrgbClr r="0" g="0" b="0"/>
+      </a:lnRef>
+      <a:fillRef idx="1">
+        <a:scrgbClr r="0" g="0" b="0"/>
+      </a:fillRef>
+      <a:effectRef idx="0">
+        <a:scrgbClr r="0" g="0" b="0"/>
+      </a:effectRef>
+      <a:fontRef idx="minor">
+        <a:schemeClr val="lt1"/>
+      </a:fontRef>
+    </dgm:style>
+  </dgm:styleLbl>
+  <dgm:styleLbl name="sibTrans1D1">
+    <dgm:scene3d>
+      <a:camera prst="orthographicFront"/>
+      <a:lightRig rig="threePt" dir="t"/>
+    </dgm:scene3d>
+    <dgm:sp3d/>
+    <dgm:txPr/>
+    <dgm:style>
+      <a:lnRef idx="1">
+        <a:scrgbClr r="0" g="0" b="0"/>
+      </a:lnRef>
+      <a:fillRef idx="0">
+        <a:scrgbClr r="0" g="0" b="0"/>
+      </a:fillRef>
+      <a:effectRef idx="0">
+        <a:scrgbClr r="0" g="0" b="0"/>
+      </a:effectRef>
+      <a:fontRef idx="minor"/>
+    </dgm:style>
+  </dgm:styleLbl>
+  <dgm:styleLbl name="callout">
+    <dgm:scene3d>
+      <a:camera prst="orthographicFront"/>
+      <a:lightRig rig="threePt" dir="t"/>
+    </dgm:scene3d>
+    <dgm:sp3d/>
+    <dgm:txPr/>
+    <dgm:style>
+      <a:lnRef idx="2">
+        <a:scrgbClr r="0" g="0" b="0"/>
+      </a:lnRef>
+      <a:fillRef idx="1">
+        <a:scrgbClr r="0" g="0" b="0"/>
+      </a:fillRef>
+      <a:effectRef idx="0">
+        <a:scrgbClr r="0" g="0" b="0"/>
+      </a:effectRef>
+      <a:fontRef idx="minor"/>
+    </dgm:style>
+  </dgm:styleLbl>
+  <dgm:styleLbl name="asst0">
+    <dgm:scene3d>
+      <a:camera prst="orthographicFront"/>
+      <a:lightRig rig="threePt" dir="t"/>
+    </dgm:scene3d>
+    <dgm:sp3d/>
+    <dgm:txPr/>
+    <dgm:style>
+      <a:lnRef idx="2">
+        <a:scrgbClr r="0" g="0" b="0"/>
+      </a:lnRef>
+      <a:fillRef idx="1">
+        <a:scrgbClr r="0" g="0" b="0"/>
+      </a:fillRef>
+      <a:effectRef idx="0">
+        <a:scrgbClr r="0" g="0" b="0"/>
+      </a:effectRef>
+      <a:fontRef idx="minor">
+        <a:schemeClr val="lt1"/>
+      </a:fontRef>
+    </dgm:style>
+  </dgm:styleLbl>
+  <dgm:styleLbl name="asst1">
+    <dgm:scene3d>
+      <a:camera prst="orthographicFront"/>
+      <a:lightRig rig="threePt" dir="t"/>
+    </dgm:scene3d>
+    <dgm:sp3d/>
+    <dgm:txPr/>
+    <dgm:style>
+      <a:lnRef idx="2">
+        <a:scrgbClr r="0" g="0" b="0"/>
+      </a:lnRef>
+      <a:fillRef idx="1">
+        <a:scrgbClr r="0" g="0" b="0"/>
+      </a:fillRef>
+      <a:effectRef idx="0">
+        <a:scrgbClr r="0" g="0" b="0"/>
+      </a:effectRef>
+      <a:fontRef idx="minor">
+        <a:schemeClr val="lt1"/>
+      </a:fontRef>
+    </dgm:style>
+  </dgm:styleLbl>
+  <dgm:styleLbl name="asst2">
+    <dgm:scene3d>
+      <a:camera prst="orthographicFront"/>
+      <a:lightRig rig="threePt" dir="t"/>
+    </dgm:scene3d>
+    <dgm:sp3d/>
+    <dgm:txPr/>
+    <dgm:style>
+      <a:lnRef idx="2">
+        <a:scrgbClr r="0" g="0" b="0"/>
+      </a:lnRef>
+      <a:fillRef idx="1">
+        <a:scrgbClr r="0" g="0" b="0"/>
+      </a:fillRef>
+      <a:effectRef idx="0">
+        <a:scrgbClr r="0" g="0" b="0"/>
+      </a:effectRef>
+      <a:fontRef idx="minor">
+        <a:schemeClr val="lt1"/>
+      </a:fontRef>
+    </dgm:style>
+  </dgm:styleLbl>
+  <dgm:styleLbl name="asst3">
+    <dgm:scene3d>
+      <a:camera prst="orthographicFront"/>
+      <a:lightRig rig="threePt" dir="t"/>
+    </dgm:scene3d>
+    <dgm:sp3d/>
+    <dgm:txPr/>
+    <dgm:style>
+      <a:lnRef idx="2">
+        <a:scrgbClr r="0" g="0" b="0"/>
+      </a:lnRef>
+      <a:fillRef idx="1">
+        <a:scrgbClr r="0" g="0" b="0"/>
+      </a:fillRef>
+      <a:effectRef idx="0">
+        <a:scrgbClr r="0" g="0" b="0"/>
+      </a:effectRef>
+      <a:fontRef idx="minor">
+        <a:schemeClr val="lt1"/>
+      </a:fontRef>
+    </dgm:style>
+  </dgm:styleLbl>
+  <dgm:styleLbl name="asst4">
+    <dgm:scene3d>
+      <a:camera prst="orthographicFront"/>
+      <a:lightRig rig="threePt" dir="t"/>
+    </dgm:scene3d>
+    <dgm:sp3d/>
+    <dgm:txPr/>
+    <dgm:style>
+      <a:lnRef idx="2">
+        <a:scrgbClr r="0" g="0" b="0"/>
+      </a:lnRef>
+      <a:fillRef idx="1">
+        <a:scrgbClr r="0" g="0" b="0"/>
+      </a:fillRef>
+      <a:effectRef idx="0">
+        <a:scrgbClr r="0" g="0" b="0"/>
+      </a:effectRef>
+      <a:fontRef idx="minor">
+        <a:schemeClr val="lt1"/>
+      </a:fontRef>
+    </dgm:style>
+  </dgm:styleLbl>
+  <dgm:styleLbl name="parChTrans2D1">
+    <dgm:scene3d>
+      <a:camera prst="orthographicFront"/>
+      <a:lightRig rig="threePt" dir="t"/>
+    </dgm:scene3d>
+    <dgm:sp3d/>
+    <dgm:txPr/>
+    <dgm:style>
+      <a:lnRef idx="2">
+        <a:scrgbClr r="0" g="0" b="0"/>
+      </a:lnRef>
+      <a:fillRef idx="1">
+        <a:scrgbClr r="0" g="0" b="0"/>
+      </a:fillRef>
+      <a:effectRef idx="0">
+        <a:scrgbClr r="0" g="0" b="0"/>
+      </a:effectRef>
+      <a:fontRef idx="minor">
+        <a:schemeClr val="lt1"/>
+      </a:fontRef>
+    </dgm:style>
+  </dgm:styleLbl>
+  <dgm:styleLbl name="parChTrans2D2">
+    <dgm:scene3d>
+      <a:camera prst="orthographicFront"/>
+      <a:lightRig rig="threePt" dir="t"/>
+    </dgm:scene3d>
+    <dgm:sp3d/>
+    <dgm:txPr/>
+    <dgm:style>
+      <a:lnRef idx="2">
+        <a:scrgbClr r="0" g="0" b="0"/>
+      </a:lnRef>
+      <a:fillRef idx="1">
+        <a:scrgbClr r="0" g="0" b="0"/>
+      </a:fillRef>
+      <a:effectRef idx="0">
+        <a:scrgbClr r="0" g="0" b="0"/>
+      </a:effectRef>
+      <a:fontRef idx="minor">
+        <a:schemeClr val="lt1"/>
+      </a:fontRef>
+    </dgm:style>
+  </dgm:styleLbl>
+  <dgm:styleLbl name="parChTrans2D3">
+    <dgm:scene3d>
+      <a:camera prst="orthographicFront"/>
+      <a:lightRig rig="threePt" dir="t"/>
+    </dgm:scene3d>
+    <dgm:sp3d/>
+    <dgm:txPr/>
+    <dgm:style>
+      <a:lnRef idx="2">
+        <a:scrgbClr r="0" g="0" b="0"/>
+      </a:lnRef>
+      <a:fillRef idx="1">
+        <a:scrgbClr r="0" g="0" b="0"/>
+      </a:fillRef>
+      <a:effectRef idx="0">
+        <a:scrgbClr r="0" g="0" b="0"/>
+      </a:effectRef>
+      <a:fontRef idx="minor">
+        <a:schemeClr val="lt1"/>
+      </a:fontRef>
+    </dgm:style>
+  </dgm:styleLbl>
+  <dgm:styleLbl name="parChTrans2D4">
+    <dgm:scene3d>
+      <a:camera prst="orthographicFront"/>
+      <a:lightRig rig="threePt" dir="t"/>
+    </dgm:scene3d>
+    <dgm:sp3d/>
+    <dgm:txPr/>
+    <dgm:style>
+      <a:lnRef idx="2">
+        <a:scrgbClr r="0" g="0" b="0"/>
+      </a:lnRef>
+      <a:fillRef idx="1">
+        <a:scrgbClr r="0" g="0" b="0"/>
+      </a:fillRef>
+      <a:effectRef idx="0">
+        <a:scrgbClr r="0" g="0" b="0"/>
+      </a:effectRef>
+      <a:fontRef idx="minor">
+        <a:schemeClr val="lt1"/>
+      </a:fontRef>
+    </dgm:style>
+  </dgm:styleLbl>
+  <dgm:styleLbl name="parChTrans1D1">
+    <dgm:scene3d>
+      <a:camera prst="orthographicFront"/>
+      <a:lightRig rig="threePt" dir="t"/>
+    </dgm:scene3d>
+    <dgm:sp3d/>
+    <dgm:txPr/>
+    <dgm:style>
+      <a:lnRef idx="2">
+        <a:scrgbClr r="0" g="0" b="0"/>
+      </a:lnRef>
+      <a:fillRef idx="0">
+        <a:scrgbClr r="0" g="0" b="0"/>
+      </a:fillRef>
+      <a:effectRef idx="0">
+        <a:scrgbClr r="0" g="0" b="0"/>
+      </a:effectRef>
+      <a:fontRef idx="minor"/>
+    </dgm:style>
+  </dgm:styleLbl>
+  <dgm:styleLbl name="parChTrans1D2">
+    <dgm:scene3d>
+      <a:camera prst="orthographicFront"/>
+      <a:lightRig rig="threePt" dir="t"/>
+    </dgm:scene3d>
+    <dgm:sp3d/>
+    <dgm:txPr/>
+    <dgm:style>
+      <a:lnRef idx="2">
+        <a:scrgbClr r="0" g="0" b="0"/>
+      </a:lnRef>
+      <a:fillRef idx="0">
+        <a:scrgbClr r="0" g="0" b="0"/>
+      </a:fillRef>
+      <a:effectRef idx="0">
+        <a:scrgbClr r="0" g="0" b="0"/>
+      </a:effectRef>
+      <a:fontRef idx="minor"/>
+    </dgm:style>
+  </dgm:styleLbl>
+  <dgm:styleLbl name="parChTrans1D3">
+    <dgm:scene3d>
+      <a:camera prst="orthographicFront"/>
+      <a:lightRig rig="threePt" dir="t"/>
+    </dgm:scene3d>
+    <dgm:sp3d/>
+    <dgm:txPr/>
+    <dgm:style>
+      <a:lnRef idx="2">
+        <a:scrgbClr r="0" g="0" b="0"/>
+      </a:lnRef>
+      <a:fillRef idx="0">
+        <a:scrgbClr r="0" g="0" b="0"/>
+      </a:fillRef>
+      <a:effectRef idx="0">
+        <a:scrgbClr r="0" g="0" b="0"/>
+      </a:effectRef>
+      <a:fontRef idx="minor"/>
+    </dgm:style>
+  </dgm:styleLbl>
+  <dgm:styleLbl name="parChTrans1D4">
+    <dgm:scene3d>
+      <a:camera prst="orthographicFront"/>
+      <a:lightRig rig="threePt" dir="t"/>
+    </dgm:scene3d>
+    <dgm:sp3d/>
+    <dgm:txPr/>
+    <dgm:style>
+      <a:lnRef idx="2">
+        <a:scrgbClr r="0" g="0" b="0"/>
+      </a:lnRef>
+      <a:fillRef idx="0">
+        <a:scrgbClr r="0" g="0" b="0"/>
+      </a:fillRef>
+      <a:effectRef idx="0">
+        <a:scrgbClr r="0" g="0" b="0"/>
+      </a:effectRef>
+      <a:fontRef idx="minor"/>
+    </dgm:style>
+  </dgm:styleLbl>
+  <dgm:styleLbl name="fgAcc1">
+    <dgm:scene3d>
+      <a:camera prst="orthographicFront"/>
+      <a:lightRig rig="threePt" dir="t"/>
+    </dgm:scene3d>
+    <dgm:sp3d/>
+    <dgm:txPr/>
+    <dgm:style>
+      <a:lnRef idx="2">
+        <a:scrgbClr r="0" g="0" b="0"/>
+      </a:lnRef>
+      <a:fillRef idx="1">
+        <a:scrgbClr r="0" g="0" b="0"/>
+      </a:fillRef>
+      <a:effectRef idx="0">
+        <a:scrgbClr r="0" g="0" b="0"/>
+      </a:effectRef>
+      <a:fontRef idx="minor"/>
+    </dgm:style>
+  </dgm:styleLbl>
+  <dgm:styleLbl name="conFgAcc1">
+    <dgm:scene3d>
+      <a:camera prst="orthographicFront"/>
+      <a:lightRig rig="threePt" dir="t"/>
+    </dgm:scene3d>
+    <dgm:sp3d/>
+    <dgm:txPr/>
+    <dgm:style>
+      <a:lnRef idx="2">
+        <a:scrgbClr r="0" g="0" b="0"/>
+      </a:lnRef>
+      <a:fillRef idx="1">
+        <a:scrgbClr r="0" g="0" b="0"/>
+      </a:fillRef>
+      <a:effectRef idx="0">
+        <a:scrgbClr r="0" g="0" b="0"/>
+      </a:effectRef>
+      <a:fontRef idx="minor"/>
+    </dgm:style>
+  </dgm:styleLbl>
+  <dgm:styleLbl name="alignAcc1">
+    <dgm:scene3d>
+      <a:camera prst="orthographicFront"/>
+      <a:lightRig rig="threePt" dir="t"/>
+    </dgm:scene3d>
+    <dgm:sp3d/>
+    <dgm:txPr/>
+    <dgm:style>
+      <a:lnRef idx="2">
+        <a:scrgbClr r="0" g="0" b="0"/>
+      </a:lnRef>
+      <a:fillRef idx="1">
+        <a:scrgbClr r="0" g="0" b="0"/>
+      </a:fillRef>
+      <a:effectRef idx="0">
+        <a:scrgbClr r="0" g="0" b="0"/>
+      </a:effectRef>
+      <a:fontRef idx="minor"/>
+    </dgm:style>
+  </dgm:styleLbl>
+  <dgm:styleLbl name="trAlignAcc1">
+    <dgm:scene3d>
+      <a:camera prst="orthographicFront"/>
+      <a:lightRig rig="threePt" dir="t"/>
+    </dgm:scene3d>
+    <dgm:sp3d/>
+    <dgm:txPr/>
+    <dgm:style>
+      <a:lnRef idx="1">
+        <a:scrgbClr r="0" g="0" b="0"/>
+      </a:lnRef>
+      <a:fillRef idx="1">
+        <a:scrgbClr r="0" g="0" b="0"/>
+      </a:fillRef>
+      <a:effectRef idx="0">
+        <a:scrgbClr r="0" g="0" b="0"/>
+      </a:effectRef>
+      <a:fontRef idx="minor"/>
+    </dgm:style>
+  </dgm:styleLbl>
+  <dgm:styleLbl name="bgAcc1">
+    <dgm:scene3d>
+      <a:camera prst="orthographicFront"/>
+      <a:lightRig rig="threePt" dir="t"/>
+    </dgm:scene3d>
+    <dgm:sp3d/>
+    <dgm:txPr/>
+    <dgm:style>
+      <a:lnRef idx="2">
+        <a:scrgbClr r="0" g="0" b="0"/>
+      </a:lnRef>
+      <a:fillRef idx="1">
+        <a:scrgbClr r="0" g="0" b="0"/>
+      </a:fillRef>
+      <a:effectRef idx="0">
+        <a:scrgbClr r="0" g="0" b="0"/>
+      </a:effectRef>
+      <a:fontRef idx="minor"/>
+    </dgm:style>
+  </dgm:styleLbl>
+  <dgm:styleLbl name="solidFgAcc1">
+    <dgm:scene3d>
+      <a:camera prst="orthographicFront"/>
+      <a:lightRig rig="threePt" dir="t"/>
+    </dgm:scene3d>
+    <dgm:sp3d/>
+    <dgm:txPr/>
+    <dgm:style>
+      <a:lnRef idx="2">
+        <a:scrgbClr r="0" g="0" b="0"/>
+      </a:lnRef>
+      <a:fillRef idx="1">
+        <a:scrgbClr r="0" g="0" b="0"/>
+      </a:fillRef>
+      <a:effectRef idx="0">
+        <a:scrgbClr r="0" g="0" b="0"/>
+      </a:effectRef>
+      <a:fontRef idx="minor"/>
+    </dgm:style>
+  </dgm:styleLbl>
+  <dgm:styleLbl name="solidAlignAcc1">
+    <dgm:scene3d>
+      <a:camera prst="orthographicFront"/>
+      <a:lightRig rig="threePt" dir="t"/>
+    </dgm:scene3d>
+    <dgm:sp3d/>
+    <dgm:txPr/>
+    <dgm:style>
+      <a:lnRef idx="2">
+        <a:scrgbClr r="0" g="0" b="0"/>
+      </a:lnRef>
+      <a:fillRef idx="1">
+        <a:scrgbClr r="0" g="0" b="0"/>
+      </a:fillRef>
+      <a:effectRef idx="0">
+        <a:scrgbClr r="0" g="0" b="0"/>
+      </a:effectRef>
+      <a:fontRef idx="minor"/>
+    </dgm:style>
+  </dgm:styleLbl>
+  <dgm:styleLbl name="solidBgAcc1">
+    <dgm:scene3d>
+      <a:camera prst="orthographicFront"/>
+      <a:lightRig rig="threePt" dir="t"/>
+    </dgm:scene3d>
+    <dgm:sp3d/>
+    <dgm:txPr/>
+    <dgm:style>
+      <a:lnRef idx="2">
+        <a:scrgbClr r="0" g="0" b="0"/>
+      </a:lnRef>
+      <a:fillRef idx="1">
+        <a:scrgbClr r="0" g="0" b="0"/>
+      </a:fillRef>
+      <a:effectRef idx="0">
+        <a:scrgbClr r="0" g="0" b="0"/>
+      </a:effectRef>
+      <a:fontRef idx="minor"/>
+    </dgm:style>
+  </dgm:styleLbl>
+  <dgm:styleLbl name="fgAccFollowNode1">
+    <dgm:scene3d>
+      <a:camera prst="orthographicFront"/>
+      <a:lightRig rig="threePt" dir="t"/>
+    </dgm:scene3d>
+    <dgm:sp3d/>
+    <dgm:txPr/>
+    <dgm:style>
+      <a:lnRef idx="2">
+        <a:scrgbClr r="0" g="0" b="0"/>
+      </a:lnRef>
+      <a:fillRef idx="1">
+        <a:scrgbClr r="0" g="0" b="0"/>
+      </a:fillRef>
+      <a:effectRef idx="0">
+        <a:scrgbClr r="0" g="0" b="0"/>
+      </a:effectRef>
+      <a:fontRef idx="minor"/>
+    </dgm:style>
+  </dgm:styleLbl>
+  <dgm:styleLbl name="alignAccFollowNode1">
+    <dgm:scene3d>
+      <a:camera prst="orthographicFront"/>
+      <a:lightRig rig="threePt" dir="t"/>
+    </dgm:scene3d>
+    <dgm:sp3d/>
+    <dgm:txPr/>
+    <dgm:style>
+      <a:lnRef idx="2">
+        <a:scrgbClr r="0" g="0" b="0"/>
+      </a:lnRef>
+      <a:fillRef idx="1">
+        <a:scrgbClr r="0" g="0" b="0"/>
+      </a:fillRef>
+      <a:effectRef idx="0">
+        <a:scrgbClr r="0" g="0" b="0"/>
+      </a:effectRef>
+      <a:fontRef idx="minor"/>
+    </dgm:style>
+  </dgm:styleLbl>
+  <dgm:styleLbl name="bgAccFollowNode1">
+    <dgm:scene3d>
+      <a:camera prst="orthographicFront"/>
+      <a:lightRig rig="threePt" dir="t"/>
+    </dgm:scene3d>
+    <dgm:sp3d/>
+    <dgm:txPr/>
+    <dgm:style>
+      <a:lnRef idx="2">
+        <a:scrgbClr r="0" g="0" b="0"/>
+      </a:lnRef>
+      <a:fillRef idx="1">
+        <a:scrgbClr r="0" g="0" b="0"/>
+      </a:fillRef>
+      <a:effectRef idx="0">
+        <a:scrgbClr r="0" g="0" b="0"/>
+      </a:effectRef>
+      <a:fontRef idx="minor"/>
+    </dgm:style>
+  </dgm:styleLbl>
+  <dgm:styleLbl name="fgAcc0">
+    <dgm:scene3d>
+      <a:camera prst="orthographicFront"/>
+      <a:lightRig rig="threePt" dir="t"/>
+    </dgm:scene3d>
+    <dgm:sp3d/>
+    <dgm:txPr/>
+    <dgm:style>
+      <a:lnRef idx="2">
+        <a:scrgbClr r="0" g="0" b="0"/>
+      </a:lnRef>
+      <a:fillRef idx="1">
+        <a:scrgbClr r="0" g="0" b="0"/>
+      </a:fillRef>
+      <a:effectRef idx="0">
+        <a:scrgbClr r="0" g="0" b="0"/>
+      </a:effectRef>
+      <a:fontRef idx="minor"/>
+    </dgm:style>
+  </dgm:styleLbl>
+  <dgm:styleLbl name="fgAcc2">
+    <dgm:scene3d>
+      <a:camera prst="orthographicFront"/>
+      <a:lightRig rig="threePt" dir="t"/>
+    </dgm:scene3d>
+    <dgm:sp3d/>
+    <dgm:txPr/>
+    <dgm:style>
+      <a:lnRef idx="2">
+        <a:scrgbClr r="0" g="0" b="0"/>
+      </a:lnRef>
+      <a:fillRef idx="1">
+        <a:scrgbClr r="0" g="0" b="0"/>
+      </a:fillRef>
+      <a:effectRef idx="0">
+        <a:scrgbClr r="0" g="0" b="0"/>
+      </a:effectRef>
+      <a:fontRef idx="minor"/>
+    </dgm:style>
+  </dgm:styleLbl>
+  <dgm:styleLbl name="fgAcc3">
+    <dgm:scene3d>
+      <a:camera prst="orthographicFront"/>
+      <a:lightRig rig="threePt" dir="t"/>
+    </dgm:scene3d>
+    <dgm:sp3d/>
+    <dgm:txPr/>
+    <dgm:style>
+      <a:lnRef idx="2">
+        <a:scrgbClr r="0" g="0" b="0"/>
+      </a:lnRef>
+      <a:fillRef idx="1">
+        <a:scrgbClr r="0" g="0" b="0"/>
+      </a:fillRef>
+      <a:effectRef idx="0">
+        <a:scrgbClr r="0" g="0" b="0"/>
+      </a:effectRef>
+      <a:fontRef idx="minor"/>
+    </dgm:style>
+  </dgm:styleLbl>
+  <dgm:styleLbl name="fgAcc4">
+    <dgm:scene3d>
+      <a:camera prst="orthographicFront"/>
+      <a:lightRig rig="threePt" dir="t"/>
+    </dgm:scene3d>
+    <dgm:sp3d/>
+    <dgm:txPr/>
+    <dgm:style>
+      <a:lnRef idx="2">
+        <a:scrgbClr r="0" g="0" b="0"/>
+      </a:lnRef>
+      <a:fillRef idx="1">
+        <a:scrgbClr r="0" g="0" b="0"/>
+      </a:fillRef>
+      <a:effectRef idx="0">
+        <a:scrgbClr r="0" g="0" b="0"/>
+      </a:effectRef>
+      <a:fontRef idx="minor"/>
+    </dgm:style>
+  </dgm:styleLbl>
+  <dgm:styleLbl name="bgShp">
+    <dgm:scene3d>
+      <a:camera prst="orthographicFront"/>
+      <a:lightRig rig="threePt" dir="t"/>
+    </dgm:scene3d>
+    <dgm:sp3d/>
+    <dgm:txPr/>
+    <dgm:style>
+      <a:lnRef idx="0">
+        <a:scrgbClr r="0" g="0" b="0"/>
+      </a:lnRef>
+      <a:fillRef idx="1">
+        <a:scrgbClr r="0" g="0" b="0"/>
+      </a:fillRef>
+      <a:effectRef idx="0">
+        <a:scrgbClr r="0" g="0" b="0"/>
+      </a:effectRef>
+      <a:fontRef idx="minor"/>
+    </dgm:style>
+  </dgm:styleLbl>
+  <dgm:styleLbl name="dkBgShp">
+    <dgm:scene3d>
+      <a:camera prst="orthographicFront"/>
+      <a:lightRig rig="threePt" dir="t"/>
+    </dgm:scene3d>
+    <dgm:sp3d/>
+    <dgm:txPr/>
+    <dgm:style>
+      <a:lnRef idx="0">
+        <a:scrgbClr r="0" g="0" b="0"/>
+      </a:lnRef>
+      <a:fillRef idx="1">
+        <a:scrgbClr r="0" g="0" b="0"/>
+      </a:fillRef>
+      <a:effectRef idx="0">
+        <a:scrgbClr r="0" g="0" b="0"/>
+      </a:effectRef>
+      <a:fontRef idx="minor"/>
+    </dgm:style>
+  </dgm:styleLbl>
+  <dgm:styleLbl name="trBgShp">
+    <dgm:scene3d>
+      <a:camera prst="orthographicFront"/>
+      <a:lightRig rig="threePt" dir="t"/>
+    </dgm:scene3d>
+    <dgm:sp3d/>
+    <dgm:txPr/>
+    <dgm:style>
+      <a:lnRef idx="0">
+        <a:scrgbClr r="0" g="0" b="0"/>
+      </a:lnRef>
+      <a:fillRef idx="1">
+        <a:scrgbClr r="0" g="0" b="0"/>
+      </a:fillRef>
+      <a:effectRef idx="0">
+        <a:scrgbClr r="0" g="0" b="0"/>
+      </a:effectRef>
+      <a:fontRef idx="minor"/>
+    </dgm:style>
+  </dgm:styleLbl>
+  <dgm:styleLbl name="fgShp">
+    <dgm:scene3d>
+      <a:camera prst="orthographicFront"/>
+      <a:lightRig rig="threePt" dir="t"/>
+    </dgm:scene3d>
+    <dgm:sp3d/>
+    <dgm:txPr/>
+    <dgm:style>
+      <a:lnRef idx="2">
+        <a:scrgbClr r="0" g="0" b="0"/>
+      </a:lnRef>
+      <a:fillRef idx="1">
+        <a:scrgbClr r="0" g="0" b="0"/>
+      </a:fillRef>
+      <a:effectRef idx="0">
+        <a:scrgbClr r="0" g="0" b="0"/>
+      </a:effectRef>
+      <a:fontRef idx="minor"/>
+    </dgm:style>
+  </dgm:styleLbl>
+  <dgm:styleLbl name="revTx">
+    <dgm:scene3d>
+      <a:camera prst="orthographicFront"/>
+      <a:lightRig rig="threePt" dir="t"/>
+    </dgm:scene3d>
+    <dgm:sp3d/>
+    <dgm:txPr/>
+    <dgm:style>
+      <a:lnRef idx="0">
+        <a:scrgbClr r="0" g="0" b="0"/>
+      </a:lnRef>
+      <a:fillRef idx="0">
+        <a:scrgbClr r="0" g="0" b="0"/>
+      </a:fillRef>
+      <a:effectRef idx="0">
+        <a:scrgbClr r="0" g="0" b="0"/>
+      </a:effectRef>
+      <a:fontRef idx="minor"/>
+    </dgm:style>
+  </dgm:styleLbl>
+</dgm:styleDef>
+</file>
+
 <file path=ppt/slideLayouts/slideLayout1.xml><?xml version="1.0" encoding="utf-8"?>
 <p:sldLayout xmlns:a="http://schemas.openxmlformats.org/drawingml/2006/main" xmlns:r="http://schemas.openxmlformats.org/officeDocument/2006/relationships" xmlns:p="http://schemas.openxmlformats.org/presentationml/2006/main" type="title" preserve="1">
   <p:cSld name="Title Slide">
@@ -415,7 +3487,7 @@
           <p:cNvPr id="2" name="Title 1">
             <a:extLst>
               <a:ext uri="{FF2B5EF4-FFF2-40B4-BE49-F238E27FC236}">
-                <a16:creationId xmlns:a16="http://schemas.microsoft.com/office/drawing/2014/main" id="{98DE4F89-C356-E621-AB4A-2FF3F05D633B}"/>
+                <a16:creationId xmlns:a16="http://schemas.microsoft.com/office/drawing/2014/main" id="{01A029E5-1194-F1F5-B592-A3EF39930C9D}"/>
               </a:ext>
             </a:extLst>
           </p:cNvPr>
@@ -452,7 +3524,7 @@
           <p:cNvPr id="3" name="Subtitle 2">
             <a:extLst>
               <a:ext uri="{FF2B5EF4-FFF2-40B4-BE49-F238E27FC236}">
-                <a16:creationId xmlns:a16="http://schemas.microsoft.com/office/drawing/2014/main" id="{8EFC740C-4AEA-9EBD-D07D-11658D697718}"/>
+                <a16:creationId xmlns:a16="http://schemas.microsoft.com/office/drawing/2014/main" id="{5F9AF260-9452-3FD1-C82D-245B49291021}"/>
               </a:ext>
             </a:extLst>
           </p:cNvPr>
@@ -522,7 +3594,7 @@
           <p:cNvPr id="4" name="Date Placeholder 3">
             <a:extLst>
               <a:ext uri="{FF2B5EF4-FFF2-40B4-BE49-F238E27FC236}">
-                <a16:creationId xmlns:a16="http://schemas.microsoft.com/office/drawing/2014/main" id="{B4D57984-090A-57AB-A541-23A871F04A77}"/>
+                <a16:creationId xmlns:a16="http://schemas.microsoft.com/office/drawing/2014/main" id="{71E5446E-1C26-61FD-2F9C-8E2FFEE42486}"/>
               </a:ext>
             </a:extLst>
           </p:cNvPr>
@@ -540,7 +3612,7 @@
           <a:p>
             <a:fld id="{432F545F-E92B-4179-833A-C9AD93DAFB27}" type="datetimeFigureOut">
               <a:rPr lang="en-US" smtClean="0"/>
-              <a:t>3/28/2025</a:t>
+              <a:t>3/28/25</a:t>
             </a:fld>
             <a:endParaRPr lang="en-US"/>
           </a:p>
@@ -551,7 +3623,7 @@
           <p:cNvPr id="5" name="Footer Placeholder 4">
             <a:extLst>
               <a:ext uri="{FF2B5EF4-FFF2-40B4-BE49-F238E27FC236}">
-                <a16:creationId xmlns:a16="http://schemas.microsoft.com/office/drawing/2014/main" id="{0932991E-05A2-0E3B-9753-994C53C77667}"/>
+                <a16:creationId xmlns:a16="http://schemas.microsoft.com/office/drawing/2014/main" id="{DAD50D21-DEAA-842A-1ACE-4C0C1BEF92E0}"/>
               </a:ext>
             </a:extLst>
           </p:cNvPr>
@@ -576,7 +3648,7 @@
           <p:cNvPr id="6" name="Slide Number Placeholder 5">
             <a:extLst>
               <a:ext uri="{FF2B5EF4-FFF2-40B4-BE49-F238E27FC236}">
-                <a16:creationId xmlns:a16="http://schemas.microsoft.com/office/drawing/2014/main" id="{13DBC9E1-28BA-2B72-1BD2-73D5147D89E3}"/>
+                <a16:creationId xmlns:a16="http://schemas.microsoft.com/office/drawing/2014/main" id="{420018F2-0F50-AA68-35AC-B75EBB6C38EB}"/>
               </a:ext>
             </a:extLst>
           </p:cNvPr>
@@ -603,7 +3675,7 @@
     </p:spTree>
     <p:extLst>
       <p:ext uri="{BB962C8B-B14F-4D97-AF65-F5344CB8AC3E}">
-        <p14:creationId xmlns:p14="http://schemas.microsoft.com/office/powerpoint/2010/main" val="4241056053"/>
+        <p14:creationId xmlns:p14="http://schemas.microsoft.com/office/powerpoint/2010/main" val="2165024715"/>
       </p:ext>
     </p:extLst>
   </p:cSld>
@@ -635,7 +3707,7 @@
           <p:cNvPr id="2" name="Title 1">
             <a:extLst>
               <a:ext uri="{FF2B5EF4-FFF2-40B4-BE49-F238E27FC236}">
-                <a16:creationId xmlns:a16="http://schemas.microsoft.com/office/drawing/2014/main" id="{74BBBA64-D2FD-895A-512E-595224F760BB}"/>
+                <a16:creationId xmlns:a16="http://schemas.microsoft.com/office/drawing/2014/main" id="{188B73EF-4646-A945-C065-06BE5F353534}"/>
               </a:ext>
             </a:extLst>
           </p:cNvPr>
@@ -663,7 +3735,7 @@
           <p:cNvPr id="3" name="Vertical Text Placeholder 2">
             <a:extLst>
               <a:ext uri="{FF2B5EF4-FFF2-40B4-BE49-F238E27FC236}">
-                <a16:creationId xmlns:a16="http://schemas.microsoft.com/office/drawing/2014/main" id="{667482DA-3232-8B4C-144D-30FA77DF9959}"/>
+                <a16:creationId xmlns:a16="http://schemas.microsoft.com/office/drawing/2014/main" id="{FC1CF513-14C2-8922-0ABD-A77AE8F849EE}"/>
               </a:ext>
             </a:extLst>
           </p:cNvPr>
@@ -720,7 +3792,7 @@
           <p:cNvPr id="4" name="Date Placeholder 3">
             <a:extLst>
               <a:ext uri="{FF2B5EF4-FFF2-40B4-BE49-F238E27FC236}">
-                <a16:creationId xmlns:a16="http://schemas.microsoft.com/office/drawing/2014/main" id="{27CD3A7A-3A18-7840-5209-EE7F0265E6E3}"/>
+                <a16:creationId xmlns:a16="http://schemas.microsoft.com/office/drawing/2014/main" id="{EDB8CA2F-ACDF-199C-8324-BD047FC14467}"/>
               </a:ext>
             </a:extLst>
           </p:cNvPr>
@@ -738,7 +3810,7 @@
           <a:p>
             <a:fld id="{432F545F-E92B-4179-833A-C9AD93DAFB27}" type="datetimeFigureOut">
               <a:rPr lang="en-US" smtClean="0"/>
-              <a:t>3/28/2025</a:t>
+              <a:t>3/28/25</a:t>
             </a:fld>
             <a:endParaRPr lang="en-US"/>
           </a:p>
@@ -749,7 +3821,7 @@
           <p:cNvPr id="5" name="Footer Placeholder 4">
             <a:extLst>
               <a:ext uri="{FF2B5EF4-FFF2-40B4-BE49-F238E27FC236}">
-                <a16:creationId xmlns:a16="http://schemas.microsoft.com/office/drawing/2014/main" id="{7A5159C4-5DDA-486A-6C45-E9E453FA6F04}"/>
+                <a16:creationId xmlns:a16="http://schemas.microsoft.com/office/drawing/2014/main" id="{D2FCB084-9081-B25B-AD6D-04750E5BAE9C}"/>
               </a:ext>
             </a:extLst>
           </p:cNvPr>
@@ -774,7 +3846,7 @@
           <p:cNvPr id="6" name="Slide Number Placeholder 5">
             <a:extLst>
               <a:ext uri="{FF2B5EF4-FFF2-40B4-BE49-F238E27FC236}">
-                <a16:creationId xmlns:a16="http://schemas.microsoft.com/office/drawing/2014/main" id="{112DAC87-D9AB-C57B-9431-0CED8C624620}"/>
+                <a16:creationId xmlns:a16="http://schemas.microsoft.com/office/drawing/2014/main" id="{44DC0614-E9E3-C8A9-FC42-B01C13ED4330}"/>
               </a:ext>
             </a:extLst>
           </p:cNvPr>
@@ -801,7 +3873,7 @@
     </p:spTree>
     <p:extLst>
       <p:ext uri="{BB962C8B-B14F-4D97-AF65-F5344CB8AC3E}">
-        <p14:creationId xmlns:p14="http://schemas.microsoft.com/office/powerpoint/2010/main" val="2129828013"/>
+        <p14:creationId xmlns:p14="http://schemas.microsoft.com/office/powerpoint/2010/main" val="795237774"/>
       </p:ext>
     </p:extLst>
   </p:cSld>
@@ -833,7 +3905,7 @@
           <p:cNvPr id="2" name="Vertical Title 1">
             <a:extLst>
               <a:ext uri="{FF2B5EF4-FFF2-40B4-BE49-F238E27FC236}">
-                <a16:creationId xmlns:a16="http://schemas.microsoft.com/office/drawing/2014/main" id="{DEFC8610-7BE1-EEC4-4C93-82165599B3EB}"/>
+                <a16:creationId xmlns:a16="http://schemas.microsoft.com/office/drawing/2014/main" id="{98F7C214-1F6F-C54F-F81A-24541B7E9A33}"/>
               </a:ext>
             </a:extLst>
           </p:cNvPr>
@@ -866,7 +3938,7 @@
           <p:cNvPr id="3" name="Vertical Text Placeholder 2">
             <a:extLst>
               <a:ext uri="{FF2B5EF4-FFF2-40B4-BE49-F238E27FC236}">
-                <a16:creationId xmlns:a16="http://schemas.microsoft.com/office/drawing/2014/main" id="{ECD93E18-56D6-ADB1-45FA-273B52CEDAA1}"/>
+                <a16:creationId xmlns:a16="http://schemas.microsoft.com/office/drawing/2014/main" id="{DB849BDD-C529-D009-C952-E595829E9C18}"/>
               </a:ext>
             </a:extLst>
           </p:cNvPr>
@@ -928,7 +4000,7 @@
           <p:cNvPr id="4" name="Date Placeholder 3">
             <a:extLst>
               <a:ext uri="{FF2B5EF4-FFF2-40B4-BE49-F238E27FC236}">
-                <a16:creationId xmlns:a16="http://schemas.microsoft.com/office/drawing/2014/main" id="{E6A00F55-7AEE-E9B6-5B11-8D8E11C13052}"/>
+                <a16:creationId xmlns:a16="http://schemas.microsoft.com/office/drawing/2014/main" id="{E1B4D8AF-0004-BF97-A60D-2A5EB9A77C73}"/>
               </a:ext>
             </a:extLst>
           </p:cNvPr>
@@ -946,7 +4018,7 @@
           <a:p>
             <a:fld id="{432F545F-E92B-4179-833A-C9AD93DAFB27}" type="datetimeFigureOut">
               <a:rPr lang="en-US" smtClean="0"/>
-              <a:t>3/28/2025</a:t>
+              <a:t>3/28/25</a:t>
             </a:fld>
             <a:endParaRPr lang="en-US"/>
           </a:p>
@@ -957,7 +4029,7 @@
           <p:cNvPr id="5" name="Footer Placeholder 4">
             <a:extLst>
               <a:ext uri="{FF2B5EF4-FFF2-40B4-BE49-F238E27FC236}">
-                <a16:creationId xmlns:a16="http://schemas.microsoft.com/office/drawing/2014/main" id="{654A7C67-52AB-F921-B622-91D2B5762F7B}"/>
+                <a16:creationId xmlns:a16="http://schemas.microsoft.com/office/drawing/2014/main" id="{C2FA0BE2-A859-956D-DC8A-027057E9292F}"/>
               </a:ext>
             </a:extLst>
           </p:cNvPr>
@@ -982,7 +4054,7 @@
           <p:cNvPr id="6" name="Slide Number Placeholder 5">
             <a:extLst>
               <a:ext uri="{FF2B5EF4-FFF2-40B4-BE49-F238E27FC236}">
-                <a16:creationId xmlns:a16="http://schemas.microsoft.com/office/drawing/2014/main" id="{D155C77D-C27C-E860-8BFF-2690B702CF66}"/>
+                <a16:creationId xmlns:a16="http://schemas.microsoft.com/office/drawing/2014/main" id="{43639BFA-FDAF-BD27-CFA2-8A543E0ABDDB}"/>
               </a:ext>
             </a:extLst>
           </p:cNvPr>
@@ -1009,7 +4081,7 @@
     </p:spTree>
     <p:extLst>
       <p:ext uri="{BB962C8B-B14F-4D97-AF65-F5344CB8AC3E}">
-        <p14:creationId xmlns:p14="http://schemas.microsoft.com/office/powerpoint/2010/main" val="4270109680"/>
+        <p14:creationId xmlns:p14="http://schemas.microsoft.com/office/powerpoint/2010/main" val="4266905974"/>
       </p:ext>
     </p:extLst>
   </p:cSld>
@@ -1041,7 +4113,7 @@
           <p:cNvPr id="2" name="Title 1">
             <a:extLst>
               <a:ext uri="{FF2B5EF4-FFF2-40B4-BE49-F238E27FC236}">
-                <a16:creationId xmlns:a16="http://schemas.microsoft.com/office/drawing/2014/main" id="{62F40EF6-5E16-E3FB-0555-E30DD00F672A}"/>
+                <a16:creationId xmlns:a16="http://schemas.microsoft.com/office/drawing/2014/main" id="{42E5A4CD-FB45-74B3-73F8-C8FE1DBD7EB9}"/>
               </a:ext>
             </a:extLst>
           </p:cNvPr>
@@ -1069,7 +4141,7 @@
           <p:cNvPr id="3" name="Content Placeholder 2">
             <a:extLst>
               <a:ext uri="{FF2B5EF4-FFF2-40B4-BE49-F238E27FC236}">
-                <a16:creationId xmlns:a16="http://schemas.microsoft.com/office/drawing/2014/main" id="{76F7C6A7-545A-EF72-6240-653CF2CA154D}"/>
+                <a16:creationId xmlns:a16="http://schemas.microsoft.com/office/drawing/2014/main" id="{B884CCEC-C22D-D523-E608-7693A864A923}"/>
               </a:ext>
             </a:extLst>
           </p:cNvPr>
@@ -1126,7 +4198,7 @@
           <p:cNvPr id="4" name="Date Placeholder 3">
             <a:extLst>
               <a:ext uri="{FF2B5EF4-FFF2-40B4-BE49-F238E27FC236}">
-                <a16:creationId xmlns:a16="http://schemas.microsoft.com/office/drawing/2014/main" id="{099B43EE-2EDC-9C14-8635-BF8A3E03B541}"/>
+                <a16:creationId xmlns:a16="http://schemas.microsoft.com/office/drawing/2014/main" id="{D53200F2-BF51-33F5-1AFE-9E00C2F39087}"/>
               </a:ext>
             </a:extLst>
           </p:cNvPr>
@@ -1144,7 +4216,7 @@
           <a:p>
             <a:fld id="{432F545F-E92B-4179-833A-C9AD93DAFB27}" type="datetimeFigureOut">
               <a:rPr lang="en-US" smtClean="0"/>
-              <a:t>3/28/2025</a:t>
+              <a:t>3/28/25</a:t>
             </a:fld>
             <a:endParaRPr lang="en-US"/>
           </a:p>
@@ -1155,7 +4227,7 @@
           <p:cNvPr id="5" name="Footer Placeholder 4">
             <a:extLst>
               <a:ext uri="{FF2B5EF4-FFF2-40B4-BE49-F238E27FC236}">
-                <a16:creationId xmlns:a16="http://schemas.microsoft.com/office/drawing/2014/main" id="{C6398378-53FE-65DB-988A-BADBD9354510}"/>
+                <a16:creationId xmlns:a16="http://schemas.microsoft.com/office/drawing/2014/main" id="{FFD01C12-5424-DB99-32CA-00FEB0D60EAD}"/>
               </a:ext>
             </a:extLst>
           </p:cNvPr>
@@ -1180,7 +4252,7 @@
           <p:cNvPr id="6" name="Slide Number Placeholder 5">
             <a:extLst>
               <a:ext uri="{FF2B5EF4-FFF2-40B4-BE49-F238E27FC236}">
-                <a16:creationId xmlns:a16="http://schemas.microsoft.com/office/drawing/2014/main" id="{422C0244-DB72-C243-4BAC-D91A34178CF0}"/>
+                <a16:creationId xmlns:a16="http://schemas.microsoft.com/office/drawing/2014/main" id="{7974D17E-E82C-23F3-50C6-61CFE5D6CFA5}"/>
               </a:ext>
             </a:extLst>
           </p:cNvPr>
@@ -1207,7 +4279,7 @@
     </p:spTree>
     <p:extLst>
       <p:ext uri="{BB962C8B-B14F-4D97-AF65-F5344CB8AC3E}">
-        <p14:creationId xmlns:p14="http://schemas.microsoft.com/office/powerpoint/2010/main" val="1973741246"/>
+        <p14:creationId xmlns:p14="http://schemas.microsoft.com/office/powerpoint/2010/main" val="3960440322"/>
       </p:ext>
     </p:extLst>
   </p:cSld>
@@ -1239,7 +4311,7 @@
           <p:cNvPr id="2" name="Title 1">
             <a:extLst>
               <a:ext uri="{FF2B5EF4-FFF2-40B4-BE49-F238E27FC236}">
-                <a16:creationId xmlns:a16="http://schemas.microsoft.com/office/drawing/2014/main" id="{50AFA531-C829-B67A-47C3-35D4FEBE4BF4}"/>
+                <a16:creationId xmlns:a16="http://schemas.microsoft.com/office/drawing/2014/main" id="{64154A37-C81C-B73E-58D6-7215EF9EC8D0}"/>
               </a:ext>
             </a:extLst>
           </p:cNvPr>
@@ -1276,7 +4348,7 @@
           <p:cNvPr id="3" name="Text Placeholder 2">
             <a:extLst>
               <a:ext uri="{FF2B5EF4-FFF2-40B4-BE49-F238E27FC236}">
-                <a16:creationId xmlns:a16="http://schemas.microsoft.com/office/drawing/2014/main" id="{367556E4-5B42-60DD-6322-5BA33A0D79D1}"/>
+                <a16:creationId xmlns:a16="http://schemas.microsoft.com/office/drawing/2014/main" id="{54C6B8B2-48B4-6E7D-1D00-DE259E1D3160}"/>
               </a:ext>
             </a:extLst>
           </p:cNvPr>
@@ -1401,7 +4473,7 @@
           <p:cNvPr id="4" name="Date Placeholder 3">
             <a:extLst>
               <a:ext uri="{FF2B5EF4-FFF2-40B4-BE49-F238E27FC236}">
-                <a16:creationId xmlns:a16="http://schemas.microsoft.com/office/drawing/2014/main" id="{A529620E-0906-A65E-843C-4011C33C8BD1}"/>
+                <a16:creationId xmlns:a16="http://schemas.microsoft.com/office/drawing/2014/main" id="{ED6A633D-CF32-1BC5-64F6-FD4D9ADCB9C6}"/>
               </a:ext>
             </a:extLst>
           </p:cNvPr>
@@ -1419,7 +4491,7 @@
           <a:p>
             <a:fld id="{432F545F-E92B-4179-833A-C9AD93DAFB27}" type="datetimeFigureOut">
               <a:rPr lang="en-US" smtClean="0"/>
-              <a:t>3/28/2025</a:t>
+              <a:t>3/28/25</a:t>
             </a:fld>
             <a:endParaRPr lang="en-US"/>
           </a:p>
@@ -1430,7 +4502,7 @@
           <p:cNvPr id="5" name="Footer Placeholder 4">
             <a:extLst>
               <a:ext uri="{FF2B5EF4-FFF2-40B4-BE49-F238E27FC236}">
-                <a16:creationId xmlns:a16="http://schemas.microsoft.com/office/drawing/2014/main" id="{00DF8494-44B7-65DD-6500-7D72E83BA45D}"/>
+                <a16:creationId xmlns:a16="http://schemas.microsoft.com/office/drawing/2014/main" id="{F330BF72-F00E-F22E-4EA7-CE6F731486A3}"/>
               </a:ext>
             </a:extLst>
           </p:cNvPr>
@@ -1455,7 +4527,7 @@
           <p:cNvPr id="6" name="Slide Number Placeholder 5">
             <a:extLst>
               <a:ext uri="{FF2B5EF4-FFF2-40B4-BE49-F238E27FC236}">
-                <a16:creationId xmlns:a16="http://schemas.microsoft.com/office/drawing/2014/main" id="{D2877346-802D-2072-331C-2E0697A57DE7}"/>
+                <a16:creationId xmlns:a16="http://schemas.microsoft.com/office/drawing/2014/main" id="{F71E837D-68EB-E568-AFA1-56D854792BF4}"/>
               </a:ext>
             </a:extLst>
           </p:cNvPr>
@@ -1482,7 +4554,7 @@
     </p:spTree>
     <p:extLst>
       <p:ext uri="{BB962C8B-B14F-4D97-AF65-F5344CB8AC3E}">
-        <p14:creationId xmlns:p14="http://schemas.microsoft.com/office/powerpoint/2010/main" val="467767809"/>
+        <p14:creationId xmlns:p14="http://schemas.microsoft.com/office/powerpoint/2010/main" val="2680640955"/>
       </p:ext>
     </p:extLst>
   </p:cSld>
@@ -1514,7 +4586,7 @@
           <p:cNvPr id="2" name="Title 1">
             <a:extLst>
               <a:ext uri="{FF2B5EF4-FFF2-40B4-BE49-F238E27FC236}">
-                <a16:creationId xmlns:a16="http://schemas.microsoft.com/office/drawing/2014/main" id="{5CCC1CFF-3668-DA14-1A95-D32F1BE98412}"/>
+                <a16:creationId xmlns:a16="http://schemas.microsoft.com/office/drawing/2014/main" id="{9CE41173-F110-32C8-3C34-6EDD1008980F}"/>
               </a:ext>
             </a:extLst>
           </p:cNvPr>
@@ -1542,7 +4614,7 @@
           <p:cNvPr id="3" name="Content Placeholder 2">
             <a:extLst>
               <a:ext uri="{FF2B5EF4-FFF2-40B4-BE49-F238E27FC236}">
-                <a16:creationId xmlns:a16="http://schemas.microsoft.com/office/drawing/2014/main" id="{D836FE60-FA54-26CC-7BB8-DD186786DABF}"/>
+                <a16:creationId xmlns:a16="http://schemas.microsoft.com/office/drawing/2014/main" id="{81F388FD-1C0C-6639-0078-645F8561455C}"/>
               </a:ext>
             </a:extLst>
           </p:cNvPr>
@@ -1604,7 +4676,7 @@
           <p:cNvPr id="4" name="Content Placeholder 3">
             <a:extLst>
               <a:ext uri="{FF2B5EF4-FFF2-40B4-BE49-F238E27FC236}">
-                <a16:creationId xmlns:a16="http://schemas.microsoft.com/office/drawing/2014/main" id="{FB6A2099-32F4-108C-7E38-4EB844583B54}"/>
+                <a16:creationId xmlns:a16="http://schemas.microsoft.com/office/drawing/2014/main" id="{25849F3C-14BD-BFAB-8472-050B157A6049}"/>
               </a:ext>
             </a:extLst>
           </p:cNvPr>
@@ -1666,7 +4738,7 @@
           <p:cNvPr id="5" name="Date Placeholder 4">
             <a:extLst>
               <a:ext uri="{FF2B5EF4-FFF2-40B4-BE49-F238E27FC236}">
-                <a16:creationId xmlns:a16="http://schemas.microsoft.com/office/drawing/2014/main" id="{4E36E10E-D26B-DB9C-2EF7-1E00D325C126}"/>
+                <a16:creationId xmlns:a16="http://schemas.microsoft.com/office/drawing/2014/main" id="{2C517A49-6EB4-F1C5-7B47-17C182EACE31}"/>
               </a:ext>
             </a:extLst>
           </p:cNvPr>
@@ -1684,7 +4756,7 @@
           <a:p>
             <a:fld id="{432F545F-E92B-4179-833A-C9AD93DAFB27}" type="datetimeFigureOut">
               <a:rPr lang="en-US" smtClean="0"/>
-              <a:t>3/28/2025</a:t>
+              <a:t>3/28/25</a:t>
             </a:fld>
             <a:endParaRPr lang="en-US"/>
           </a:p>
@@ -1695,7 +4767,7 @@
           <p:cNvPr id="6" name="Footer Placeholder 5">
             <a:extLst>
               <a:ext uri="{FF2B5EF4-FFF2-40B4-BE49-F238E27FC236}">
-                <a16:creationId xmlns:a16="http://schemas.microsoft.com/office/drawing/2014/main" id="{2082706A-E650-B47D-ADD6-26C67A66D0AD}"/>
+                <a16:creationId xmlns:a16="http://schemas.microsoft.com/office/drawing/2014/main" id="{00D68AB3-C090-4D39-CF70-0689C6656EB2}"/>
               </a:ext>
             </a:extLst>
           </p:cNvPr>
@@ -1720,7 +4792,7 @@
           <p:cNvPr id="7" name="Slide Number Placeholder 6">
             <a:extLst>
               <a:ext uri="{FF2B5EF4-FFF2-40B4-BE49-F238E27FC236}">
-                <a16:creationId xmlns:a16="http://schemas.microsoft.com/office/drawing/2014/main" id="{B966202C-5AF7-FC5D-600A-25468B7667F8}"/>
+                <a16:creationId xmlns:a16="http://schemas.microsoft.com/office/drawing/2014/main" id="{7A63CE44-5D72-0EE5-DC3B-ECA8C48C9203}"/>
               </a:ext>
             </a:extLst>
           </p:cNvPr>
@@ -1747,7 +4819,7 @@
     </p:spTree>
     <p:extLst>
       <p:ext uri="{BB962C8B-B14F-4D97-AF65-F5344CB8AC3E}">
-        <p14:creationId xmlns:p14="http://schemas.microsoft.com/office/powerpoint/2010/main" val="706573988"/>
+        <p14:creationId xmlns:p14="http://schemas.microsoft.com/office/powerpoint/2010/main" val="4128831336"/>
       </p:ext>
     </p:extLst>
   </p:cSld>
@@ -1779,7 +4851,7 @@
           <p:cNvPr id="2" name="Title 1">
             <a:extLst>
               <a:ext uri="{FF2B5EF4-FFF2-40B4-BE49-F238E27FC236}">
-                <a16:creationId xmlns:a16="http://schemas.microsoft.com/office/drawing/2014/main" id="{CD7EB1D9-3FB4-7E8D-F113-C01D4E9BB726}"/>
+                <a16:creationId xmlns:a16="http://schemas.microsoft.com/office/drawing/2014/main" id="{AF9BE9C9-1CC2-1762-8351-E11BE910FDD9}"/>
               </a:ext>
             </a:extLst>
           </p:cNvPr>
@@ -1812,7 +4884,7 @@
           <p:cNvPr id="3" name="Text Placeholder 2">
             <a:extLst>
               <a:ext uri="{FF2B5EF4-FFF2-40B4-BE49-F238E27FC236}">
-                <a16:creationId xmlns:a16="http://schemas.microsoft.com/office/drawing/2014/main" id="{58DDD881-9AB0-DC7F-2EF8-8910EA18188B}"/>
+                <a16:creationId xmlns:a16="http://schemas.microsoft.com/office/drawing/2014/main" id="{C5B0CE8C-D276-54B0-7B3D-5C258CF4221D}"/>
               </a:ext>
             </a:extLst>
           </p:cNvPr>
@@ -1883,7 +4955,7 @@
           <p:cNvPr id="4" name="Content Placeholder 3">
             <a:extLst>
               <a:ext uri="{FF2B5EF4-FFF2-40B4-BE49-F238E27FC236}">
-                <a16:creationId xmlns:a16="http://schemas.microsoft.com/office/drawing/2014/main" id="{45FD37F8-6F81-12D5-FB16-A2E1CA31E200}"/>
+                <a16:creationId xmlns:a16="http://schemas.microsoft.com/office/drawing/2014/main" id="{963AB40B-4125-5546-1E55-0E1E5BBE4FB2}"/>
               </a:ext>
             </a:extLst>
           </p:cNvPr>
@@ -1945,7 +5017,7 @@
           <p:cNvPr id="5" name="Text Placeholder 4">
             <a:extLst>
               <a:ext uri="{FF2B5EF4-FFF2-40B4-BE49-F238E27FC236}">
-                <a16:creationId xmlns:a16="http://schemas.microsoft.com/office/drawing/2014/main" id="{F6B91A3E-A66C-2C1C-5A49-AE29CFB1D721}"/>
+                <a16:creationId xmlns:a16="http://schemas.microsoft.com/office/drawing/2014/main" id="{3595FD3E-6D52-E656-285E-4C8528F96F38}"/>
               </a:ext>
             </a:extLst>
           </p:cNvPr>
@@ -2016,7 +5088,7 @@
           <p:cNvPr id="6" name="Content Placeholder 5">
             <a:extLst>
               <a:ext uri="{FF2B5EF4-FFF2-40B4-BE49-F238E27FC236}">
-                <a16:creationId xmlns:a16="http://schemas.microsoft.com/office/drawing/2014/main" id="{37636CDA-D3A3-B607-B2E6-E912D8DFEBA4}"/>
+                <a16:creationId xmlns:a16="http://schemas.microsoft.com/office/drawing/2014/main" id="{DC27B293-2A87-98F1-675D-8360AD195EF2}"/>
               </a:ext>
             </a:extLst>
           </p:cNvPr>
@@ -2078,7 +5150,7 @@
           <p:cNvPr id="7" name="Date Placeholder 6">
             <a:extLst>
               <a:ext uri="{FF2B5EF4-FFF2-40B4-BE49-F238E27FC236}">
-                <a16:creationId xmlns:a16="http://schemas.microsoft.com/office/drawing/2014/main" id="{CA51086F-1EC1-0D99-91FC-D25BB5D6FFA0}"/>
+                <a16:creationId xmlns:a16="http://schemas.microsoft.com/office/drawing/2014/main" id="{E2C3B4D5-BDA5-7DAD-0FFA-120459EF34CA}"/>
               </a:ext>
             </a:extLst>
           </p:cNvPr>
@@ -2096,7 +5168,7 @@
           <a:p>
             <a:fld id="{432F545F-E92B-4179-833A-C9AD93DAFB27}" type="datetimeFigureOut">
               <a:rPr lang="en-US" smtClean="0"/>
-              <a:t>3/28/2025</a:t>
+              <a:t>3/28/25</a:t>
             </a:fld>
             <a:endParaRPr lang="en-US"/>
           </a:p>
@@ -2107,7 +5179,7 @@
           <p:cNvPr id="8" name="Footer Placeholder 7">
             <a:extLst>
               <a:ext uri="{FF2B5EF4-FFF2-40B4-BE49-F238E27FC236}">
-                <a16:creationId xmlns:a16="http://schemas.microsoft.com/office/drawing/2014/main" id="{0DC07AE0-B3BD-2AF6-2C2F-4DC5D7A5FD46}"/>
+                <a16:creationId xmlns:a16="http://schemas.microsoft.com/office/drawing/2014/main" id="{807144E0-60F8-1920-8EAA-D0CD640302C5}"/>
               </a:ext>
             </a:extLst>
           </p:cNvPr>
@@ -2132,7 +5204,7 @@
           <p:cNvPr id="9" name="Slide Number Placeholder 8">
             <a:extLst>
               <a:ext uri="{FF2B5EF4-FFF2-40B4-BE49-F238E27FC236}">
-                <a16:creationId xmlns:a16="http://schemas.microsoft.com/office/drawing/2014/main" id="{98E77C70-DC42-58FC-C8C0-412FF85E88F1}"/>
+                <a16:creationId xmlns:a16="http://schemas.microsoft.com/office/drawing/2014/main" id="{AFC4B1AA-5E47-6947-FC6B-F1C0C8B43155}"/>
               </a:ext>
             </a:extLst>
           </p:cNvPr>
@@ -2159,7 +5231,7 @@
     </p:spTree>
     <p:extLst>
       <p:ext uri="{BB962C8B-B14F-4D97-AF65-F5344CB8AC3E}">
-        <p14:creationId xmlns:p14="http://schemas.microsoft.com/office/powerpoint/2010/main" val="3544852496"/>
+        <p14:creationId xmlns:p14="http://schemas.microsoft.com/office/powerpoint/2010/main" val="2786318519"/>
       </p:ext>
     </p:extLst>
   </p:cSld>
@@ -2191,7 +5263,7 @@
           <p:cNvPr id="2" name="Title 1">
             <a:extLst>
               <a:ext uri="{FF2B5EF4-FFF2-40B4-BE49-F238E27FC236}">
-                <a16:creationId xmlns:a16="http://schemas.microsoft.com/office/drawing/2014/main" id="{01AA9C2D-07EA-1BC5-CC08-0E65D5C25A9A}"/>
+                <a16:creationId xmlns:a16="http://schemas.microsoft.com/office/drawing/2014/main" id="{824B1C69-B2D2-79AD-B6C1-E7901FE365DE}"/>
               </a:ext>
             </a:extLst>
           </p:cNvPr>
@@ -2219,7 +5291,7 @@
           <p:cNvPr id="3" name="Date Placeholder 2">
             <a:extLst>
               <a:ext uri="{FF2B5EF4-FFF2-40B4-BE49-F238E27FC236}">
-                <a16:creationId xmlns:a16="http://schemas.microsoft.com/office/drawing/2014/main" id="{B132531F-D7BE-A0C4-C306-7475A02EFCF4}"/>
+                <a16:creationId xmlns:a16="http://schemas.microsoft.com/office/drawing/2014/main" id="{18F38182-0BD8-D8EA-9655-C66D26DD256B}"/>
               </a:ext>
             </a:extLst>
           </p:cNvPr>
@@ -2237,7 +5309,7 @@
           <a:p>
             <a:fld id="{432F545F-E92B-4179-833A-C9AD93DAFB27}" type="datetimeFigureOut">
               <a:rPr lang="en-US" smtClean="0"/>
-              <a:t>3/28/2025</a:t>
+              <a:t>3/28/25</a:t>
             </a:fld>
             <a:endParaRPr lang="en-US"/>
           </a:p>
@@ -2248,7 +5320,7 @@
           <p:cNvPr id="4" name="Footer Placeholder 3">
             <a:extLst>
               <a:ext uri="{FF2B5EF4-FFF2-40B4-BE49-F238E27FC236}">
-                <a16:creationId xmlns:a16="http://schemas.microsoft.com/office/drawing/2014/main" id="{2E30E447-01F2-70B2-7672-6AC3EBB411DC}"/>
+                <a16:creationId xmlns:a16="http://schemas.microsoft.com/office/drawing/2014/main" id="{6D0A7C3E-929D-E623-2776-0A7857EABA35}"/>
               </a:ext>
             </a:extLst>
           </p:cNvPr>
@@ -2273,7 +5345,7 @@
           <p:cNvPr id="5" name="Slide Number Placeholder 4">
             <a:extLst>
               <a:ext uri="{FF2B5EF4-FFF2-40B4-BE49-F238E27FC236}">
-                <a16:creationId xmlns:a16="http://schemas.microsoft.com/office/drawing/2014/main" id="{EDFA482E-6C94-A0C7-AB55-763A693C9519}"/>
+                <a16:creationId xmlns:a16="http://schemas.microsoft.com/office/drawing/2014/main" id="{7E11B306-D916-39AE-8A57-4CD8E8AFB41D}"/>
               </a:ext>
             </a:extLst>
           </p:cNvPr>
@@ -2300,7 +5372,7 @@
     </p:spTree>
     <p:extLst>
       <p:ext uri="{BB962C8B-B14F-4D97-AF65-F5344CB8AC3E}">
-        <p14:creationId xmlns:p14="http://schemas.microsoft.com/office/powerpoint/2010/main" val="2191912217"/>
+        <p14:creationId xmlns:p14="http://schemas.microsoft.com/office/powerpoint/2010/main" val="456117714"/>
       </p:ext>
     </p:extLst>
   </p:cSld>
@@ -2332,7 +5404,7 @@
           <p:cNvPr id="2" name="Date Placeholder 1">
             <a:extLst>
               <a:ext uri="{FF2B5EF4-FFF2-40B4-BE49-F238E27FC236}">
-                <a16:creationId xmlns:a16="http://schemas.microsoft.com/office/drawing/2014/main" id="{108027C1-6ACC-676B-E718-1ECC5B1A4C0E}"/>
+                <a16:creationId xmlns:a16="http://schemas.microsoft.com/office/drawing/2014/main" id="{0B1A72D5-A321-F4F8-29E8-F8EB08B4235F}"/>
               </a:ext>
             </a:extLst>
           </p:cNvPr>
@@ -2350,7 +5422,7 @@
           <a:p>
             <a:fld id="{432F545F-E92B-4179-833A-C9AD93DAFB27}" type="datetimeFigureOut">
               <a:rPr lang="en-US" smtClean="0"/>
-              <a:t>3/28/2025</a:t>
+              <a:t>3/28/25</a:t>
             </a:fld>
             <a:endParaRPr lang="en-US"/>
           </a:p>
@@ -2361,7 +5433,7 @@
           <p:cNvPr id="3" name="Footer Placeholder 2">
             <a:extLst>
               <a:ext uri="{FF2B5EF4-FFF2-40B4-BE49-F238E27FC236}">
-                <a16:creationId xmlns:a16="http://schemas.microsoft.com/office/drawing/2014/main" id="{FF946AEF-C0AF-3D0C-AC08-666710FA4235}"/>
+                <a16:creationId xmlns:a16="http://schemas.microsoft.com/office/drawing/2014/main" id="{C5C9BDFD-0CFF-2819-DBD3-2344912EDD6E}"/>
               </a:ext>
             </a:extLst>
           </p:cNvPr>
@@ -2386,7 +5458,7 @@
           <p:cNvPr id="4" name="Slide Number Placeholder 3">
             <a:extLst>
               <a:ext uri="{FF2B5EF4-FFF2-40B4-BE49-F238E27FC236}">
-                <a16:creationId xmlns:a16="http://schemas.microsoft.com/office/drawing/2014/main" id="{2F375A28-1B16-6FEB-0692-1DCC7C77675A}"/>
+                <a16:creationId xmlns:a16="http://schemas.microsoft.com/office/drawing/2014/main" id="{EFF0A861-ED83-166A-ADAE-3E718A3DC704}"/>
               </a:ext>
             </a:extLst>
           </p:cNvPr>
@@ -2413,7 +5485,7 @@
     </p:spTree>
     <p:extLst>
       <p:ext uri="{BB962C8B-B14F-4D97-AF65-F5344CB8AC3E}">
-        <p14:creationId xmlns:p14="http://schemas.microsoft.com/office/powerpoint/2010/main" val="2048408295"/>
+        <p14:creationId xmlns:p14="http://schemas.microsoft.com/office/powerpoint/2010/main" val="2701144607"/>
       </p:ext>
     </p:extLst>
   </p:cSld>
@@ -2445,7 +5517,7 @@
           <p:cNvPr id="2" name="Title 1">
             <a:extLst>
               <a:ext uri="{FF2B5EF4-FFF2-40B4-BE49-F238E27FC236}">
-                <a16:creationId xmlns:a16="http://schemas.microsoft.com/office/drawing/2014/main" id="{F758B20F-2A37-BC4D-039D-0811F7839346}"/>
+                <a16:creationId xmlns:a16="http://schemas.microsoft.com/office/drawing/2014/main" id="{1B801C23-0A11-62A8-9692-E384625939B3}"/>
               </a:ext>
             </a:extLst>
           </p:cNvPr>
@@ -2482,7 +5554,7 @@
           <p:cNvPr id="3" name="Content Placeholder 2">
             <a:extLst>
               <a:ext uri="{FF2B5EF4-FFF2-40B4-BE49-F238E27FC236}">
-                <a16:creationId xmlns:a16="http://schemas.microsoft.com/office/drawing/2014/main" id="{8AADCF2B-32D0-AB10-EE1C-E7CDB971EDFE}"/>
+                <a16:creationId xmlns:a16="http://schemas.microsoft.com/office/drawing/2014/main" id="{95DD2458-8A85-E6FC-7426-7082620E33D7}"/>
               </a:ext>
             </a:extLst>
           </p:cNvPr>
@@ -2572,7 +5644,7 @@
           <p:cNvPr id="4" name="Text Placeholder 3">
             <a:extLst>
               <a:ext uri="{FF2B5EF4-FFF2-40B4-BE49-F238E27FC236}">
-                <a16:creationId xmlns:a16="http://schemas.microsoft.com/office/drawing/2014/main" id="{DAC18B93-E79E-B091-03AA-53C1A05AD552}"/>
+                <a16:creationId xmlns:a16="http://schemas.microsoft.com/office/drawing/2014/main" id="{02BE2ECE-CB10-9A56-4356-58E6F8C6E026}"/>
               </a:ext>
             </a:extLst>
           </p:cNvPr>
@@ -2643,7 +5715,7 @@
           <p:cNvPr id="5" name="Date Placeholder 4">
             <a:extLst>
               <a:ext uri="{FF2B5EF4-FFF2-40B4-BE49-F238E27FC236}">
-                <a16:creationId xmlns:a16="http://schemas.microsoft.com/office/drawing/2014/main" id="{78F6DAF8-81EE-887C-81CE-FFD8F8F45F3E}"/>
+                <a16:creationId xmlns:a16="http://schemas.microsoft.com/office/drawing/2014/main" id="{6535C126-D61F-452F-65BD-9A05F83EB372}"/>
               </a:ext>
             </a:extLst>
           </p:cNvPr>
@@ -2661,7 +5733,7 @@
           <a:p>
             <a:fld id="{432F545F-E92B-4179-833A-C9AD93DAFB27}" type="datetimeFigureOut">
               <a:rPr lang="en-US" smtClean="0"/>
-              <a:t>3/28/2025</a:t>
+              <a:t>3/28/25</a:t>
             </a:fld>
             <a:endParaRPr lang="en-US"/>
           </a:p>
@@ -2672,7 +5744,7 @@
           <p:cNvPr id="6" name="Footer Placeholder 5">
             <a:extLst>
               <a:ext uri="{FF2B5EF4-FFF2-40B4-BE49-F238E27FC236}">
-                <a16:creationId xmlns:a16="http://schemas.microsoft.com/office/drawing/2014/main" id="{ED7FD31E-7DB5-CD2F-B97B-142F38620BA6}"/>
+                <a16:creationId xmlns:a16="http://schemas.microsoft.com/office/drawing/2014/main" id="{469D07FA-5848-8643-38B0-F056C45FFA8B}"/>
               </a:ext>
             </a:extLst>
           </p:cNvPr>
@@ -2697,7 +5769,7 @@
           <p:cNvPr id="7" name="Slide Number Placeholder 6">
             <a:extLst>
               <a:ext uri="{FF2B5EF4-FFF2-40B4-BE49-F238E27FC236}">
-                <a16:creationId xmlns:a16="http://schemas.microsoft.com/office/drawing/2014/main" id="{B703908F-A1C8-0E49-1ADE-CD926C638A20}"/>
+                <a16:creationId xmlns:a16="http://schemas.microsoft.com/office/drawing/2014/main" id="{EDB01C97-2D09-FF83-DD13-C967474B659E}"/>
               </a:ext>
             </a:extLst>
           </p:cNvPr>
@@ -2724,7 +5796,7 @@
     </p:spTree>
     <p:extLst>
       <p:ext uri="{BB962C8B-B14F-4D97-AF65-F5344CB8AC3E}">
-        <p14:creationId xmlns:p14="http://schemas.microsoft.com/office/powerpoint/2010/main" val="2168530305"/>
+        <p14:creationId xmlns:p14="http://schemas.microsoft.com/office/powerpoint/2010/main" val="1718902290"/>
       </p:ext>
     </p:extLst>
   </p:cSld>
@@ -2756,7 +5828,7 @@
           <p:cNvPr id="2" name="Title 1">
             <a:extLst>
               <a:ext uri="{FF2B5EF4-FFF2-40B4-BE49-F238E27FC236}">
-                <a16:creationId xmlns:a16="http://schemas.microsoft.com/office/drawing/2014/main" id="{2C8401F6-2312-D936-3FF9-A033FC699782}"/>
+                <a16:creationId xmlns:a16="http://schemas.microsoft.com/office/drawing/2014/main" id="{607C6351-5066-144D-B933-95E4A436C098}"/>
               </a:ext>
             </a:extLst>
           </p:cNvPr>
@@ -2793,7 +5865,7 @@
           <p:cNvPr id="3" name="Picture Placeholder 2">
             <a:extLst>
               <a:ext uri="{FF2B5EF4-FFF2-40B4-BE49-F238E27FC236}">
-                <a16:creationId xmlns:a16="http://schemas.microsoft.com/office/drawing/2014/main" id="{FC83BE7C-8311-08B6-5872-E9A6C4404D9A}"/>
+                <a16:creationId xmlns:a16="http://schemas.microsoft.com/office/drawing/2014/main" id="{CB0F63E9-0F6D-0158-B7D0-151E45A80A42}"/>
               </a:ext>
             </a:extLst>
           </p:cNvPr>
@@ -2860,7 +5932,7 @@
           <p:cNvPr id="4" name="Text Placeholder 3">
             <a:extLst>
               <a:ext uri="{FF2B5EF4-FFF2-40B4-BE49-F238E27FC236}">
-                <a16:creationId xmlns:a16="http://schemas.microsoft.com/office/drawing/2014/main" id="{07BC4F77-3E99-7938-02B4-F778573398B3}"/>
+                <a16:creationId xmlns:a16="http://schemas.microsoft.com/office/drawing/2014/main" id="{342702AD-5977-D15F-BB71-4F447AB9A444}"/>
               </a:ext>
             </a:extLst>
           </p:cNvPr>
@@ -2931,7 +6003,7 @@
           <p:cNvPr id="5" name="Date Placeholder 4">
             <a:extLst>
               <a:ext uri="{FF2B5EF4-FFF2-40B4-BE49-F238E27FC236}">
-                <a16:creationId xmlns:a16="http://schemas.microsoft.com/office/drawing/2014/main" id="{12BF8690-A73F-C669-FAA1-B2E9172A0971}"/>
+                <a16:creationId xmlns:a16="http://schemas.microsoft.com/office/drawing/2014/main" id="{07215BC3-FB5C-4183-A28B-5D1C45879412}"/>
               </a:ext>
             </a:extLst>
           </p:cNvPr>
@@ -2949,7 +6021,7 @@
           <a:p>
             <a:fld id="{432F545F-E92B-4179-833A-C9AD93DAFB27}" type="datetimeFigureOut">
               <a:rPr lang="en-US" smtClean="0"/>
-              <a:t>3/28/2025</a:t>
+              <a:t>3/28/25</a:t>
             </a:fld>
             <a:endParaRPr lang="en-US"/>
           </a:p>
@@ -2960,7 +6032,7 @@
           <p:cNvPr id="6" name="Footer Placeholder 5">
             <a:extLst>
               <a:ext uri="{FF2B5EF4-FFF2-40B4-BE49-F238E27FC236}">
-                <a16:creationId xmlns:a16="http://schemas.microsoft.com/office/drawing/2014/main" id="{C3E6FF7D-A28B-6A4E-C7F1-EFCCD47CD02E}"/>
+                <a16:creationId xmlns:a16="http://schemas.microsoft.com/office/drawing/2014/main" id="{1CDBB656-1263-82FE-0CA3-0480A0123B4E}"/>
               </a:ext>
             </a:extLst>
           </p:cNvPr>
@@ -2985,7 +6057,7 @@
           <p:cNvPr id="7" name="Slide Number Placeholder 6">
             <a:extLst>
               <a:ext uri="{FF2B5EF4-FFF2-40B4-BE49-F238E27FC236}">
-                <a16:creationId xmlns:a16="http://schemas.microsoft.com/office/drawing/2014/main" id="{CBB9D7D8-0349-55D3-DB0F-2C7E15AB7D8D}"/>
+                <a16:creationId xmlns:a16="http://schemas.microsoft.com/office/drawing/2014/main" id="{183AFA99-6790-97FA-1664-A33F836A2E9C}"/>
               </a:ext>
             </a:extLst>
           </p:cNvPr>
@@ -3012,7 +6084,7 @@
     </p:spTree>
     <p:extLst>
       <p:ext uri="{BB962C8B-B14F-4D97-AF65-F5344CB8AC3E}">
-        <p14:creationId xmlns:p14="http://schemas.microsoft.com/office/powerpoint/2010/main" val="3489831168"/>
+        <p14:creationId xmlns:p14="http://schemas.microsoft.com/office/powerpoint/2010/main" val="3908145752"/>
       </p:ext>
     </p:extLst>
   </p:cSld>
@@ -3049,7 +6121,7 @@
           <p:cNvPr id="2" name="Title Placeholder 1">
             <a:extLst>
               <a:ext uri="{FF2B5EF4-FFF2-40B4-BE49-F238E27FC236}">
-                <a16:creationId xmlns:a16="http://schemas.microsoft.com/office/drawing/2014/main" id="{23A3CF10-4373-862A-DC50-D9183B160C4F}"/>
+                <a16:creationId xmlns:a16="http://schemas.microsoft.com/office/drawing/2014/main" id="{6B8F9606-BEA5-3D73-490A-C2023A8BD9C7}"/>
               </a:ext>
             </a:extLst>
           </p:cNvPr>
@@ -3087,7 +6159,7 @@
           <p:cNvPr id="3" name="Text Placeholder 2">
             <a:extLst>
               <a:ext uri="{FF2B5EF4-FFF2-40B4-BE49-F238E27FC236}">
-                <a16:creationId xmlns:a16="http://schemas.microsoft.com/office/drawing/2014/main" id="{99A4DA77-7EB9-8850-3856-E7E0F6D3075D}"/>
+                <a16:creationId xmlns:a16="http://schemas.microsoft.com/office/drawing/2014/main" id="{F7EC0C35-E4D7-C387-7776-E8C393228C83}"/>
               </a:ext>
             </a:extLst>
           </p:cNvPr>
@@ -3154,7 +6226,7 @@
           <p:cNvPr id="4" name="Date Placeholder 3">
             <a:extLst>
               <a:ext uri="{FF2B5EF4-FFF2-40B4-BE49-F238E27FC236}">
-                <a16:creationId xmlns:a16="http://schemas.microsoft.com/office/drawing/2014/main" id="{B16CDA39-67A2-99A3-931C-B3EAED9B6249}"/>
+                <a16:creationId xmlns:a16="http://schemas.microsoft.com/office/drawing/2014/main" id="{4A535BEA-13DB-ADEF-5BC8-C42845C8EE50}"/>
               </a:ext>
             </a:extLst>
           </p:cNvPr>
@@ -3190,7 +6262,7 @@
           <a:p>
             <a:fld id="{432F545F-E92B-4179-833A-C9AD93DAFB27}" type="datetimeFigureOut">
               <a:rPr lang="en-US" smtClean="0"/>
-              <a:t>3/28/2025</a:t>
+              <a:t>3/28/25</a:t>
             </a:fld>
             <a:endParaRPr lang="en-US"/>
           </a:p>
@@ -3201,7 +6273,7 @@
           <p:cNvPr id="5" name="Footer Placeholder 4">
             <a:extLst>
               <a:ext uri="{FF2B5EF4-FFF2-40B4-BE49-F238E27FC236}">
-                <a16:creationId xmlns:a16="http://schemas.microsoft.com/office/drawing/2014/main" id="{D6DFDBE3-809A-38BD-CD97-814BC1433C86}"/>
+                <a16:creationId xmlns:a16="http://schemas.microsoft.com/office/drawing/2014/main" id="{9CEC875D-E0EE-9394-163A-C4D7CE2DBB70}"/>
               </a:ext>
             </a:extLst>
           </p:cNvPr>
@@ -3244,7 +6316,7 @@
           <p:cNvPr id="6" name="Slide Number Placeholder 5">
             <a:extLst>
               <a:ext uri="{FF2B5EF4-FFF2-40B4-BE49-F238E27FC236}">
-                <a16:creationId xmlns:a16="http://schemas.microsoft.com/office/drawing/2014/main" id="{04627154-43A0-534F-B71D-2D8AA345EB07}"/>
+                <a16:creationId xmlns:a16="http://schemas.microsoft.com/office/drawing/2014/main" id="{9F45C58F-DF65-113D-528A-891434034240}"/>
               </a:ext>
             </a:extLst>
           </p:cNvPr>
@@ -3289,23 +6361,23 @@
     </p:spTree>
     <p:extLst>
       <p:ext uri="{BB962C8B-B14F-4D97-AF65-F5344CB8AC3E}">
-        <p14:creationId xmlns:p14="http://schemas.microsoft.com/office/powerpoint/2010/main" val="3346204601"/>
+        <p14:creationId xmlns:p14="http://schemas.microsoft.com/office/powerpoint/2010/main" val="1150267227"/>
       </p:ext>
     </p:extLst>
   </p:cSld>
   <p:clrMap bg1="lt1" tx1="dk1" bg2="lt2" tx2="dk2" accent1="accent1" accent2="accent2" accent3="accent3" accent4="accent4" accent5="accent5" accent6="accent6" hlink="hlink" folHlink="folHlink"/>
   <p:sldLayoutIdLst>
-    <p:sldLayoutId id="2147483649" r:id="rId1"/>
-    <p:sldLayoutId id="2147483650" r:id="rId2"/>
-    <p:sldLayoutId id="2147483651" r:id="rId3"/>
-    <p:sldLayoutId id="2147483652" r:id="rId4"/>
-    <p:sldLayoutId id="2147483653" r:id="rId5"/>
-    <p:sldLayoutId id="2147483654" r:id="rId6"/>
-    <p:sldLayoutId id="2147483655" r:id="rId7"/>
-    <p:sldLayoutId id="2147483656" r:id="rId8"/>
-    <p:sldLayoutId id="2147483657" r:id="rId9"/>
-    <p:sldLayoutId id="2147483658" r:id="rId10"/>
-    <p:sldLayoutId id="2147483659" r:id="rId11"/>
+    <p:sldLayoutId id="2147483685" r:id="rId1"/>
+    <p:sldLayoutId id="2147483686" r:id="rId2"/>
+    <p:sldLayoutId id="2147483687" r:id="rId3"/>
+    <p:sldLayoutId id="2147483688" r:id="rId4"/>
+    <p:sldLayoutId id="2147483689" r:id="rId5"/>
+    <p:sldLayoutId id="2147483690" r:id="rId6"/>
+    <p:sldLayoutId id="2147483691" r:id="rId7"/>
+    <p:sldLayoutId id="2147483692" r:id="rId8"/>
+    <p:sldLayoutId id="2147483693" r:id="rId9"/>
+    <p:sldLayoutId id="2147483694" r:id="rId10"/>
+    <p:sldLayoutId id="2147483695" r:id="rId11"/>
   </p:sldLayoutIdLst>
   <p:txStyles>
     <p:titleStyle>
@@ -4359,67 +7431,28 @@
           </a:p>
         </p:txBody>
       </p:sp>
-      <p:sp>
-        <p:nvSpPr>
-          <p:cNvPr id="3" name="Text Placeholder 2">
-            <a:extLst>
-              <a:ext uri="{FF2B5EF4-FFF2-40B4-BE49-F238E27FC236}">
-                <a16:creationId xmlns:a16="http://schemas.microsoft.com/office/drawing/2014/main" id="{68C75FFC-1B04-FFE5-D8BE-1505E5B1BE82}"/>
-              </a:ext>
-            </a:extLst>
-          </p:cNvPr>
-          <p:cNvSpPr>
-            <a:spLocks noGrp="1"/>
-          </p:cNvSpPr>
-          <p:nvPr>
-            <p:ph type="body" idx="1"/>
-          </p:nvPr>
-        </p:nvSpPr>
-        <p:spPr>
-          <a:xfrm>
-            <a:off x="831850" y="1738109"/>
-            <a:ext cx="10515600" cy="4554536"/>
-          </a:xfrm>
-        </p:spPr>
-        <p:txBody>
-          <a:bodyPr>
-            <a:normAutofit/>
-          </a:bodyPr>
-          <a:lstStyle/>
-          <a:p>
-            <a:r>
-              <a:rPr lang="en-US" sz="1800" kern="100" dirty="0">
-                <a:solidFill>
-                  <a:schemeClr val="tx1"/>
-                </a:solidFill>
-                <a:effectLst/>
-                <a:ea typeface="Aptos" panose="020B0004020202020204" pitchFamily="34" charset="0"/>
-                <a:cs typeface="Times New Roman" panose="02020603050405020304" pitchFamily="18" charset="0"/>
-              </a:rPr>
-              <a:t>The purpose of this document is to outline the technical design and development plan for the Moffat Bay Island Marina website.  The website will allow customers to view marina information, register, log in, reserve long-term slips based on boat size, and manage their reservations.  It will also include functionality for waitlists when slips are unavailable. The document will serve as a blueprint for the development, testing, and deployment of the website.</a:t>
-            </a:r>
-          </a:p>
-          <a:p>
-            <a:endParaRPr lang="en-US" sz="1800" kern="100" dirty="0">
-              <a:solidFill>
-                <a:schemeClr val="tx1"/>
-              </a:solidFill>
-              <a:ea typeface="Aptos" panose="020B0004020202020204" pitchFamily="34" charset="0"/>
-              <a:cs typeface="Times New Roman" panose="02020603050405020304" pitchFamily="18" charset="0"/>
-            </a:endParaRPr>
-          </a:p>
-          <a:p>
-            <a:r>
-              <a:rPr lang="en-US" sz="1800" dirty="0">
-                <a:solidFill>
-                  <a:schemeClr val="tx1"/>
-                </a:solidFill>
-              </a:rPr>
-              <a:t>Create a easy to access Marina website that allows any user to book a slip with zero hassle along with creating a backend that will allow for easy management of the reservations.</a:t>
-            </a:r>
-          </a:p>
-        </p:txBody>
-      </p:sp>
+      <p:graphicFrame>
+        <p:nvGraphicFramePr>
+          <p:cNvPr id="5" name="Text Placeholder 2">
+            <a:extLst>
+              <a:ext uri="{FF2B5EF4-FFF2-40B4-BE49-F238E27FC236}">
+                <a16:creationId xmlns:a16="http://schemas.microsoft.com/office/drawing/2014/main" id="{4EB2EC8D-1188-D86F-F069-A04B276A6D51}"/>
+              </a:ext>
+            </a:extLst>
+          </p:cNvPr>
+          <p:cNvGraphicFramePr/>
+          <p:nvPr/>
+        </p:nvGraphicFramePr>
+        <p:xfrm>
+          <a:off x="831850" y="1738109"/>
+          <a:ext cx="10515600" cy="4554536"/>
+        </p:xfrm>
+        <a:graphic>
+          <a:graphicData uri="http://schemas.openxmlformats.org/drawingml/2006/diagram">
+            <dgm:relIds xmlns:dgm="http://schemas.openxmlformats.org/drawingml/2006/diagram" xmlns:r="http://schemas.openxmlformats.org/officeDocument/2006/relationships" r:dm="rId2" r:lo="rId3" r:qs="rId4" r:cs="rId5"/>
+          </a:graphicData>
+        </a:graphic>
+      </p:graphicFrame>
     </p:spTree>
     <p:extLst>
       <p:ext uri="{BB962C8B-B14F-4D97-AF65-F5344CB8AC3E}">

</xml_diff>

<commit_message>
Updated Timeline and cost slide
</commit_message>
<xml_diff>
--- a/Documentation/Prototype Assignment - Group 2.pptx
+++ b/Documentation/Prototype Assignment - Group 2.pptx
@@ -393,6 +393,893 @@
 </pc:chgInfo>
 </file>
 
+<file path=ppt/charts/chart1.xml><?xml version="1.0" encoding="utf-8"?>
+<c:chartSpace xmlns:c="http://schemas.openxmlformats.org/drawingml/2006/chart" xmlns:a="http://schemas.openxmlformats.org/drawingml/2006/main" xmlns:r="http://schemas.openxmlformats.org/officeDocument/2006/relationships" xmlns:c16r2="http://schemas.microsoft.com/office/drawing/2015/06/chart">
+  <c:date1904 val="0"/>
+  <c:lang val="en-US"/>
+  <c:roundedCorners val="0"/>
+  <mc:AlternateContent xmlns:mc="http://schemas.openxmlformats.org/markup-compatibility/2006">
+    <mc:Choice xmlns:c14="http://schemas.microsoft.com/office/drawing/2007/8/2/chart" Requires="c14">
+      <c14:style val="102"/>
+    </mc:Choice>
+    <mc:Fallback>
+      <c:style val="2"/>
+    </mc:Fallback>
+  </mc:AlternateContent>
+  <c:chart>
+    <c:title>
+      <c:overlay val="0"/>
+      <c:spPr>
+        <a:noFill/>
+        <a:ln>
+          <a:noFill/>
+        </a:ln>
+        <a:effectLst/>
+      </c:spPr>
+      <c:txPr>
+        <a:bodyPr rot="0" spcFirstLastPara="1" vertOverflow="ellipsis" vert="horz" wrap="square" anchor="ctr" anchorCtr="1"/>
+        <a:lstStyle/>
+        <a:p>
+          <a:pPr>
+            <a:defRPr sz="1862" b="0" i="0" u="none" strike="noStrike" kern="1200" spc="0" baseline="0">
+              <a:solidFill>
+                <a:schemeClr val="tx1">
+                  <a:lumMod val="65000"/>
+                  <a:lumOff val="35000"/>
+                </a:schemeClr>
+              </a:solidFill>
+              <a:latin typeface="+mn-lt"/>
+              <a:ea typeface="+mn-ea"/>
+              <a:cs typeface="+mn-cs"/>
+            </a:defRPr>
+          </a:pPr>
+          <a:endParaRPr lang="en-US"/>
+        </a:p>
+      </c:txPr>
+    </c:title>
+    <c:autoTitleDeleted val="0"/>
+    <c:plotArea>
+      <c:layout/>
+      <c:pieChart>
+        <c:varyColors val="1"/>
+        <c:ser>
+          <c:idx val="0"/>
+          <c:order val="0"/>
+          <c:tx>
+            <c:strRef>
+              <c:f>Sheet1!$B$1</c:f>
+              <c:strCache>
+                <c:ptCount val="1"/>
+                <c:pt idx="0">
+                  <c:v>Sales</c:v>
+                </c:pt>
+              </c:strCache>
+            </c:strRef>
+          </c:tx>
+          <c:dPt>
+            <c:idx val="0"/>
+            <c:bubble3D val="0"/>
+            <c:spPr>
+              <a:solidFill>
+                <a:schemeClr val="accent1"/>
+              </a:solidFill>
+              <a:ln w="19050">
+                <a:solidFill>
+                  <a:schemeClr val="lt1"/>
+                </a:solidFill>
+              </a:ln>
+              <a:effectLst/>
+            </c:spPr>
+          </c:dPt>
+          <c:dPt>
+            <c:idx val="1"/>
+            <c:bubble3D val="0"/>
+            <c:spPr>
+              <a:solidFill>
+                <a:schemeClr val="accent2"/>
+              </a:solidFill>
+              <a:ln w="19050">
+                <a:solidFill>
+                  <a:schemeClr val="lt1"/>
+                </a:solidFill>
+              </a:ln>
+              <a:effectLst/>
+            </c:spPr>
+          </c:dPt>
+          <c:dPt>
+            <c:idx val="2"/>
+            <c:bubble3D val="0"/>
+            <c:spPr>
+              <a:solidFill>
+                <a:schemeClr val="accent3"/>
+              </a:solidFill>
+              <a:ln w="19050">
+                <a:solidFill>
+                  <a:schemeClr val="lt1"/>
+                </a:solidFill>
+              </a:ln>
+              <a:effectLst/>
+            </c:spPr>
+          </c:dPt>
+          <c:dPt>
+            <c:idx val="3"/>
+            <c:bubble3D val="0"/>
+            <c:spPr>
+              <a:solidFill>
+                <a:schemeClr val="accent4"/>
+              </a:solidFill>
+              <a:ln w="19050">
+                <a:solidFill>
+                  <a:schemeClr val="lt1"/>
+                </a:solidFill>
+              </a:ln>
+              <a:effectLst/>
+            </c:spPr>
+          </c:dPt>
+          <c:dPt>
+            <c:idx val="4"/>
+            <c:bubble3D val="0"/>
+            <c:spPr>
+              <a:solidFill>
+                <a:schemeClr val="accent5"/>
+              </a:solidFill>
+              <a:ln w="19050">
+                <a:solidFill>
+                  <a:schemeClr val="lt1"/>
+                </a:solidFill>
+              </a:ln>
+              <a:effectLst/>
+            </c:spPr>
+          </c:dPt>
+          <c:dLbls>
+            <c:spPr>
+              <a:solidFill>
+                <a:prstClr val="white"/>
+              </a:solidFill>
+              <a:ln>
+                <a:solidFill>
+                  <a:prstClr val="black">
+                    <a:lumMod val="25000"/>
+                    <a:lumOff val="75000"/>
+                  </a:prstClr>
+                </a:solidFill>
+              </a:ln>
+              <a:effectLst/>
+            </c:spPr>
+            <c:txPr>
+              <a:bodyPr rot="0" spcFirstLastPara="1" vertOverflow="clip" horzOverflow="clip" vert="horz" wrap="square" lIns="38100" tIns="19050" rIns="38100" bIns="19050" anchor="ctr" anchorCtr="1">
+                <a:spAutoFit/>
+              </a:bodyPr>
+              <a:lstStyle/>
+              <a:p>
+                <a:pPr>
+                  <a:defRPr sz="1197" b="0" i="0" u="none" strike="noStrike" kern="1200" baseline="0">
+                    <a:solidFill>
+                      <a:schemeClr val="dk1">
+                        <a:lumMod val="65000"/>
+                        <a:lumOff val="35000"/>
+                      </a:schemeClr>
+                    </a:solidFill>
+                    <a:latin typeface="+mn-lt"/>
+                    <a:ea typeface="+mn-ea"/>
+                    <a:cs typeface="+mn-cs"/>
+                  </a:defRPr>
+                </a:pPr>
+                <a:endParaRPr lang="en-US"/>
+              </a:p>
+            </c:txPr>
+            <c:dLblPos val="outEnd"/>
+            <c:showLegendKey val="0"/>
+            <c:showVal val="0"/>
+            <c:showCatName val="1"/>
+            <c:showSerName val="0"/>
+            <c:showPercent val="1"/>
+            <c:showBubbleSize val="0"/>
+            <c:showLeaderLines val="0"/>
+            <c:extLst>
+              <c:ext xmlns:c15="http://schemas.microsoft.com/office/drawing/2012/chart" uri="{CE6537A1-D6FC-4f65-9D91-7224C49458BB}">
+                <c15:spPr xmlns:c15="http://schemas.microsoft.com/office/drawing/2012/chart">
+                  <a:prstGeom prst="wedgeRectCallout">
+                    <a:avLst/>
+                  </a:prstGeom>
+                  <a:noFill/>
+                  <a:ln>
+                    <a:noFill/>
+                  </a:ln>
+                </c15:spPr>
+              </c:ext>
+            </c:extLst>
+          </c:dLbls>
+          <c:cat>
+            <c:strRef>
+              <c:f>Sheet1!$A$2:$A$6</c:f>
+              <c:strCache>
+                <c:ptCount val="5"/>
+                <c:pt idx="1">
+                  <c:v>Domain</c:v>
+                </c:pt>
+                <c:pt idx="2">
+                  <c:v>Hosting</c:v>
+                </c:pt>
+                <c:pt idx="3">
+                  <c:v>Content creation</c:v>
+                </c:pt>
+                <c:pt idx="4">
+                  <c:v>SEO</c:v>
+                </c:pt>
+              </c:strCache>
+            </c:strRef>
+          </c:cat>
+          <c:val>
+            <c:numRef>
+              <c:f>Sheet1!$B$2:$B$6</c:f>
+              <c:numCache>
+                <c:formatCode>General</c:formatCode>
+                <c:ptCount val="5"/>
+                <c:pt idx="1">
+                  <c:v>50</c:v>
+                </c:pt>
+                <c:pt idx="2">
+                  <c:v>100</c:v>
+                </c:pt>
+                <c:pt idx="3">
+                  <c:v>2500</c:v>
+                </c:pt>
+                <c:pt idx="4">
+                  <c:v>2000</c:v>
+                </c:pt>
+              </c:numCache>
+            </c:numRef>
+          </c:val>
+          <c:extLst>
+            <c:ext xmlns:c16="http://schemas.microsoft.com/office/drawing/2014/chart" uri="{C3380CC4-5D6E-409C-BE32-E72D297353CC}">
+              <c16:uniqueId val="{00000000-8449-403B-9CCA-A33630305B21}"/>
+            </c:ext>
+          </c:extLst>
+        </c:ser>
+        <c:dLbls>
+          <c:showLegendKey val="0"/>
+          <c:showVal val="0"/>
+          <c:showCatName val="0"/>
+          <c:showSerName val="0"/>
+          <c:showPercent val="0"/>
+          <c:showBubbleSize val="0"/>
+          <c:showLeaderLines val="0"/>
+        </c:dLbls>
+        <c:firstSliceAng val="0"/>
+      </c:pieChart>
+      <c:spPr>
+        <a:noFill/>
+        <a:ln>
+          <a:noFill/>
+        </a:ln>
+        <a:effectLst/>
+      </c:spPr>
+    </c:plotArea>
+    <c:legend>
+      <c:legendPos val="b"/>
+      <c:overlay val="0"/>
+      <c:spPr>
+        <a:noFill/>
+        <a:ln>
+          <a:noFill/>
+        </a:ln>
+        <a:effectLst/>
+      </c:spPr>
+      <c:txPr>
+        <a:bodyPr rot="0" spcFirstLastPara="1" vertOverflow="ellipsis" vert="horz" wrap="square" anchor="ctr" anchorCtr="1"/>
+        <a:lstStyle/>
+        <a:p>
+          <a:pPr>
+            <a:defRPr sz="1197" b="0" i="0" u="none" strike="noStrike" kern="1200" baseline="0">
+              <a:solidFill>
+                <a:schemeClr val="tx1">
+                  <a:lumMod val="65000"/>
+                  <a:lumOff val="35000"/>
+                </a:schemeClr>
+              </a:solidFill>
+              <a:latin typeface="+mn-lt"/>
+              <a:ea typeface="+mn-ea"/>
+              <a:cs typeface="+mn-cs"/>
+            </a:defRPr>
+          </a:pPr>
+          <a:endParaRPr lang="en-US"/>
+        </a:p>
+      </c:txPr>
+    </c:legend>
+    <c:plotVisOnly val="1"/>
+    <c:dispBlanksAs val="gap"/>
+    <c:extLst>
+      <c:ext xmlns:c16r3="http://schemas.microsoft.com/office/drawing/2017/03/chart" uri="{56B9EC1D-385E-4148-901F-78D8002777C0}">
+        <c16r3:dataDisplayOptions16>
+          <c16r3:dispNaAsBlank val="1"/>
+        </c16r3:dataDisplayOptions16>
+      </c:ext>
+    </c:extLst>
+    <c:showDLblsOverMax val="0"/>
+  </c:chart>
+  <c:spPr>
+    <a:noFill/>
+    <a:ln>
+      <a:noFill/>
+    </a:ln>
+    <a:effectLst/>
+  </c:spPr>
+  <c:txPr>
+    <a:bodyPr/>
+    <a:lstStyle/>
+    <a:p>
+      <a:pPr>
+        <a:defRPr/>
+      </a:pPr>
+      <a:endParaRPr lang="en-US"/>
+    </a:p>
+  </c:txPr>
+  <c:externalData r:id="rId3">
+    <c:autoUpdate val="0"/>
+  </c:externalData>
+</c:chartSpace>
+</file>
+
+<file path=ppt/charts/colors1.xml><?xml version="1.0" encoding="utf-8"?>
+<cs:colorStyle xmlns:cs="http://schemas.microsoft.com/office/drawing/2012/chartStyle" xmlns:a="http://schemas.openxmlformats.org/drawingml/2006/main" meth="cycle" id="10">
+  <a:schemeClr val="accent1"/>
+  <a:schemeClr val="accent2"/>
+  <a:schemeClr val="accent3"/>
+  <a:schemeClr val="accent4"/>
+  <a:schemeClr val="accent5"/>
+  <a:schemeClr val="accent6"/>
+  <cs:variation/>
+  <cs:variation>
+    <a:lumMod val="60000"/>
+  </cs:variation>
+  <cs:variation>
+    <a:lumMod val="80000"/>
+    <a:lumOff val="20000"/>
+  </cs:variation>
+  <cs:variation>
+    <a:lumMod val="80000"/>
+  </cs:variation>
+  <cs:variation>
+    <a:lumMod val="60000"/>
+    <a:lumOff val="40000"/>
+  </cs:variation>
+  <cs:variation>
+    <a:lumMod val="50000"/>
+  </cs:variation>
+  <cs:variation>
+    <a:lumMod val="70000"/>
+    <a:lumOff val="30000"/>
+  </cs:variation>
+  <cs:variation>
+    <a:lumMod val="70000"/>
+  </cs:variation>
+  <cs:variation>
+    <a:lumMod val="50000"/>
+    <a:lumOff val="50000"/>
+  </cs:variation>
+</cs:colorStyle>
+</file>
+
+<file path=ppt/charts/style1.xml><?xml version="1.0" encoding="utf-8"?>
+<cs:chartStyle xmlns:cs="http://schemas.microsoft.com/office/drawing/2012/chartStyle" xmlns:a="http://schemas.openxmlformats.org/drawingml/2006/main" id="251">
+  <cs:axisTitle>
+    <cs:lnRef idx="0"/>
+    <cs:fillRef idx="0"/>
+    <cs:effectRef idx="0"/>
+    <cs:fontRef idx="minor">
+      <a:schemeClr val="tx1">
+        <a:lumMod val="65000"/>
+        <a:lumOff val="35000"/>
+      </a:schemeClr>
+    </cs:fontRef>
+    <cs:defRPr sz="1330" kern="1200"/>
+  </cs:axisTitle>
+  <cs:categoryAxis>
+    <cs:lnRef idx="0"/>
+    <cs:fillRef idx="0"/>
+    <cs:effectRef idx="0"/>
+    <cs:fontRef idx="minor">
+      <a:schemeClr val="tx1">
+        <a:lumMod val="65000"/>
+        <a:lumOff val="35000"/>
+      </a:schemeClr>
+    </cs:fontRef>
+    <cs:spPr>
+      <a:ln w="9525" cap="flat" cmpd="sng" algn="ctr">
+        <a:solidFill>
+          <a:schemeClr val="tx1">
+            <a:lumMod val="15000"/>
+            <a:lumOff val="85000"/>
+          </a:schemeClr>
+        </a:solidFill>
+        <a:round/>
+      </a:ln>
+    </cs:spPr>
+    <cs:defRPr sz="1197" kern="1200"/>
+  </cs:categoryAxis>
+  <cs:chartArea mods="allowNoFillOverride allowNoLineOverride">
+    <cs:lnRef idx="0"/>
+    <cs:fillRef idx="0"/>
+    <cs:effectRef idx="0"/>
+    <cs:fontRef idx="minor">
+      <a:schemeClr val="tx1"/>
+    </cs:fontRef>
+    <cs:spPr>
+      <a:solidFill>
+        <a:schemeClr val="bg1"/>
+      </a:solidFill>
+      <a:ln w="9525" cap="flat" cmpd="sng" algn="ctr">
+        <a:solidFill>
+          <a:schemeClr val="tx1">
+            <a:lumMod val="15000"/>
+            <a:lumOff val="85000"/>
+          </a:schemeClr>
+        </a:solidFill>
+        <a:round/>
+      </a:ln>
+    </cs:spPr>
+    <cs:defRPr sz="1197" kern="1200"/>
+  </cs:chartArea>
+  <cs:dataLabel>
+    <cs:lnRef idx="0"/>
+    <cs:fillRef idx="0"/>
+    <cs:effectRef idx="0"/>
+    <cs:fontRef idx="minor">
+      <a:schemeClr val="tx1">
+        <a:lumMod val="75000"/>
+        <a:lumOff val="25000"/>
+      </a:schemeClr>
+    </cs:fontRef>
+    <cs:defRPr sz="1197" kern="1200"/>
+  </cs:dataLabel>
+  <cs:dataLabelCallout>
+    <cs:lnRef idx="0"/>
+    <cs:fillRef idx="0"/>
+    <cs:effectRef idx="0"/>
+    <cs:fontRef idx="minor">
+      <a:schemeClr val="dk1">
+        <a:lumMod val="65000"/>
+        <a:lumOff val="35000"/>
+      </a:schemeClr>
+    </cs:fontRef>
+    <cs:spPr>
+      <a:solidFill>
+        <a:schemeClr val="lt1"/>
+      </a:solidFill>
+      <a:ln>
+        <a:solidFill>
+          <a:schemeClr val="dk1">
+            <a:lumMod val="25000"/>
+            <a:lumOff val="75000"/>
+          </a:schemeClr>
+        </a:solidFill>
+      </a:ln>
+    </cs:spPr>
+    <cs:defRPr sz="1197" kern="1200"/>
+    <cs:bodyPr rot="0" spcFirstLastPara="1" vertOverflow="clip" horzOverflow="clip" vert="horz" wrap="square" lIns="36576" tIns="18288" rIns="36576" bIns="18288" anchor="ctr" anchorCtr="1">
+      <a:spAutoFit/>
+    </cs:bodyPr>
+  </cs:dataLabelCallout>
+  <cs:dataPoint>
+    <cs:lnRef idx="0"/>
+    <cs:fillRef idx="1">
+      <cs:styleClr val="auto"/>
+    </cs:fillRef>
+    <cs:effectRef idx="0"/>
+    <cs:fontRef idx="minor">
+      <a:schemeClr val="tx1"/>
+    </cs:fontRef>
+    <cs:spPr>
+      <a:ln w="19050">
+        <a:solidFill>
+          <a:schemeClr val="lt1"/>
+        </a:solidFill>
+      </a:ln>
+    </cs:spPr>
+  </cs:dataPoint>
+  <cs:dataPoint3D>
+    <cs:lnRef idx="0"/>
+    <cs:fillRef idx="1">
+      <cs:styleClr val="auto"/>
+    </cs:fillRef>
+    <cs:effectRef idx="0"/>
+    <cs:fontRef idx="minor">
+      <a:schemeClr val="tx1"/>
+    </cs:fontRef>
+    <cs:spPr>
+      <a:ln w="25400">
+        <a:solidFill>
+          <a:schemeClr val="lt1"/>
+        </a:solidFill>
+      </a:ln>
+    </cs:spPr>
+  </cs:dataPoint3D>
+  <cs:dataPointLine>
+    <cs:lnRef idx="0">
+      <cs:styleClr val="auto"/>
+    </cs:lnRef>
+    <cs:fillRef idx="0"/>
+    <cs:effectRef idx="0"/>
+    <cs:fontRef idx="minor">
+      <a:schemeClr val="tx1"/>
+    </cs:fontRef>
+    <cs:spPr>
+      <a:ln w="28575" cap="rnd">
+        <a:solidFill>
+          <a:schemeClr val="phClr"/>
+        </a:solidFill>
+        <a:round/>
+      </a:ln>
+    </cs:spPr>
+  </cs:dataPointLine>
+  <cs:dataPointMarker>
+    <cs:lnRef idx="0">
+      <cs:styleClr val="auto"/>
+    </cs:lnRef>
+    <cs:fillRef idx="1">
+      <cs:styleClr val="auto"/>
+    </cs:fillRef>
+    <cs:effectRef idx="0"/>
+    <cs:fontRef idx="minor">
+      <a:schemeClr val="tx1"/>
+    </cs:fontRef>
+    <cs:spPr>
+      <a:ln w="9525">
+        <a:solidFill>
+          <a:schemeClr val="phClr"/>
+        </a:solidFill>
+      </a:ln>
+    </cs:spPr>
+  </cs:dataPointMarker>
+  <cs:dataPointMarkerLayout symbol="circle" size="5"/>
+  <cs:dataPointWireframe>
+    <cs:lnRef idx="0">
+      <cs:styleClr val="auto"/>
+    </cs:lnRef>
+    <cs:fillRef idx="0"/>
+    <cs:effectRef idx="0"/>
+    <cs:fontRef idx="minor">
+      <a:schemeClr val="tx1"/>
+    </cs:fontRef>
+    <cs:spPr>
+      <a:ln w="9525" cap="rnd">
+        <a:solidFill>
+          <a:schemeClr val="phClr"/>
+        </a:solidFill>
+        <a:round/>
+      </a:ln>
+    </cs:spPr>
+  </cs:dataPointWireframe>
+  <cs:dataTable>
+    <cs:lnRef idx="0"/>
+    <cs:fillRef idx="0"/>
+    <cs:effectRef idx="0"/>
+    <cs:fontRef idx="minor">
+      <a:schemeClr val="tx1">
+        <a:lumMod val="65000"/>
+        <a:lumOff val="35000"/>
+      </a:schemeClr>
+    </cs:fontRef>
+    <cs:spPr>
+      <a:noFill/>
+      <a:ln w="9525" cap="flat" cmpd="sng" algn="ctr">
+        <a:solidFill>
+          <a:schemeClr val="tx1">
+            <a:lumMod val="15000"/>
+            <a:lumOff val="85000"/>
+          </a:schemeClr>
+        </a:solidFill>
+        <a:round/>
+      </a:ln>
+    </cs:spPr>
+    <cs:defRPr sz="1197" kern="1200"/>
+  </cs:dataTable>
+  <cs:downBar>
+    <cs:lnRef idx="0"/>
+    <cs:fillRef idx="0"/>
+    <cs:effectRef idx="0"/>
+    <cs:fontRef idx="minor">
+      <a:schemeClr val="tx1"/>
+    </cs:fontRef>
+    <cs:spPr>
+      <a:solidFill>
+        <a:schemeClr val="dk1">
+          <a:lumMod val="75000"/>
+          <a:lumOff val="25000"/>
+        </a:schemeClr>
+      </a:solidFill>
+      <a:ln w="9525" cap="flat" cmpd="sng" algn="ctr">
+        <a:solidFill>
+          <a:schemeClr val="tx1">
+            <a:lumMod val="65000"/>
+            <a:lumOff val="35000"/>
+          </a:schemeClr>
+        </a:solidFill>
+        <a:round/>
+      </a:ln>
+    </cs:spPr>
+  </cs:downBar>
+  <cs:dropLine>
+    <cs:lnRef idx="0"/>
+    <cs:fillRef idx="0"/>
+    <cs:effectRef idx="0"/>
+    <cs:fontRef idx="minor">
+      <a:schemeClr val="tx1"/>
+    </cs:fontRef>
+    <cs:spPr>
+      <a:ln w="9525" cap="flat" cmpd="sng" algn="ctr">
+        <a:solidFill>
+          <a:schemeClr val="tx1">
+            <a:lumMod val="35000"/>
+            <a:lumOff val="65000"/>
+          </a:schemeClr>
+        </a:solidFill>
+        <a:round/>
+      </a:ln>
+    </cs:spPr>
+  </cs:dropLine>
+  <cs:errorBar>
+    <cs:lnRef idx="0"/>
+    <cs:fillRef idx="0"/>
+    <cs:effectRef idx="0"/>
+    <cs:fontRef idx="minor">
+      <a:schemeClr val="tx1"/>
+    </cs:fontRef>
+    <cs:spPr>
+      <a:ln w="9525" cap="flat" cmpd="sng" algn="ctr">
+        <a:solidFill>
+          <a:schemeClr val="tx1">
+            <a:lumMod val="65000"/>
+            <a:lumOff val="35000"/>
+          </a:schemeClr>
+        </a:solidFill>
+        <a:round/>
+      </a:ln>
+    </cs:spPr>
+  </cs:errorBar>
+  <cs:floor>
+    <cs:lnRef idx="0"/>
+    <cs:fillRef idx="0"/>
+    <cs:effectRef idx="0"/>
+    <cs:fontRef idx="minor">
+      <a:schemeClr val="tx1"/>
+    </cs:fontRef>
+    <cs:spPr>
+      <a:noFill/>
+      <a:ln>
+        <a:noFill/>
+      </a:ln>
+    </cs:spPr>
+  </cs:floor>
+  <cs:gridlineMajor>
+    <cs:lnRef idx="0"/>
+    <cs:fillRef idx="0"/>
+    <cs:effectRef idx="0"/>
+    <cs:fontRef idx="minor">
+      <a:schemeClr val="tx1"/>
+    </cs:fontRef>
+    <cs:spPr>
+      <a:ln w="9525" cap="flat" cmpd="sng" algn="ctr">
+        <a:solidFill>
+          <a:schemeClr val="tx1">
+            <a:lumMod val="15000"/>
+            <a:lumOff val="85000"/>
+          </a:schemeClr>
+        </a:solidFill>
+        <a:round/>
+      </a:ln>
+    </cs:spPr>
+  </cs:gridlineMajor>
+  <cs:gridlineMinor>
+    <cs:lnRef idx="0"/>
+    <cs:fillRef idx="0"/>
+    <cs:effectRef idx="0"/>
+    <cs:fontRef idx="minor">
+      <a:schemeClr val="tx1"/>
+    </cs:fontRef>
+    <cs:spPr>
+      <a:ln w="9525" cap="flat" cmpd="sng" algn="ctr">
+        <a:solidFill>
+          <a:schemeClr val="tx1">
+            <a:lumMod val="5000"/>
+            <a:lumOff val="95000"/>
+          </a:schemeClr>
+        </a:solidFill>
+        <a:round/>
+      </a:ln>
+    </cs:spPr>
+  </cs:gridlineMinor>
+  <cs:hiLoLine>
+    <cs:lnRef idx="0"/>
+    <cs:fillRef idx="0"/>
+    <cs:effectRef idx="0"/>
+    <cs:fontRef idx="minor">
+      <a:schemeClr val="tx1"/>
+    </cs:fontRef>
+    <cs:spPr>
+      <a:ln w="9525" cap="flat" cmpd="sng" algn="ctr">
+        <a:solidFill>
+          <a:schemeClr val="tx1">
+            <a:lumMod val="50000"/>
+            <a:lumOff val="50000"/>
+          </a:schemeClr>
+        </a:solidFill>
+        <a:round/>
+      </a:ln>
+    </cs:spPr>
+  </cs:hiLoLine>
+  <cs:leaderLine>
+    <cs:lnRef idx="0"/>
+    <cs:fillRef idx="0"/>
+    <cs:effectRef idx="0"/>
+    <cs:fontRef idx="minor">
+      <a:schemeClr val="tx1"/>
+    </cs:fontRef>
+    <cs:spPr>
+      <a:ln w="9525" cap="flat" cmpd="sng" algn="ctr">
+        <a:solidFill>
+          <a:schemeClr val="tx1">
+            <a:lumMod val="35000"/>
+            <a:lumOff val="65000"/>
+          </a:schemeClr>
+        </a:solidFill>
+        <a:round/>
+      </a:ln>
+    </cs:spPr>
+  </cs:leaderLine>
+  <cs:legend>
+    <cs:lnRef idx="0"/>
+    <cs:fillRef idx="0"/>
+    <cs:effectRef idx="0"/>
+    <cs:fontRef idx="minor">
+      <a:schemeClr val="tx1">
+        <a:lumMod val="65000"/>
+        <a:lumOff val="35000"/>
+      </a:schemeClr>
+    </cs:fontRef>
+    <cs:defRPr sz="1197" kern="1200"/>
+  </cs:legend>
+  <cs:plotArea mods="allowNoFillOverride allowNoLineOverride">
+    <cs:lnRef idx="0"/>
+    <cs:fillRef idx="0"/>
+    <cs:effectRef idx="0"/>
+    <cs:fontRef idx="minor">
+      <a:schemeClr val="tx1"/>
+    </cs:fontRef>
+  </cs:plotArea>
+  <cs:plotArea3D mods="allowNoFillOverride allowNoLineOverride">
+    <cs:lnRef idx="0"/>
+    <cs:fillRef idx="0"/>
+    <cs:effectRef idx="0"/>
+    <cs:fontRef idx="minor">
+      <a:schemeClr val="tx1"/>
+    </cs:fontRef>
+  </cs:plotArea3D>
+  <cs:seriesAxis>
+    <cs:lnRef idx="0"/>
+    <cs:fillRef idx="0"/>
+    <cs:effectRef idx="0"/>
+    <cs:fontRef idx="minor">
+      <a:schemeClr val="tx1">
+        <a:lumMod val="65000"/>
+        <a:lumOff val="35000"/>
+      </a:schemeClr>
+    </cs:fontRef>
+    <cs:defRPr sz="1197" kern="1200"/>
+  </cs:seriesAxis>
+  <cs:seriesLine>
+    <cs:lnRef idx="0"/>
+    <cs:fillRef idx="0"/>
+    <cs:effectRef idx="0"/>
+    <cs:fontRef idx="minor">
+      <a:schemeClr val="tx1"/>
+    </cs:fontRef>
+    <cs:spPr>
+      <a:ln w="9525" cap="flat" cmpd="sng" algn="ctr">
+        <a:solidFill>
+          <a:schemeClr val="tx1">
+            <a:lumMod val="35000"/>
+            <a:lumOff val="65000"/>
+          </a:schemeClr>
+        </a:solidFill>
+        <a:round/>
+      </a:ln>
+    </cs:spPr>
+  </cs:seriesLine>
+  <cs:title>
+    <cs:lnRef idx="0"/>
+    <cs:fillRef idx="0"/>
+    <cs:effectRef idx="0"/>
+    <cs:fontRef idx="minor">
+      <a:schemeClr val="tx1">
+        <a:lumMod val="65000"/>
+        <a:lumOff val="35000"/>
+      </a:schemeClr>
+    </cs:fontRef>
+    <cs:defRPr sz="1862" b="0" kern="1200" spc="0" baseline="0"/>
+  </cs:title>
+  <cs:trendline>
+    <cs:lnRef idx="0">
+      <cs:styleClr val="auto"/>
+    </cs:lnRef>
+    <cs:fillRef idx="0"/>
+    <cs:effectRef idx="0"/>
+    <cs:fontRef idx="minor">
+      <a:schemeClr val="tx1"/>
+    </cs:fontRef>
+    <cs:spPr>
+      <a:ln w="19050" cap="rnd">
+        <a:solidFill>
+          <a:schemeClr val="phClr"/>
+        </a:solidFill>
+        <a:prstDash val="sysDot"/>
+      </a:ln>
+    </cs:spPr>
+  </cs:trendline>
+  <cs:trendlineLabel>
+    <cs:lnRef idx="0"/>
+    <cs:fillRef idx="0"/>
+    <cs:effectRef idx="0"/>
+    <cs:fontRef idx="minor">
+      <a:schemeClr val="tx1">
+        <a:lumMod val="65000"/>
+        <a:lumOff val="35000"/>
+      </a:schemeClr>
+    </cs:fontRef>
+    <cs:defRPr sz="1197" kern="1200"/>
+  </cs:trendlineLabel>
+  <cs:upBar>
+    <cs:lnRef idx="0"/>
+    <cs:fillRef idx="0"/>
+    <cs:effectRef idx="0"/>
+    <cs:fontRef idx="minor">
+      <a:schemeClr val="tx1"/>
+    </cs:fontRef>
+    <cs:spPr>
+      <a:solidFill>
+        <a:schemeClr val="lt1"/>
+      </a:solidFill>
+      <a:ln w="9525" cap="flat" cmpd="sng" algn="ctr">
+        <a:solidFill>
+          <a:schemeClr val="tx1">
+            <a:lumMod val="65000"/>
+            <a:lumOff val="35000"/>
+          </a:schemeClr>
+        </a:solidFill>
+        <a:round/>
+      </a:ln>
+    </cs:spPr>
+  </cs:upBar>
+  <cs:valueAxis>
+    <cs:lnRef idx="0"/>
+    <cs:fillRef idx="0"/>
+    <cs:effectRef idx="0"/>
+    <cs:fontRef idx="minor">
+      <a:schemeClr val="tx1">
+        <a:lumMod val="65000"/>
+        <a:lumOff val="35000"/>
+      </a:schemeClr>
+    </cs:fontRef>
+    <cs:defRPr sz="1197" kern="1200"/>
+  </cs:valueAxis>
+  <cs:wall>
+    <cs:lnRef idx="0"/>
+    <cs:fillRef idx="0"/>
+    <cs:effectRef idx="0"/>
+    <cs:fontRef idx="minor">
+      <a:schemeClr val="tx1"/>
+    </cs:fontRef>
+    <cs:spPr>
+      <a:noFill/>
+      <a:ln>
+        <a:noFill/>
+      </a:ln>
+    </cs:spPr>
+  </cs:wall>
+</cs:chartStyle>
+</file>
+
 <file path=ppt/slideLayouts/slideLayout1.xml><?xml version="1.0" encoding="utf-8"?>
 <p:sldLayout xmlns:a="http://schemas.openxmlformats.org/drawingml/2006/main" xmlns:r="http://schemas.openxmlformats.org/officeDocument/2006/relationships" xmlns:p="http://schemas.openxmlformats.org/presentationml/2006/main" type="title" preserve="1">
   <p:cSld name="Title Slide">
@@ -4181,13 +5068,19 @@
           <a:p>
             <a:r>
               <a:rPr lang="en-US" dirty="0"/>
-              <a:t>4 Weeks to for completion of First pass on website.</a:t>
+              <a:t>4 Weeks  for completion of First pass on website.</a:t>
             </a:r>
           </a:p>
           <a:p>
             <a:r>
               <a:rPr lang="en-US" dirty="0"/>
-              <a:t>2 Weeks of QA</a:t>
+              <a:t>1 Weeks of QA</a:t>
+            </a:r>
+          </a:p>
+          <a:p>
+            <a:r>
+              <a:rPr lang="en-US" dirty="0"/>
+              <a:t>1 week for revisions post testing</a:t>
             </a:r>
           </a:p>
           <a:p>
@@ -4207,6 +5100,267 @@
           </a:p>
         </p:txBody>
       </p:sp>
+      <p:sp>
+        <p:nvSpPr>
+          <p:cNvPr id="4" name="Rectangle 3">
+            <a:extLst>
+              <a:ext uri="{FF2B5EF4-FFF2-40B4-BE49-F238E27FC236}">
+                <a16:creationId xmlns:a16="http://schemas.microsoft.com/office/drawing/2014/main" id="{48B63C24-C8D8-4195-B56C-F47DB489EB8C}"/>
+              </a:ext>
+            </a:extLst>
+          </p:cNvPr>
+          <p:cNvSpPr/>
+          <p:nvPr/>
+        </p:nvSpPr>
+        <p:spPr>
+          <a:xfrm>
+            <a:off x="838200" y="4989060"/>
+            <a:ext cx="5127171" cy="914400"/>
+          </a:xfrm>
+          <a:prstGeom prst="rect">
+            <a:avLst/>
+          </a:prstGeom>
+        </p:spPr>
+        <p:style>
+          <a:lnRef idx="2">
+            <a:schemeClr val="accent1">
+              <a:shade val="15000"/>
+            </a:schemeClr>
+          </a:lnRef>
+          <a:fillRef idx="1">
+            <a:schemeClr val="accent1"/>
+          </a:fillRef>
+          <a:effectRef idx="0">
+            <a:schemeClr val="accent1"/>
+          </a:effectRef>
+          <a:fontRef idx="minor">
+            <a:schemeClr val="lt1"/>
+          </a:fontRef>
+        </p:style>
+        <p:txBody>
+          <a:bodyPr rtlCol="0" anchor="ctr"/>
+          <a:lstStyle/>
+          <a:p>
+            <a:pPr algn="ctr"/>
+            <a:r>
+              <a:rPr lang="en-US" dirty="0"/>
+              <a:t>INITIAL DEVELOPMENT</a:t>
+            </a:r>
+          </a:p>
+        </p:txBody>
+      </p:sp>
+      <p:sp>
+        <p:nvSpPr>
+          <p:cNvPr id="5" name="Rectangle 4">
+            <a:extLst>
+              <a:ext uri="{FF2B5EF4-FFF2-40B4-BE49-F238E27FC236}">
+                <a16:creationId xmlns:a16="http://schemas.microsoft.com/office/drawing/2014/main" id="{0C088A36-2D6B-14E8-E76D-F6B64BD963D7}"/>
+              </a:ext>
+            </a:extLst>
+          </p:cNvPr>
+          <p:cNvSpPr/>
+          <p:nvPr/>
+        </p:nvSpPr>
+        <p:spPr>
+          <a:xfrm>
+            <a:off x="6811735" y="4989060"/>
+            <a:ext cx="1322612" cy="914400"/>
+          </a:xfrm>
+          <a:prstGeom prst="rect">
+            <a:avLst/>
+          </a:prstGeom>
+        </p:spPr>
+        <p:style>
+          <a:lnRef idx="2">
+            <a:schemeClr val="accent4">
+              <a:shade val="15000"/>
+            </a:schemeClr>
+          </a:lnRef>
+          <a:fillRef idx="1">
+            <a:schemeClr val="accent4"/>
+          </a:fillRef>
+          <a:effectRef idx="0">
+            <a:schemeClr val="accent4"/>
+          </a:effectRef>
+          <a:fontRef idx="minor">
+            <a:schemeClr val="lt1"/>
+          </a:fontRef>
+        </p:style>
+        <p:txBody>
+          <a:bodyPr rtlCol="0" anchor="ctr"/>
+          <a:lstStyle/>
+          <a:p>
+            <a:pPr algn="ctr"/>
+            <a:r>
+              <a:rPr lang="en-US" dirty="0"/>
+              <a:t>QA/TESTING</a:t>
+            </a:r>
+          </a:p>
+        </p:txBody>
+      </p:sp>
+      <p:sp>
+        <p:nvSpPr>
+          <p:cNvPr id="6" name="Rectangle 5">
+            <a:extLst>
+              <a:ext uri="{FF2B5EF4-FFF2-40B4-BE49-F238E27FC236}">
+                <a16:creationId xmlns:a16="http://schemas.microsoft.com/office/drawing/2014/main" id="{36E8D89D-0DB8-3721-4AFB-646E64E16B0D}"/>
+              </a:ext>
+            </a:extLst>
+          </p:cNvPr>
+          <p:cNvSpPr/>
+          <p:nvPr/>
+        </p:nvSpPr>
+        <p:spPr>
+          <a:xfrm>
+            <a:off x="8980711" y="4989060"/>
+            <a:ext cx="1322612" cy="914400"/>
+          </a:xfrm>
+          <a:prstGeom prst="rect">
+            <a:avLst/>
+          </a:prstGeom>
+        </p:spPr>
+        <p:style>
+          <a:lnRef idx="1">
+            <a:schemeClr val="accent4"/>
+          </a:lnRef>
+          <a:fillRef idx="2">
+            <a:schemeClr val="accent4"/>
+          </a:fillRef>
+          <a:effectRef idx="1">
+            <a:schemeClr val="accent4"/>
+          </a:effectRef>
+          <a:fontRef idx="minor">
+            <a:schemeClr val="dk1"/>
+          </a:fontRef>
+        </p:style>
+        <p:txBody>
+          <a:bodyPr rtlCol="0" anchor="ctr"/>
+          <a:lstStyle/>
+          <a:p>
+            <a:pPr algn="ctr"/>
+            <a:r>
+              <a:rPr lang="en-US" dirty="0">
+                <a:solidFill>
+                  <a:schemeClr val="bg1"/>
+                </a:solidFill>
+              </a:rPr>
+              <a:t>REVISION</a:t>
+            </a:r>
+          </a:p>
+        </p:txBody>
+      </p:sp>
+      <p:cxnSp>
+        <p:nvCxnSpPr>
+          <p:cNvPr id="16" name="Straight Arrow Connector 15">
+            <a:extLst>
+              <a:ext uri="{FF2B5EF4-FFF2-40B4-BE49-F238E27FC236}">
+                <a16:creationId xmlns:a16="http://schemas.microsoft.com/office/drawing/2014/main" id="{11449888-23FD-65B0-93A9-26644E4A953E}"/>
+              </a:ext>
+            </a:extLst>
+          </p:cNvPr>
+          <p:cNvCxnSpPr>
+            <a:stCxn id="4" idx="3"/>
+            <a:endCxn id="5" idx="1"/>
+          </p:cNvCxnSpPr>
+          <p:nvPr/>
+        </p:nvCxnSpPr>
+        <p:spPr>
+          <a:xfrm>
+            <a:off x="5965371" y="5446260"/>
+            <a:ext cx="846364" cy="0"/>
+          </a:xfrm>
+          <a:prstGeom prst="straightConnector1">
+            <a:avLst/>
+          </a:prstGeom>
+          <a:ln>
+            <a:tailEnd type="triangle"/>
+          </a:ln>
+        </p:spPr>
+        <p:style>
+          <a:lnRef idx="2">
+            <a:schemeClr val="accent1"/>
+          </a:lnRef>
+          <a:fillRef idx="0">
+            <a:schemeClr val="accent1"/>
+          </a:fillRef>
+          <a:effectRef idx="1">
+            <a:schemeClr val="accent1"/>
+          </a:effectRef>
+          <a:fontRef idx="minor">
+            <a:schemeClr val="tx1"/>
+          </a:fontRef>
+        </p:style>
+      </p:cxnSp>
+      <p:cxnSp>
+        <p:nvCxnSpPr>
+          <p:cNvPr id="18" name="Straight Arrow Connector 17">
+            <a:extLst>
+              <a:ext uri="{FF2B5EF4-FFF2-40B4-BE49-F238E27FC236}">
+                <a16:creationId xmlns:a16="http://schemas.microsoft.com/office/drawing/2014/main" id="{0ACB9AE5-1673-C786-2564-BA871D4DA58B}"/>
+              </a:ext>
+            </a:extLst>
+          </p:cNvPr>
+          <p:cNvCxnSpPr>
+            <a:stCxn id="5" idx="3"/>
+            <a:endCxn id="6" idx="1"/>
+          </p:cNvCxnSpPr>
+          <p:nvPr/>
+        </p:nvCxnSpPr>
+        <p:spPr>
+          <a:xfrm>
+            <a:off x="8134347" y="5446260"/>
+            <a:ext cx="846364" cy="0"/>
+          </a:xfrm>
+          <a:prstGeom prst="straightConnector1">
+            <a:avLst/>
+          </a:prstGeom>
+          <a:ln>
+            <a:tailEnd type="triangle"/>
+          </a:ln>
+        </p:spPr>
+        <p:style>
+          <a:lnRef idx="2">
+            <a:schemeClr val="accent1"/>
+          </a:lnRef>
+          <a:fillRef idx="0">
+            <a:schemeClr val="accent1"/>
+          </a:fillRef>
+          <a:effectRef idx="1">
+            <a:schemeClr val="accent1"/>
+          </a:effectRef>
+          <a:fontRef idx="minor">
+            <a:schemeClr val="tx1"/>
+          </a:fontRef>
+        </p:style>
+      </p:cxnSp>
+      <p:graphicFrame>
+        <p:nvGraphicFramePr>
+          <p:cNvPr id="21" name="Chart 20">
+            <a:extLst>
+              <a:ext uri="{FF2B5EF4-FFF2-40B4-BE49-F238E27FC236}">
+                <a16:creationId xmlns:a16="http://schemas.microsoft.com/office/drawing/2014/main" id="{D3D2D302-05D7-6AFF-BA76-A6AE3B553EC5}"/>
+              </a:ext>
+            </a:extLst>
+          </p:cNvPr>
+          <p:cNvGraphicFramePr/>
+          <p:nvPr>
+            <p:extLst>
+              <p:ext uri="{D42A27DB-BD31-4B8C-83A1-F6EECF244321}">
+                <p14:modId xmlns:p14="http://schemas.microsoft.com/office/powerpoint/2010/main" val="3753803025"/>
+              </p:ext>
+            </p:extLst>
+          </p:nvPr>
+        </p:nvGraphicFramePr>
+        <p:xfrm>
+          <a:off x="7681686" y="1315431"/>
+          <a:ext cx="4779735" cy="3538692"/>
+        </p:xfrm>
+        <a:graphic>
+          <a:graphicData uri="http://schemas.openxmlformats.org/drawingml/2006/chart">
+            <c:chart xmlns:c="http://schemas.openxmlformats.org/drawingml/2006/chart" xmlns:r="http://schemas.openxmlformats.org/officeDocument/2006/relationships" r:id="rId2"/>
+          </a:graphicData>
+        </a:graphic>
+      </p:graphicFrame>
     </p:spTree>
     <p:extLst>
       <p:ext uri="{BB962C8B-B14F-4D97-AF65-F5344CB8AC3E}">

</xml_diff>

<commit_message>
Adding few more updates and changes to the prototype plus mockup of site.
</commit_message>
<xml_diff>
--- a/Documentation/Prototype Assignment - Group 2.pptx
+++ b/Documentation/Prototype Assignment - Group 2.pptx
@@ -12747,10 +12747,10 @@
       </p:sp>
       <p:pic>
         <p:nvPicPr>
-          <p:cNvPr id="3" name="Picture 2" descr="A close-up of a tag&#10;&#10;AI-generated content may be incorrect.">
+          <p:cNvPr id="5" name="Picture 4">
             <a:extLst>
               <a:ext uri="{FF2B5EF4-FFF2-40B4-BE49-F238E27FC236}">
-                <a16:creationId xmlns:a16="http://schemas.microsoft.com/office/drawing/2014/main" id="{E212927B-B76B-FD81-C12D-70B77AF47BF4}"/>
+                <a16:creationId xmlns:a16="http://schemas.microsoft.com/office/drawing/2014/main" id="{71150FDB-FD92-BB8B-0D44-F303310BA18E}"/>
               </a:ext>
             </a:extLst>
           </p:cNvPr>
@@ -12760,51 +12760,15 @@
           <p:nvPr/>
         </p:nvPicPr>
         <p:blipFill>
-          <a:blip r:embed="rId2">
-            <a:extLst>
-              <a:ext uri="{28A0092B-C50C-407E-A947-70E740481C1C}">
-                <a14:useLocalDpi xmlns:a14="http://schemas.microsoft.com/office/drawing/2010/main" val="0"/>
-              </a:ext>
-            </a:extLst>
-          </a:blip>
+          <a:blip r:embed="rId2"/>
           <a:stretch>
             <a:fillRect/>
           </a:stretch>
         </p:blipFill>
         <p:spPr>
           <a:xfrm>
-            <a:off x="2427235" y="1283367"/>
-            <a:ext cx="7337527" cy="1088288"/>
-          </a:xfrm>
-          <a:prstGeom prst="rect">
-            <a:avLst/>
-          </a:prstGeom>
-        </p:spPr>
-      </p:pic>
-      <p:pic>
-        <p:nvPicPr>
-          <p:cNvPr id="4" name="Picture 3">
-            <a:extLst>
-              <a:ext uri="{FF2B5EF4-FFF2-40B4-BE49-F238E27FC236}">
-                <a16:creationId xmlns:a16="http://schemas.microsoft.com/office/drawing/2014/main" id="{3CB01B46-2E69-31F7-8357-85E692BF7DA5}"/>
-              </a:ext>
-            </a:extLst>
-          </p:cNvPr>
-          <p:cNvPicPr>
-            <a:picLocks noChangeAspect="1"/>
-          </p:cNvPicPr>
-          <p:nvPr/>
-        </p:nvPicPr>
-        <p:blipFill>
-          <a:blip r:embed="rId3"/>
-          <a:stretch>
-            <a:fillRect/>
-          </a:stretch>
-        </p:blipFill>
-        <p:spPr>
-          <a:xfrm>
-            <a:off x="2513668" y="2351602"/>
-            <a:ext cx="7164659" cy="3350380"/>
+            <a:off x="1764632" y="1136208"/>
+            <a:ext cx="8967535" cy="4982414"/>
           </a:xfrm>
           <a:prstGeom prst="rect">
             <a:avLst/>

</xml_diff>

<commit_message>
Adding color scheme slide
</commit_message>
<xml_diff>
--- a/Documentation/Prototype Assignment - Group 2.pptx
+++ b/Documentation/Prototype Assignment - Group 2.pptx
@@ -12632,7 +12632,12 @@
             <p:ph type="title"/>
           </p:nvPr>
         </p:nvSpPr>
-        <p:spPr/>
+        <p:spPr>
+          <a:xfrm>
+            <a:off x="206208" y="176463"/>
+            <a:ext cx="10515600" cy="953001"/>
+          </a:xfrm>
+        </p:spPr>
         <p:txBody>
           <a:bodyPr/>
           <a:lstStyle/>
@@ -12644,12 +12649,47 @@
           </a:p>
         </p:txBody>
       </p:sp>
+      <p:pic>
+        <p:nvPicPr>
+          <p:cNvPr id="5" name="Picture 4" descr="A close-up of a whiteboard&#10;&#10;AI-generated content may be incorrect.">
+            <a:extLst>
+              <a:ext uri="{FF2B5EF4-FFF2-40B4-BE49-F238E27FC236}">
+                <a16:creationId xmlns:a16="http://schemas.microsoft.com/office/drawing/2014/main" id="{E9F4844C-7100-A3FD-E5AF-A1235958A692}"/>
+              </a:ext>
+            </a:extLst>
+          </p:cNvPr>
+          <p:cNvPicPr>
+            <a:picLocks noChangeAspect="1"/>
+          </p:cNvPicPr>
+          <p:nvPr/>
+        </p:nvPicPr>
+        <p:blipFill>
+          <a:blip r:embed="rId2">
+            <a:extLst>
+              <a:ext uri="{28A0092B-C50C-407E-A947-70E740481C1C}">
+                <a14:useLocalDpi xmlns:a14="http://schemas.microsoft.com/office/drawing/2010/main" val="0"/>
+              </a:ext>
+            </a:extLst>
+          </a:blip>
+          <a:srcRect l="10521" t="8497" r="18842" b="12564"/>
+          <a:stretch/>
+        </p:blipFill>
+        <p:spPr>
+          <a:xfrm>
+            <a:off x="5852025" y="1701368"/>
+            <a:ext cx="5511467" cy="4058654"/>
+          </a:xfrm>
+          <a:prstGeom prst="rect">
+            <a:avLst/>
+          </a:prstGeom>
+        </p:spPr>
+      </p:pic>
       <p:sp>
         <p:nvSpPr>
-          <p:cNvPr id="3" name="Text Placeholder 2">
+          <p:cNvPr id="7" name="Text Placeholder 6">
             <a:extLst>
               <a:ext uri="{FF2B5EF4-FFF2-40B4-BE49-F238E27FC236}">
-                <a16:creationId xmlns:a16="http://schemas.microsoft.com/office/drawing/2014/main" id="{8C207595-B2B6-D170-97EF-6E15D1B5C2C6}"/>
+                <a16:creationId xmlns:a16="http://schemas.microsoft.com/office/drawing/2014/main" id="{0F53A0E0-FA0E-6390-DE72-F529CDE8B697}"/>
               </a:ext>
             </a:extLst>
           </p:cNvPr>
@@ -12660,22 +12700,72 @@
             <p:ph type="body" idx="1"/>
           </p:nvPr>
         </p:nvSpPr>
-        <p:spPr/>
+        <p:spPr>
+          <a:xfrm>
+            <a:off x="493962" y="1701368"/>
+            <a:ext cx="4716379" cy="1784790"/>
+          </a:xfrm>
+        </p:spPr>
         <p:txBody>
-          <a:bodyPr/>
+          <a:bodyPr>
+            <a:normAutofit fontScale="92500"/>
+          </a:bodyPr>
           <a:lstStyle/>
           <a:p>
+            <a:pPr marL="342900" indent="-342900">
+              <a:buFont typeface="Arial" panose="020B0604020202020204" pitchFamily="34" charset="0"/>
+              <a:buChar char="•"/>
+            </a:pPr>
             <a:r>
-              <a:rPr lang="en-US" dirty="0"/>
-              <a:t>White and grays for </a:t>
+              <a:rPr lang="en-US" dirty="0">
+                <a:solidFill>
+                  <a:schemeClr val="tx1"/>
+                </a:solidFill>
+              </a:rPr>
+              <a:t>The goal for the overall color scheme is to have a different feal from other Marinas while still being inviting and welcoming to those who are visiting our site.</a:t>
             </a:r>
+          </a:p>
+        </p:txBody>
+      </p:sp>
+      <p:sp>
+        <p:nvSpPr>
+          <p:cNvPr id="10" name="TextBox 9">
+            <a:extLst>
+              <a:ext uri="{FF2B5EF4-FFF2-40B4-BE49-F238E27FC236}">
+                <a16:creationId xmlns:a16="http://schemas.microsoft.com/office/drawing/2014/main" id="{A59942F7-7C85-1EF2-9677-DCAADBAB808C}"/>
+              </a:ext>
+            </a:extLst>
+          </p:cNvPr>
+          <p:cNvSpPr txBox="1"/>
+          <p:nvPr/>
+        </p:nvSpPr>
+        <p:spPr>
+          <a:xfrm>
+            <a:off x="493963" y="3962658"/>
+            <a:ext cx="4716379" cy="2308324"/>
+          </a:xfrm>
+          <a:prstGeom prst="rect">
+            <a:avLst/>
+          </a:prstGeom>
+          <a:noFill/>
+        </p:spPr>
+        <p:txBody>
+          <a:bodyPr wrap="square">
+            <a:spAutoFit/>
+          </a:bodyPr>
+          <a:lstStyle/>
+          <a:p>
+            <a:pPr marL="342900" indent="-342900">
+              <a:buFont typeface="Arial" panose="020B0604020202020204" pitchFamily="34" charset="0"/>
+              <a:buChar char="•"/>
+            </a:pPr>
             <a:r>
-              <a:rPr lang="en-US" dirty="0" err="1"/>
-              <a:t>Backgrouds</a:t>
-            </a:r>
-            <a:r>
-              <a:rPr lang="en-US" dirty="0"/>
-              <a:t>, Light Blue headings and some text, and Yellow for highlights</a:t>
+              <a:rPr lang="en-US" sz="2400" dirty="0">
+                <a:solidFill>
+                  <a:schemeClr val="tx1"/>
+                </a:solidFill>
+              </a:rPr>
+              <a:t>These colors will compliment each other well and be distinct enough from one another that users should be able to identify the various elements by color alone.</a:t>
             </a:r>
           </a:p>
         </p:txBody>

</xml_diff>